<commit_message>
updated the standard libraries deck
</commit_message>
<xml_diff>
--- a/lecture/Python Programing.pptx
+++ b/lecture/Python Programing.pptx
@@ -36,11 +36,15 @@
     <p:sldId id="277" r:id="rId30"/>
     <p:sldId id="292" r:id="rId31"/>
     <p:sldId id="290" r:id="rId32"/>
-    <p:sldId id="291" r:id="rId33"/>
-    <p:sldId id="289" r:id="rId34"/>
-    <p:sldId id="278" r:id="rId35"/>
-    <p:sldId id="279" r:id="rId36"/>
-    <p:sldId id="293" r:id="rId37"/>
+    <p:sldId id="297" r:id="rId33"/>
+    <p:sldId id="291" r:id="rId34"/>
+    <p:sldId id="298" r:id="rId35"/>
+    <p:sldId id="289" r:id="rId36"/>
+    <p:sldId id="278" r:id="rId37"/>
+    <p:sldId id="279" r:id="rId38"/>
+    <p:sldId id="299" r:id="rId39"/>
+    <p:sldId id="293" r:id="rId40"/>
+    <p:sldId id="300" r:id="rId41"/>
   </p:sldIdLst>
   <p:sldSz cx="12192000" cy="6858000"/>
   <p:notesSz cx="6858000" cy="9144000"/>
@@ -4040,14 +4044,6 @@
               </a:rPr>
               <a:t>Basics</a:t>
             </a:r>
-            <a:endParaRPr lang="en-US" dirty="0">
-              <a:solidFill>
-                <a:schemeClr val="dk1"/>
-              </a:solidFill>
-              <a:latin typeface="Calibri"/>
-              <a:ea typeface="Calibri"/>
-              <a:cs typeface="Calibri"/>
-            </a:endParaRPr>
           </a:p>
         </p:txBody>
       </p:sp>
@@ -4259,15 +4255,6 @@
               </a:rPr>
               <a:t> ) are recognized by the absence of the prompts (&gt;&gt;&gt; OR …)</a:t>
             </a:r>
-            <a:endParaRPr lang="en-US" sz="2400" dirty="0">
-              <a:solidFill>
-                <a:schemeClr val="dk1"/>
-              </a:solidFill>
-              <a:latin typeface="Times New Roman"/>
-              <a:ea typeface="Times New Roman"/>
-              <a:cs typeface="Times New Roman"/>
-              <a:sym typeface="Calibri"/>
-            </a:endParaRPr>
           </a:p>
         </p:txBody>
       </p:sp>
@@ -4706,15 +4693,6 @@
               </a:rPr>
               <a:t>: unexpected indent</a:t>
             </a:r>
-            <a:endParaRPr lang="en-US" sz="2400" dirty="0">
-              <a:solidFill>
-                <a:schemeClr val="dk1"/>
-              </a:solidFill>
-              <a:latin typeface="Times New Roman"/>
-              <a:ea typeface="Times New Roman"/>
-              <a:cs typeface="Times New Roman"/>
-              <a:sym typeface="Calibri"/>
-            </a:endParaRPr>
           </a:p>
         </p:txBody>
       </p:sp>
@@ -4752,15 +4730,6 @@
               </a:rPr>
               <a:t>Language Basics</a:t>
             </a:r>
-            <a:endParaRPr lang="en-US" dirty="0">
-              <a:solidFill>
-                <a:schemeClr val="dk1"/>
-              </a:solidFill>
-              <a:latin typeface="Calibri"/>
-              <a:ea typeface="Calibri"/>
-              <a:cs typeface="Calibri"/>
-              <a:sym typeface="Calibri"/>
-            </a:endParaRPr>
           </a:p>
         </p:txBody>
       </p:sp>
@@ -4854,15 +4823,6 @@
               </a:rPr>
               <a:t>Numbers</a:t>
             </a:r>
-            <a:endParaRPr lang="en-US" dirty="0">
-              <a:solidFill>
-                <a:schemeClr val="dk1"/>
-              </a:solidFill>
-              <a:latin typeface="Calibri"/>
-              <a:ea typeface="Calibri"/>
-              <a:cs typeface="Calibri"/>
-              <a:sym typeface="Calibri"/>
-            </a:endParaRPr>
           </a:p>
         </p:txBody>
       </p:sp>
@@ -5190,15 +5150,6 @@
               </a:rPr>
               <a:t>Strings</a:t>
             </a:r>
-            <a:endParaRPr lang="en-US" dirty="0">
-              <a:solidFill>
-                <a:schemeClr val="dk1"/>
-              </a:solidFill>
-              <a:latin typeface="Calibri"/>
-              <a:ea typeface="Calibri"/>
-              <a:cs typeface="Calibri"/>
-              <a:sym typeface="Calibri"/>
-            </a:endParaRPr>
           </a:p>
         </p:txBody>
       </p:sp>
@@ -5258,19 +5209,7 @@
                 <a:cs typeface="Times New Roman"/>
                 <a:sym typeface="Calibri"/>
               </a:rPr>
-              <a:t>\’t</a:t>
-            </a:r>
-            <a:r>
-              <a:rPr lang="en-US" sz="2400" dirty="0">
-                <a:solidFill>
-                  <a:schemeClr val="dk1"/>
-                </a:solidFill>
-                <a:latin typeface="Times New Roman"/>
-                <a:ea typeface="Times New Roman"/>
-                <a:cs typeface="Times New Roman"/>
-                <a:sym typeface="Calibri"/>
-              </a:rPr>
-              <a:t>’)</a:t>
+              <a:t>\’t’)</a:t>
             </a:r>
           </a:p>
           <a:p>
@@ -5415,15 +5354,6 @@
               </a:rPr>
               <a:t>’</a:t>
             </a:r>
-            <a:endParaRPr lang="en-US" sz="2400" dirty="0">
-              <a:solidFill>
-                <a:schemeClr val="dk1"/>
-              </a:solidFill>
-              <a:latin typeface="Times New Roman"/>
-              <a:ea typeface="Times New Roman"/>
-              <a:cs typeface="Times New Roman"/>
-              <a:sym typeface="Calibri"/>
-            </a:endParaRPr>
           </a:p>
         </p:txBody>
       </p:sp>
@@ -5541,15 +5471,6 @@
               </a:rPr>
               <a:t>More Strings</a:t>
             </a:r>
-            <a:endParaRPr lang="en-US" dirty="0">
-              <a:solidFill>
-                <a:schemeClr val="dk1"/>
-              </a:solidFill>
-              <a:latin typeface="Calibri"/>
-              <a:ea typeface="Calibri"/>
-              <a:cs typeface="Calibri"/>
-              <a:sym typeface="Calibri"/>
-            </a:endParaRPr>
           </a:p>
         </p:txBody>
       </p:sp>
@@ -5644,19 +5565,7 @@
                 <a:cs typeface="Times New Roman"/>
                 <a:sym typeface="Calibri"/>
               </a:rPr>
-              <a:t> </a:t>
-            </a:r>
-            <a:r>
-              <a:rPr lang="en-US" sz="2400" dirty="0">
-                <a:solidFill>
-                  <a:schemeClr val="dk1"/>
-                </a:solidFill>
-                <a:latin typeface="Times New Roman"/>
-                <a:ea typeface="Times New Roman"/>
-                <a:cs typeface="Times New Roman"/>
-                <a:sym typeface="Calibri"/>
-              </a:rPr>
-              <a:t>characters from position 0 to 3 (excluded)</a:t>
+              <a:t> characters from position 0 to 3 (excluded)</a:t>
             </a:r>
           </a:p>
           <a:p>
@@ -5870,15 +5779,6 @@
               </a:rPr>
               <a:t>String Functions</a:t>
             </a:r>
-            <a:endParaRPr lang="en-US" dirty="0">
-              <a:solidFill>
-                <a:schemeClr val="dk1"/>
-              </a:solidFill>
-              <a:latin typeface="Calibri"/>
-              <a:ea typeface="Calibri"/>
-              <a:cs typeface="Calibri"/>
-              <a:sym typeface="Calibri"/>
-            </a:endParaRPr>
           </a:p>
         </p:txBody>
       </p:sp>
@@ -5931,19 +5831,7 @@
                 <a:cs typeface="Times New Roman"/>
                 <a:sym typeface="Calibri"/>
               </a:rPr>
-              <a:t>	</a:t>
-            </a:r>
-            <a:r>
-              <a:rPr lang="en-US" sz="2400" dirty="0">
-                <a:solidFill>
-                  <a:schemeClr val="dk1"/>
-                </a:solidFill>
-                <a:latin typeface="Times New Roman"/>
-                <a:ea typeface="Times New Roman"/>
-                <a:cs typeface="Times New Roman"/>
-                <a:sym typeface="Calibri"/>
-              </a:rPr>
-              <a:t>- </a:t>
+              <a:t>	- </a:t>
             </a:r>
             <a:r>
               <a:rPr lang="en-US" sz="2400" dirty="0" err="1">
@@ -6022,19 +5910,7 @@
                 <a:cs typeface="Times New Roman"/>
                 <a:sym typeface="Calibri"/>
               </a:rPr>
-              <a:t>	</a:t>
-            </a:r>
-            <a:r>
-              <a:rPr lang="en-US" sz="2400" dirty="0">
-                <a:solidFill>
-                  <a:schemeClr val="dk1"/>
-                </a:solidFill>
-                <a:latin typeface="Times New Roman"/>
-                <a:ea typeface="Times New Roman"/>
-                <a:cs typeface="Times New Roman"/>
-                <a:sym typeface="Calibri"/>
-              </a:rPr>
-              <a:t> </a:t>
+              <a:t>	 </a:t>
             </a:r>
             <a:r>
               <a:rPr lang="en-US" sz="2400" dirty="0">
@@ -6314,15 +6190,6 @@
               </a:rPr>
               <a:t> statement:</a:t>
             </a:r>
-            <a:endParaRPr lang="en-US" sz="2400" dirty="0">
-              <a:solidFill>
-                <a:schemeClr val="dk1"/>
-              </a:solidFill>
-              <a:latin typeface="Times New Roman"/>
-              <a:ea typeface="Times New Roman"/>
-              <a:cs typeface="Times New Roman"/>
-              <a:sym typeface="Calibri"/>
-            </a:endParaRPr>
           </a:p>
           <a:p>
             <a:r>
@@ -6572,15 +6439,6 @@
               </a:rPr>
               <a:t>Control Flow</a:t>
             </a:r>
-            <a:endParaRPr lang="en-US" dirty="0">
-              <a:solidFill>
-                <a:schemeClr val="dk1"/>
-              </a:solidFill>
-              <a:latin typeface="Calibri"/>
-              <a:ea typeface="Calibri"/>
-              <a:cs typeface="Calibri"/>
-              <a:sym typeface="Calibri"/>
-            </a:endParaRPr>
           </a:p>
         </p:txBody>
       </p:sp>
@@ -6755,19 +6613,7 @@
                 <a:cs typeface="Times New Roman"/>
                 <a:sym typeface="Calibri"/>
               </a:rPr>
-              <a:t>	</a:t>
-            </a:r>
-            <a:r>
-              <a:rPr lang="en-US" sz="2400" dirty="0">
-                <a:solidFill>
-                  <a:schemeClr val="dk1"/>
-                </a:solidFill>
-                <a:latin typeface="Times New Roman"/>
-                <a:ea typeface="Times New Roman"/>
-                <a:cs typeface="Times New Roman"/>
-                <a:sym typeface="Calibri"/>
-              </a:rPr>
-              <a:t>‘break’ statement breaks out of the enclosing for/while loop</a:t>
+              <a:t>	‘break’ statement breaks out of the enclosing for/while loop</a:t>
             </a:r>
           </a:p>
           <a:p>
@@ -6784,19 +6630,7 @@
                 <a:cs typeface="Times New Roman"/>
                 <a:sym typeface="Calibri"/>
               </a:rPr>
-              <a:t>	</a:t>
-            </a:r>
-            <a:r>
-              <a:rPr lang="en-US" sz="2400" dirty="0">
-                <a:solidFill>
-                  <a:schemeClr val="dk1"/>
-                </a:solidFill>
-                <a:latin typeface="Times New Roman"/>
-                <a:ea typeface="Times New Roman"/>
-                <a:cs typeface="Times New Roman"/>
-                <a:sym typeface="Calibri"/>
-              </a:rPr>
-              <a:t>‘continue’ statement continues with the next iteration of the loop</a:t>
+              <a:t>	‘continue’ statement continues with the next iteration of the loop</a:t>
             </a:r>
           </a:p>
           <a:p>
@@ -6974,15 +6808,6 @@
               </a:rPr>
               <a:t>Functions</a:t>
             </a:r>
-            <a:endParaRPr lang="en-US" dirty="0">
-              <a:solidFill>
-                <a:schemeClr val="dk1"/>
-              </a:solidFill>
-              <a:latin typeface="Calibri"/>
-              <a:ea typeface="Calibri"/>
-              <a:cs typeface="Calibri"/>
-              <a:sym typeface="Calibri"/>
-            </a:endParaRPr>
           </a:p>
         </p:txBody>
       </p:sp>
@@ -7109,19 +6934,7 @@
                 <a:cs typeface="Times New Roman"/>
                 <a:sym typeface="Calibri"/>
               </a:rPr>
-              <a:t>	</a:t>
-            </a:r>
-            <a:r>
-              <a:rPr lang="en-US" sz="2400" dirty="0">
-                <a:solidFill>
-                  <a:schemeClr val="dk1"/>
-                </a:solidFill>
-                <a:latin typeface="Times New Roman"/>
-                <a:ea typeface="Times New Roman"/>
-                <a:cs typeface="Times New Roman"/>
-                <a:sym typeface="Calibri"/>
-              </a:rPr>
-              <a:t>- this allows the functions to be</a:t>
+              <a:t>	- this allows the functions to be</a:t>
             </a:r>
           </a:p>
           <a:p>
@@ -7138,19 +6951,7 @@
                 <a:cs typeface="Times New Roman"/>
                 <a:sym typeface="Calibri"/>
               </a:rPr>
-              <a:t>	</a:t>
-            </a:r>
-            <a:r>
-              <a:rPr lang="en-US" sz="2400" dirty="0">
-                <a:solidFill>
-                  <a:schemeClr val="dk1"/>
-                </a:solidFill>
-                <a:latin typeface="Times New Roman"/>
-                <a:ea typeface="Times New Roman"/>
-                <a:cs typeface="Times New Roman"/>
-                <a:sym typeface="Calibri"/>
-              </a:rPr>
-              <a:t>  called in several ways</a:t>
+              <a:t>	  called in several ways</a:t>
             </a:r>
           </a:p>
           <a:p>
@@ -7267,15 +7068,6 @@
               </a:rPr>
               <a:t> in the list of parameters</a:t>
             </a:r>
-            <a:endParaRPr lang="en-US" sz="2400" dirty="0">
-              <a:solidFill>
-                <a:schemeClr val="dk1"/>
-              </a:solidFill>
-              <a:latin typeface="Times New Roman"/>
-              <a:ea typeface="Times New Roman"/>
-              <a:cs typeface="Times New Roman"/>
-              <a:sym typeface="Calibri"/>
-            </a:endParaRPr>
           </a:p>
         </p:txBody>
       </p:sp>
@@ -7443,57 +7235,51 @@
                 <a:solidFill>
                   <a:schemeClr val="dk1"/>
                 </a:solidFill>
-                <a:latin typeface="Calibri"/>
+                <a:latin typeface="Times New Roman" panose="02020603050405020304" pitchFamily="18" charset="0"/>
                 <a:ea typeface="Calibri"/>
-                <a:cs typeface="Calibri"/>
-                <a:sym typeface="Calibri"/>
-              </a:rPr>
-              <a:t>Python is an interpreted high-level programming language for general-purpose programming. Created by Guido van Rossum and first released in </a:t>
-            </a:r>
+                <a:cs typeface="Times New Roman" panose="02020603050405020304" pitchFamily="18" charset="0"/>
+                <a:sym typeface="Calibri"/>
+              </a:rPr>
+              <a:t>Python is an interpreted high-level programming language for general-purpose programming. Created by Guido van Rossum and first released in 1991</a:t>
+            </a:r>
+          </a:p>
+          <a:p>
+            <a:endParaRPr lang="en-US" dirty="0" smtClean="0">
+              <a:latin typeface="Times New Roman" panose="02020603050405020304" pitchFamily="18" charset="0"/>
+              <a:cs typeface="Times New Roman" panose="02020603050405020304" pitchFamily="18" charset="0"/>
+            </a:endParaRPr>
+          </a:p>
+          <a:p>
             <a:r>
               <a:rPr lang="en-US" dirty="0">
-                <a:solidFill>
-                  <a:schemeClr val="dk1"/>
-                </a:solidFill>
-                <a:latin typeface="Calibri"/>
-                <a:ea typeface="Calibri"/>
-                <a:cs typeface="Calibri"/>
-                <a:sym typeface="Calibri"/>
-              </a:rPr>
-              <a:t>1991</a:t>
-            </a:r>
-            <a:endParaRPr lang="en-US" dirty="0">
-              <a:solidFill>
-                <a:schemeClr val="dk1"/>
-              </a:solidFill>
-              <a:latin typeface="Calibri"/>
-              <a:ea typeface="Calibri"/>
-              <a:cs typeface="Calibri"/>
-              <a:sym typeface="Calibri"/>
-            </a:endParaRPr>
-          </a:p>
-          <a:p>
-            <a:endParaRPr lang="en-US" dirty="0" smtClean="0"/>
-          </a:p>
-          <a:p>
-            <a:r>
-              <a:rPr lang="en-US" dirty="0"/>
+                <a:latin typeface="Times New Roman" panose="02020603050405020304" pitchFamily="18" charset="0"/>
+                <a:cs typeface="Times New Roman" panose="02020603050405020304" pitchFamily="18" charset="0"/>
+              </a:rPr>
               <a:t>Python 1: 1994</a:t>
             </a:r>
           </a:p>
           <a:p>
             <a:r>
-              <a:rPr lang="en-US" dirty="0"/>
+              <a:rPr lang="en-US" dirty="0">
+                <a:latin typeface="Times New Roman" panose="02020603050405020304" pitchFamily="18" charset="0"/>
+                <a:cs typeface="Times New Roman" panose="02020603050405020304" pitchFamily="18" charset="0"/>
+              </a:rPr>
               <a:t>Python 2: 2000</a:t>
             </a:r>
           </a:p>
           <a:p>
             <a:r>
-              <a:rPr lang="en-US" dirty="0"/>
+              <a:rPr lang="en-US" dirty="0">
+                <a:latin typeface="Times New Roman" panose="02020603050405020304" pitchFamily="18" charset="0"/>
+                <a:cs typeface="Times New Roman" panose="02020603050405020304" pitchFamily="18" charset="0"/>
+              </a:rPr>
               <a:t>Python 3: </a:t>
             </a:r>
             <a:r>
-              <a:rPr lang="en-US" dirty="0" smtClean="0"/>
+              <a:rPr lang="en-US" dirty="0" smtClean="0">
+                <a:latin typeface="Times New Roman" panose="02020603050405020304" pitchFamily="18" charset="0"/>
+                <a:cs typeface="Times New Roman" panose="02020603050405020304" pitchFamily="18" charset="0"/>
+              </a:rPr>
               <a:t>2008</a:t>
             </a:r>
           </a:p>
@@ -7501,7 +7287,10 @@
             <a:pPr marL="3657600" lvl="8" indent="0">
               <a:buNone/>
             </a:pPr>
-            <a:endParaRPr lang="en-US" dirty="0"/>
+            <a:endParaRPr lang="en-US" dirty="0">
+              <a:latin typeface="Times New Roman" panose="02020603050405020304" pitchFamily="18" charset="0"/>
+              <a:cs typeface="Times New Roman" panose="02020603050405020304" pitchFamily="18" charset="0"/>
+            </a:endParaRPr>
           </a:p>
         </p:txBody>
       </p:sp>
@@ -8261,15 +8050,6 @@
               </a:rPr>
               <a:t>Data Structures – Tuples and Sets</a:t>
             </a:r>
-            <a:endParaRPr lang="en-US" dirty="0">
-              <a:solidFill>
-                <a:schemeClr val="dk1"/>
-              </a:solidFill>
-              <a:latin typeface="Calibri"/>
-              <a:ea typeface="Calibri"/>
-              <a:cs typeface="Calibri"/>
-              <a:sym typeface="Calibri"/>
-            </a:endParaRPr>
           </a:p>
         </p:txBody>
       </p:sp>
@@ -8637,15 +8417,6 @@
               </a:rPr>
               <a:t>Data Structures - Dictionaries</a:t>
             </a:r>
-            <a:endParaRPr lang="en-US" dirty="0">
-              <a:solidFill>
-                <a:schemeClr val="dk1"/>
-              </a:solidFill>
-              <a:latin typeface="Calibri"/>
-              <a:ea typeface="Calibri"/>
-              <a:cs typeface="Calibri"/>
-              <a:sym typeface="Calibri"/>
-            </a:endParaRPr>
           </a:p>
         </p:txBody>
       </p:sp>
@@ -8702,15 +8473,6 @@
               </a:rPr>
               <a:t> pairs</a:t>
             </a:r>
-            <a:endParaRPr lang="en-US" sz="2400" dirty="0">
-              <a:solidFill>
-                <a:schemeClr val="dk1"/>
-              </a:solidFill>
-              <a:latin typeface="Times New Roman"/>
-              <a:ea typeface="Times New Roman"/>
-              <a:cs typeface="Times New Roman"/>
-              <a:sym typeface="Calibri"/>
-            </a:endParaRPr>
           </a:p>
           <a:p>
             <a:r>
@@ -8982,15 +8744,6 @@
               </a:rPr>
               <a:t>Input and Output</a:t>
             </a:r>
-            <a:endParaRPr lang="en-US" dirty="0">
-              <a:solidFill>
-                <a:schemeClr val="dk1"/>
-              </a:solidFill>
-              <a:latin typeface="Calibri"/>
-              <a:ea typeface="Calibri"/>
-              <a:cs typeface="Calibri"/>
-              <a:sym typeface="Calibri"/>
-            </a:endParaRPr>
           </a:p>
         </p:txBody>
       </p:sp>
@@ -9660,13 +9413,7 @@
               <a:rPr lang="en-US" dirty="0" smtClean="0">
                 <a:latin typeface="+mn-lt"/>
               </a:rPr>
-              <a:t>Modules, </a:t>
-            </a:r>
-            <a:r>
-              <a:rPr lang="en-US" dirty="0" smtClean="0">
-                <a:latin typeface="+mn-lt"/>
-              </a:rPr>
-              <a:t>Packages</a:t>
+              <a:t>Modules, Packages</a:t>
             </a:r>
             <a:endParaRPr lang="en-US" dirty="0">
               <a:latin typeface="+mn-lt"/>
@@ -11067,29 +10814,7 @@
                 <a:ea typeface="Times New Roman"/>
                 <a:cs typeface="Times New Roman"/>
               </a:rPr>
-              <a:t>Python </a:t>
-            </a:r>
-            <a:r>
-              <a:rPr lang="en-US" sz="2400" b="1" dirty="0">
-                <a:solidFill>
-                  <a:schemeClr val="dk1"/>
-                </a:solidFill>
-                <a:latin typeface="Times New Roman"/>
-                <a:ea typeface="Times New Roman"/>
-                <a:cs typeface="Times New Roman"/>
-              </a:rPr>
-              <a:t>with </a:t>
-            </a:r>
-            <a:r>
-              <a:rPr lang="en-US" sz="2400" b="1" dirty="0">
-                <a:solidFill>
-                  <a:schemeClr val="dk1"/>
-                </a:solidFill>
-                <a:latin typeface="Times New Roman"/>
-                <a:ea typeface="Times New Roman"/>
-                <a:cs typeface="Times New Roman"/>
-              </a:rPr>
-              <a:t>Anaconda</a:t>
+              <a:t>Python with Anaconda</a:t>
             </a:r>
             <a:r>
               <a:rPr lang="en-US" sz="2400" dirty="0">
@@ -11102,14 +10827,6 @@
               </a:rPr>
               <a:t>.</a:t>
             </a:r>
-            <a:endParaRPr lang="en-US" sz="2400" dirty="0">
-              <a:solidFill>
-                <a:schemeClr val="dk1"/>
-              </a:solidFill>
-              <a:latin typeface="Times New Roman"/>
-              <a:ea typeface="Times New Roman"/>
-              <a:cs typeface="Times New Roman"/>
-            </a:endParaRPr>
           </a:p>
         </p:txBody>
       </p:sp>
@@ -11353,7 +11070,7 @@
         </p:nvSpPr>
         <p:spPr>
           <a:xfrm>
-            <a:off x="838200" y="118547"/>
+            <a:off x="838200" y="647666"/>
             <a:ext cx="10515600" cy="708524"/>
           </a:xfrm>
         </p:spPr>
@@ -11391,7 +11108,7 @@
         </p:nvSpPr>
         <p:spPr>
           <a:xfrm>
-            <a:off x="838200" y="1104473"/>
+            <a:off x="838200" y="1751745"/>
             <a:ext cx="10515600" cy="5049749"/>
           </a:xfrm>
         </p:spPr>
@@ -11402,21 +11119,21 @@
           <a:lstStyle/>
           <a:p>
             <a:r>
-              <a:rPr lang="en-US" sz="1200" dirty="0">
+              <a:rPr lang="en-US" sz="2000" dirty="0">
                 <a:latin typeface="Times New Roman" panose="02020603050405020304" pitchFamily="18" charset="0"/>
                 <a:cs typeface="Times New Roman" panose="02020603050405020304" pitchFamily="18" charset="0"/>
               </a:rPr>
               <a:t>^	</a:t>
             </a:r>
             <a:r>
-              <a:rPr lang="en-US" sz="1200" dirty="0" smtClean="0">
+              <a:rPr lang="en-US" sz="2000" dirty="0" smtClean="0">
                 <a:latin typeface="Times New Roman" panose="02020603050405020304" pitchFamily="18" charset="0"/>
                 <a:cs typeface="Times New Roman" panose="02020603050405020304" pitchFamily="18" charset="0"/>
               </a:rPr>
               <a:t>Matches </a:t>
             </a:r>
             <a:r>
-              <a:rPr lang="en-US" sz="1200" dirty="0">
+              <a:rPr lang="en-US" sz="2000" dirty="0">
                 <a:latin typeface="Times New Roman" panose="02020603050405020304" pitchFamily="18" charset="0"/>
                 <a:cs typeface="Times New Roman" panose="02020603050405020304" pitchFamily="18" charset="0"/>
               </a:rPr>
@@ -11425,21 +11142,21 @@
           </a:p>
           <a:p>
             <a:r>
-              <a:rPr lang="en-US" sz="1200" dirty="0">
+              <a:rPr lang="en-US" sz="2000" dirty="0">
                 <a:latin typeface="Times New Roman" panose="02020603050405020304" pitchFamily="18" charset="0"/>
                 <a:cs typeface="Times New Roman" panose="02020603050405020304" pitchFamily="18" charset="0"/>
               </a:rPr>
               <a:t>$	</a:t>
             </a:r>
             <a:r>
-              <a:rPr lang="en-US" sz="1200" dirty="0" smtClean="0">
+              <a:rPr lang="en-US" sz="2000" dirty="0" smtClean="0">
                 <a:latin typeface="Times New Roman" panose="02020603050405020304" pitchFamily="18" charset="0"/>
                 <a:cs typeface="Times New Roman" panose="02020603050405020304" pitchFamily="18" charset="0"/>
               </a:rPr>
               <a:t>Matches </a:t>
             </a:r>
             <a:r>
-              <a:rPr lang="en-US" sz="1200" dirty="0">
+              <a:rPr lang="en-US" sz="2000" dirty="0">
                 <a:latin typeface="Times New Roman" panose="02020603050405020304" pitchFamily="18" charset="0"/>
                 <a:cs typeface="Times New Roman" panose="02020603050405020304" pitchFamily="18" charset="0"/>
               </a:rPr>
@@ -11448,21 +11165,21 @@
           </a:p>
           <a:p>
             <a:r>
-              <a:rPr lang="en-US" sz="1200" dirty="0">
+              <a:rPr lang="en-US" sz="2000" dirty="0">
                 <a:latin typeface="Times New Roman" panose="02020603050405020304" pitchFamily="18" charset="0"/>
                 <a:cs typeface="Times New Roman" panose="02020603050405020304" pitchFamily="18" charset="0"/>
               </a:rPr>
               <a:t>.	</a:t>
             </a:r>
             <a:r>
-              <a:rPr lang="en-US" sz="1200" dirty="0" smtClean="0">
+              <a:rPr lang="en-US" sz="2000" dirty="0" smtClean="0">
                 <a:latin typeface="Times New Roman" panose="02020603050405020304" pitchFamily="18" charset="0"/>
                 <a:cs typeface="Times New Roman" panose="02020603050405020304" pitchFamily="18" charset="0"/>
               </a:rPr>
               <a:t>Matches </a:t>
             </a:r>
             <a:r>
-              <a:rPr lang="en-US" sz="1200" dirty="0">
+              <a:rPr lang="en-US" sz="2000" dirty="0">
                 <a:latin typeface="Times New Roman" panose="02020603050405020304" pitchFamily="18" charset="0"/>
                 <a:cs typeface="Times New Roman" panose="02020603050405020304" pitchFamily="18" charset="0"/>
               </a:rPr>
@@ -11471,7 +11188,7 @@
           </a:p>
           <a:p>
             <a:r>
-              <a:rPr lang="en-US" sz="1200" dirty="0">
+              <a:rPr lang="en-US" sz="2000" dirty="0">
                 <a:latin typeface="Times New Roman" panose="02020603050405020304" pitchFamily="18" charset="0"/>
                 <a:cs typeface="Times New Roman" panose="02020603050405020304" pitchFamily="18" charset="0"/>
               </a:rPr>
@@ -11480,7 +11197,7 @@
           </a:p>
           <a:p>
             <a:r>
-              <a:rPr lang="en-US" sz="1200" dirty="0">
+              <a:rPr lang="en-US" sz="2000" dirty="0">
                 <a:latin typeface="Times New Roman" panose="02020603050405020304" pitchFamily="18" charset="0"/>
                 <a:cs typeface="Times New Roman" panose="02020603050405020304" pitchFamily="18" charset="0"/>
               </a:rPr>
@@ -11489,21 +11206,21 @@
           </a:p>
           <a:p>
             <a:r>
-              <a:rPr lang="en-US" sz="1200" dirty="0">
+              <a:rPr lang="en-US" sz="2000" dirty="0">
                 <a:latin typeface="Times New Roman" panose="02020603050405020304" pitchFamily="18" charset="0"/>
                 <a:cs typeface="Times New Roman" panose="02020603050405020304" pitchFamily="18" charset="0"/>
               </a:rPr>
               <a:t>re*	</a:t>
             </a:r>
             <a:r>
-              <a:rPr lang="en-US" sz="1200" dirty="0" smtClean="0">
+              <a:rPr lang="en-US" sz="2000" dirty="0" smtClean="0">
                 <a:latin typeface="Times New Roman" panose="02020603050405020304" pitchFamily="18" charset="0"/>
                 <a:cs typeface="Times New Roman" panose="02020603050405020304" pitchFamily="18" charset="0"/>
               </a:rPr>
               <a:t>Matches </a:t>
             </a:r>
             <a:r>
-              <a:rPr lang="en-US" sz="1200" dirty="0">
+              <a:rPr lang="en-US" sz="2000" dirty="0">
                 <a:latin typeface="Times New Roman" panose="02020603050405020304" pitchFamily="18" charset="0"/>
                 <a:cs typeface="Times New Roman" panose="02020603050405020304" pitchFamily="18" charset="0"/>
               </a:rPr>
@@ -11512,21 +11229,21 @@
           </a:p>
           <a:p>
             <a:r>
-              <a:rPr lang="en-US" sz="1200" dirty="0">
+              <a:rPr lang="en-US" sz="2000" dirty="0">
                 <a:latin typeface="Times New Roman" panose="02020603050405020304" pitchFamily="18" charset="0"/>
                 <a:cs typeface="Times New Roman" panose="02020603050405020304" pitchFamily="18" charset="0"/>
               </a:rPr>
               <a:t>re+	</a:t>
             </a:r>
             <a:r>
-              <a:rPr lang="en-US" sz="1200" dirty="0" smtClean="0">
+              <a:rPr lang="en-US" sz="2000" dirty="0" smtClean="0">
                 <a:latin typeface="Times New Roman" panose="02020603050405020304" pitchFamily="18" charset="0"/>
                 <a:cs typeface="Times New Roman" panose="02020603050405020304" pitchFamily="18" charset="0"/>
               </a:rPr>
               <a:t>Matches </a:t>
             </a:r>
             <a:r>
-              <a:rPr lang="en-US" sz="1200" dirty="0">
+              <a:rPr lang="en-US" sz="2000" dirty="0">
                 <a:latin typeface="Times New Roman" panose="02020603050405020304" pitchFamily="18" charset="0"/>
                 <a:cs typeface="Times New Roman" panose="02020603050405020304" pitchFamily="18" charset="0"/>
               </a:rPr>
@@ -11535,21 +11252,21 @@
           </a:p>
           <a:p>
             <a:r>
-              <a:rPr lang="en-US" sz="1200" dirty="0">
+              <a:rPr lang="en-US" sz="2000" dirty="0">
                 <a:latin typeface="Times New Roman" panose="02020603050405020304" pitchFamily="18" charset="0"/>
                 <a:cs typeface="Times New Roman" panose="02020603050405020304" pitchFamily="18" charset="0"/>
               </a:rPr>
               <a:t>re?	</a:t>
             </a:r>
             <a:r>
-              <a:rPr lang="en-US" sz="1200" dirty="0" smtClean="0">
+              <a:rPr lang="en-US" sz="2000" dirty="0" smtClean="0">
                 <a:latin typeface="Times New Roman" panose="02020603050405020304" pitchFamily="18" charset="0"/>
                 <a:cs typeface="Times New Roman" panose="02020603050405020304" pitchFamily="18" charset="0"/>
               </a:rPr>
               <a:t>Matches </a:t>
             </a:r>
             <a:r>
-              <a:rPr lang="en-US" sz="1200" dirty="0">
+              <a:rPr lang="en-US" sz="2000" dirty="0">
                 <a:latin typeface="Times New Roman" panose="02020603050405020304" pitchFamily="18" charset="0"/>
                 <a:cs typeface="Times New Roman" panose="02020603050405020304" pitchFamily="18" charset="0"/>
               </a:rPr>
@@ -11558,228 +11275,23 @@
           </a:p>
           <a:p>
             <a:r>
-              <a:rPr lang="en-US" sz="1200" dirty="0">
-                <a:latin typeface="Times New Roman" panose="02020603050405020304" pitchFamily="18" charset="0"/>
-                <a:cs typeface="Times New Roman" panose="02020603050405020304" pitchFamily="18" charset="0"/>
-              </a:rPr>
-              <a:t>re{ n}	Matches exactly n number of occurrences of preceding expression.</a:t>
-            </a:r>
-          </a:p>
-          <a:p>
-            <a:r>
-              <a:rPr lang="en-US" sz="1200" dirty="0">
-                <a:latin typeface="Times New Roman" panose="02020603050405020304" pitchFamily="18" charset="0"/>
-                <a:cs typeface="Times New Roman" panose="02020603050405020304" pitchFamily="18" charset="0"/>
-              </a:rPr>
-              <a:t>re{ n,}	Matches n or more occurrences of preceding expression.</a:t>
-            </a:r>
-          </a:p>
-          <a:p>
-            <a:r>
-              <a:rPr lang="en-US" sz="1200" dirty="0">
-                <a:latin typeface="Times New Roman" panose="02020603050405020304" pitchFamily="18" charset="0"/>
-                <a:cs typeface="Times New Roman" panose="02020603050405020304" pitchFamily="18" charset="0"/>
-              </a:rPr>
-              <a:t>re{ n, m}	Matches at least n and at most m occurrences of preceding expression.</a:t>
-            </a:r>
-          </a:p>
-          <a:p>
-            <a:r>
-              <a:rPr lang="en-US" sz="1200" dirty="0">
-                <a:latin typeface="Times New Roman" panose="02020603050405020304" pitchFamily="18" charset="0"/>
-                <a:cs typeface="Times New Roman" panose="02020603050405020304" pitchFamily="18" charset="0"/>
-              </a:rPr>
-              <a:t>a| b	Matches either a or b.</a:t>
-            </a:r>
-          </a:p>
-          <a:p>
-            <a:r>
-              <a:rPr lang="en-US" sz="1200" dirty="0">
-                <a:latin typeface="Times New Roman" panose="02020603050405020304" pitchFamily="18" charset="0"/>
-                <a:cs typeface="Times New Roman" panose="02020603050405020304" pitchFamily="18" charset="0"/>
-              </a:rPr>
-              <a:t>(re)	Groups regular expressions and remembers matched text.</a:t>
-            </a:r>
-          </a:p>
-          <a:p>
-            <a:r>
-              <a:rPr lang="en-US" sz="1200" dirty="0">
-                <a:latin typeface="Times New Roman" panose="02020603050405020304" pitchFamily="18" charset="0"/>
-                <a:cs typeface="Times New Roman" panose="02020603050405020304" pitchFamily="18" charset="0"/>
-              </a:rPr>
-              <a:t>(?</a:t>
-            </a:r>
-            <a:r>
-              <a:rPr lang="en-US" sz="1200" dirty="0" err="1">
-                <a:latin typeface="Times New Roman" panose="02020603050405020304" pitchFamily="18" charset="0"/>
-                <a:cs typeface="Times New Roman" panose="02020603050405020304" pitchFamily="18" charset="0"/>
-              </a:rPr>
-              <a:t>imx</a:t>
-            </a:r>
-            <a:r>
-              <a:rPr lang="en-US" sz="1200" dirty="0">
-                <a:latin typeface="Times New Roman" panose="02020603050405020304" pitchFamily="18" charset="0"/>
-                <a:cs typeface="Times New Roman" panose="02020603050405020304" pitchFamily="18" charset="0"/>
-              </a:rPr>
-              <a:t>)  	Temporarily toggles on </a:t>
-            </a:r>
-            <a:r>
-              <a:rPr lang="en-US" sz="1200" dirty="0" err="1">
-                <a:latin typeface="Times New Roman" panose="02020603050405020304" pitchFamily="18" charset="0"/>
-                <a:cs typeface="Times New Roman" panose="02020603050405020304" pitchFamily="18" charset="0"/>
-              </a:rPr>
-              <a:t>i</a:t>
-            </a:r>
-            <a:r>
-              <a:rPr lang="en-US" sz="1200" dirty="0">
-                <a:latin typeface="Times New Roman" panose="02020603050405020304" pitchFamily="18" charset="0"/>
-                <a:cs typeface="Times New Roman" panose="02020603050405020304" pitchFamily="18" charset="0"/>
-              </a:rPr>
-              <a:t>, m, or x options within a regular expression. If in parentheses, only that area is affected.</a:t>
-            </a:r>
-          </a:p>
-          <a:p>
-            <a:r>
-              <a:rPr lang="en-US" sz="1200" dirty="0">
-                <a:latin typeface="Times New Roman" panose="02020603050405020304" pitchFamily="18" charset="0"/>
-                <a:cs typeface="Times New Roman" panose="02020603050405020304" pitchFamily="18" charset="0"/>
-              </a:rPr>
-              <a:t>(?-</a:t>
-            </a:r>
-            <a:r>
-              <a:rPr lang="en-US" sz="1200" dirty="0" err="1">
-                <a:latin typeface="Times New Roman" panose="02020603050405020304" pitchFamily="18" charset="0"/>
-                <a:cs typeface="Times New Roman" panose="02020603050405020304" pitchFamily="18" charset="0"/>
-              </a:rPr>
-              <a:t>imx</a:t>
-            </a:r>
-            <a:r>
-              <a:rPr lang="en-US" sz="1200" dirty="0">
-                <a:latin typeface="Times New Roman" panose="02020603050405020304" pitchFamily="18" charset="0"/>
-                <a:cs typeface="Times New Roman" panose="02020603050405020304" pitchFamily="18" charset="0"/>
-              </a:rPr>
-              <a:t>) 	Temporarily toggles off </a:t>
-            </a:r>
-            <a:r>
-              <a:rPr lang="en-US" sz="1200" dirty="0" err="1">
-                <a:latin typeface="Times New Roman" panose="02020603050405020304" pitchFamily="18" charset="0"/>
-                <a:cs typeface="Times New Roman" panose="02020603050405020304" pitchFamily="18" charset="0"/>
-              </a:rPr>
-              <a:t>i</a:t>
-            </a:r>
-            <a:r>
-              <a:rPr lang="en-US" sz="1200" dirty="0">
-                <a:latin typeface="Times New Roman" panose="02020603050405020304" pitchFamily="18" charset="0"/>
-                <a:cs typeface="Times New Roman" panose="02020603050405020304" pitchFamily="18" charset="0"/>
-              </a:rPr>
-              <a:t>, m, or x options within a regular expression. If in parentheses, only that area is affected.</a:t>
-            </a:r>
-          </a:p>
-          <a:p>
-            <a:r>
-              <a:rPr lang="en-US" sz="1200" dirty="0">
-                <a:latin typeface="Times New Roman" panose="02020603050405020304" pitchFamily="18" charset="0"/>
-                <a:cs typeface="Times New Roman" panose="02020603050405020304" pitchFamily="18" charset="0"/>
-              </a:rPr>
-              <a:t>(?: re) 	Groups regular expressions without remembering matched text.</a:t>
-            </a:r>
-          </a:p>
-          <a:p>
-            <a:r>
-              <a:rPr lang="en-US" sz="1200" dirty="0">
-                <a:latin typeface="Times New Roman" panose="02020603050405020304" pitchFamily="18" charset="0"/>
-                <a:cs typeface="Times New Roman" panose="02020603050405020304" pitchFamily="18" charset="0"/>
-              </a:rPr>
-              <a:t>(?</a:t>
-            </a:r>
-            <a:r>
-              <a:rPr lang="en-US" sz="1200" dirty="0" err="1">
-                <a:latin typeface="Times New Roman" panose="02020603050405020304" pitchFamily="18" charset="0"/>
-                <a:cs typeface="Times New Roman" panose="02020603050405020304" pitchFamily="18" charset="0"/>
-              </a:rPr>
-              <a:t>imx</a:t>
-            </a:r>
-            <a:r>
-              <a:rPr lang="en-US" sz="1200" dirty="0">
-                <a:latin typeface="Times New Roman" panose="02020603050405020304" pitchFamily="18" charset="0"/>
-                <a:cs typeface="Times New Roman" panose="02020603050405020304" pitchFamily="18" charset="0"/>
-              </a:rPr>
-              <a:t>: re)	Temporarily toggles on </a:t>
-            </a:r>
-            <a:r>
-              <a:rPr lang="en-US" sz="1200" dirty="0" err="1">
-                <a:latin typeface="Times New Roman" panose="02020603050405020304" pitchFamily="18" charset="0"/>
-                <a:cs typeface="Times New Roman" panose="02020603050405020304" pitchFamily="18" charset="0"/>
-              </a:rPr>
-              <a:t>i</a:t>
-            </a:r>
-            <a:r>
-              <a:rPr lang="en-US" sz="1200" dirty="0">
-                <a:latin typeface="Times New Roman" panose="02020603050405020304" pitchFamily="18" charset="0"/>
-                <a:cs typeface="Times New Roman" panose="02020603050405020304" pitchFamily="18" charset="0"/>
-              </a:rPr>
-              <a:t>, m, or x options within parentheses.</a:t>
-            </a:r>
-          </a:p>
-          <a:p>
-            <a:r>
-              <a:rPr lang="en-US" sz="1200" dirty="0">
-                <a:latin typeface="Times New Roman" panose="02020603050405020304" pitchFamily="18" charset="0"/>
-                <a:cs typeface="Times New Roman" panose="02020603050405020304" pitchFamily="18" charset="0"/>
-              </a:rPr>
-              <a:t>(?-</a:t>
-            </a:r>
-            <a:r>
-              <a:rPr lang="en-US" sz="1200" dirty="0" err="1">
-                <a:latin typeface="Times New Roman" panose="02020603050405020304" pitchFamily="18" charset="0"/>
-                <a:cs typeface="Times New Roman" panose="02020603050405020304" pitchFamily="18" charset="0"/>
-              </a:rPr>
-              <a:t>imx</a:t>
-            </a:r>
-            <a:r>
-              <a:rPr lang="en-US" sz="1200" dirty="0">
-                <a:latin typeface="Times New Roman" panose="02020603050405020304" pitchFamily="18" charset="0"/>
-                <a:cs typeface="Times New Roman" panose="02020603050405020304" pitchFamily="18" charset="0"/>
-              </a:rPr>
-              <a:t>: re)	Temporarily toggles off </a:t>
-            </a:r>
-            <a:r>
-              <a:rPr lang="en-US" sz="1200" dirty="0" err="1">
-                <a:latin typeface="Times New Roman" panose="02020603050405020304" pitchFamily="18" charset="0"/>
-                <a:cs typeface="Times New Roman" panose="02020603050405020304" pitchFamily="18" charset="0"/>
-              </a:rPr>
-              <a:t>i</a:t>
-            </a:r>
-            <a:r>
-              <a:rPr lang="en-US" sz="1200" dirty="0">
-                <a:latin typeface="Times New Roman" panose="02020603050405020304" pitchFamily="18" charset="0"/>
-                <a:cs typeface="Times New Roman" panose="02020603050405020304" pitchFamily="18" charset="0"/>
-              </a:rPr>
-              <a:t>, m, or x options within parentheses.</a:t>
-            </a:r>
-          </a:p>
-          <a:p>
-            <a:r>
-              <a:rPr lang="en-US" sz="1200" dirty="0">
-                <a:latin typeface="Times New Roman" panose="02020603050405020304" pitchFamily="18" charset="0"/>
-                <a:cs typeface="Times New Roman" panose="02020603050405020304" pitchFamily="18" charset="0"/>
-              </a:rPr>
-              <a:t>(?#...)	</a:t>
-            </a:r>
-            <a:r>
-              <a:rPr lang="en-US" sz="1200" dirty="0" smtClean="0">
-                <a:latin typeface="Times New Roman" panose="02020603050405020304" pitchFamily="18" charset="0"/>
-                <a:cs typeface="Times New Roman" panose="02020603050405020304" pitchFamily="18" charset="0"/>
-              </a:rPr>
-              <a:t>Comment</a:t>
-            </a:r>
-            <a:r>
-              <a:rPr lang="en-US" sz="1200" dirty="0">
+              <a:rPr lang="en-US" sz="2000" dirty="0">
+                <a:latin typeface="Times New Roman" panose="02020603050405020304" pitchFamily="18" charset="0"/>
+                <a:cs typeface="Times New Roman" panose="02020603050405020304" pitchFamily="18" charset="0"/>
+              </a:rPr>
+              <a:t>re{ n}	Matches exactly n number of occurrences of preceding expression</a:t>
+            </a:r>
+            <a:r>
+              <a:rPr lang="en-US" sz="2000" dirty="0" smtClean="0">
                 <a:latin typeface="Times New Roman" panose="02020603050405020304" pitchFamily="18" charset="0"/>
                 <a:cs typeface="Times New Roman" panose="02020603050405020304" pitchFamily="18" charset="0"/>
               </a:rPr>
               <a:t>.</a:t>
             </a:r>
+            <a:endParaRPr lang="en-US" sz="2000" dirty="0">
+              <a:latin typeface="Times New Roman" panose="02020603050405020304" pitchFamily="18" charset="0"/>
+              <a:cs typeface="Times New Roman" panose="02020603050405020304" pitchFamily="18" charset="0"/>
+            </a:endParaRPr>
           </a:p>
         </p:txBody>
       </p:sp>
@@ -11823,16 +11335,9 @@
             <p:ph type="title"/>
           </p:nvPr>
         </p:nvSpPr>
-        <p:spPr>
-          <a:xfrm>
-            <a:off x="750013" y="123683"/>
-            <a:ext cx="10515600" cy="677702"/>
-          </a:xfrm>
-        </p:spPr>
+        <p:spPr/>
         <p:txBody>
-          <a:bodyPr>
-            <a:normAutofit fontScale="90000"/>
-          </a:bodyPr>
+          <a:bodyPr/>
           <a:lstStyle/>
           <a:p>
             <a:r>
@@ -11841,6 +11346,9 @@
               </a:rPr>
               <a:t>Regular Expression Patterns</a:t>
             </a:r>
+            <a:endParaRPr lang="en-US" dirty="0">
+              <a:latin typeface="+mn-lt"/>
+            </a:endParaRPr>
           </a:p>
         </p:txBody>
       </p:sp>
@@ -11854,269 +11362,257 @@
             <p:ph idx="1"/>
           </p:nvPr>
         </p:nvSpPr>
-        <p:spPr>
-          <a:xfrm>
-            <a:off x="750013" y="1012004"/>
-            <a:ext cx="10931704" cy="5352837"/>
-          </a:xfrm>
-        </p:spPr>
+        <p:spPr/>
         <p:txBody>
           <a:bodyPr>
-            <a:noAutofit/>
+            <a:normAutofit fontScale="70000" lnSpcReduction="20000"/>
           </a:bodyPr>
           <a:lstStyle/>
           <a:p>
-            <a:r>
-              <a:rPr lang="en-US" sz="1400" dirty="0">
-                <a:latin typeface="Times New Roman" panose="02020603050405020304" pitchFamily="18" charset="0"/>
-                <a:cs typeface="Times New Roman" panose="02020603050405020304" pitchFamily="18" charset="0"/>
-              </a:rPr>
-              <a:t>(?= re)		Specifies position using a pattern. Doesn't have a range.</a:t>
-            </a:r>
-          </a:p>
-          <a:p>
-            <a:r>
-              <a:rPr lang="en-US" sz="1400" dirty="0">
-                <a:latin typeface="Times New Roman" panose="02020603050405020304" pitchFamily="18" charset="0"/>
-                <a:cs typeface="Times New Roman" panose="02020603050405020304" pitchFamily="18" charset="0"/>
-              </a:rPr>
-              <a:t>(?! re)		Specifies position using pattern negation. Doesn't have a range.</a:t>
-            </a:r>
-          </a:p>
-          <a:p>
-            <a:r>
-              <a:rPr lang="en-US" sz="1400" dirty="0">
-                <a:latin typeface="Times New Roman" panose="02020603050405020304" pitchFamily="18" charset="0"/>
-                <a:cs typeface="Times New Roman" panose="02020603050405020304" pitchFamily="18" charset="0"/>
-              </a:rPr>
-              <a:t>(?&gt; re)		Matches independent pattern without backtracking.</a:t>
-            </a:r>
-          </a:p>
-          <a:p>
-            <a:r>
-              <a:rPr lang="en-US" sz="1400" dirty="0">
-                <a:latin typeface="Times New Roman" panose="02020603050405020304" pitchFamily="18" charset="0"/>
-                <a:cs typeface="Times New Roman" panose="02020603050405020304" pitchFamily="18" charset="0"/>
-              </a:rPr>
-              <a:t>\w		Matches word characters.</a:t>
-            </a:r>
-          </a:p>
-          <a:p>
-            <a:r>
-              <a:rPr lang="en-US" sz="1400" dirty="0">
-                <a:latin typeface="Times New Roman" panose="02020603050405020304" pitchFamily="18" charset="0"/>
-                <a:cs typeface="Times New Roman" panose="02020603050405020304" pitchFamily="18" charset="0"/>
-              </a:rPr>
-              <a:t>\W		Matches </a:t>
-            </a:r>
-            <a:r>
-              <a:rPr lang="en-US" sz="1400" dirty="0" err="1">
-                <a:latin typeface="Times New Roman" panose="02020603050405020304" pitchFamily="18" charset="0"/>
-                <a:cs typeface="Times New Roman" panose="02020603050405020304" pitchFamily="18" charset="0"/>
-              </a:rPr>
-              <a:t>nonword</a:t>
-            </a:r>
-            <a:r>
-              <a:rPr lang="en-US" sz="1400" dirty="0">
-                <a:latin typeface="Times New Roman" panose="02020603050405020304" pitchFamily="18" charset="0"/>
-                <a:cs typeface="Times New Roman" panose="02020603050405020304" pitchFamily="18" charset="0"/>
-              </a:rPr>
-              <a:t> characters.</a:t>
-            </a:r>
-          </a:p>
-          <a:p>
-            <a:r>
-              <a:rPr lang="en-US" sz="1400" dirty="0">
-                <a:latin typeface="Times New Roman" panose="02020603050405020304" pitchFamily="18" charset="0"/>
-                <a:cs typeface="Times New Roman" panose="02020603050405020304" pitchFamily="18" charset="0"/>
-              </a:rPr>
-              <a:t>\s		Matches whitespace. Equivalent to [\t\n\r\f].</a:t>
-            </a:r>
-          </a:p>
-          <a:p>
-            <a:r>
-              <a:rPr lang="en-US" sz="1400" dirty="0">
-                <a:latin typeface="Times New Roman" panose="02020603050405020304" pitchFamily="18" charset="0"/>
-                <a:cs typeface="Times New Roman" panose="02020603050405020304" pitchFamily="18" charset="0"/>
-              </a:rPr>
-              <a:t>\S		Matches </a:t>
-            </a:r>
-            <a:r>
-              <a:rPr lang="en-US" sz="1400" dirty="0" err="1">
-                <a:latin typeface="Times New Roman" panose="02020603050405020304" pitchFamily="18" charset="0"/>
-                <a:cs typeface="Times New Roman" panose="02020603050405020304" pitchFamily="18" charset="0"/>
-              </a:rPr>
-              <a:t>nonwhitespace</a:t>
-            </a:r>
-            <a:r>
-              <a:rPr lang="en-US" sz="1400" dirty="0">
-                <a:latin typeface="Times New Roman" panose="02020603050405020304" pitchFamily="18" charset="0"/>
-                <a:cs typeface="Times New Roman" panose="02020603050405020304" pitchFamily="18" charset="0"/>
-              </a:rPr>
-              <a:t>.</a:t>
-            </a:r>
-          </a:p>
-          <a:p>
-            <a:r>
-              <a:rPr lang="en-US" sz="1400" dirty="0">
-                <a:latin typeface="Times New Roman" panose="02020603050405020304" pitchFamily="18" charset="0"/>
-                <a:cs typeface="Times New Roman" panose="02020603050405020304" pitchFamily="18" charset="0"/>
-              </a:rPr>
-              <a:t>\d		Matches digits. Equivalent to [0-9].</a:t>
-            </a:r>
-          </a:p>
-          <a:p>
-            <a:r>
-              <a:rPr lang="en-US" sz="1400" dirty="0">
-                <a:latin typeface="Times New Roman" panose="02020603050405020304" pitchFamily="18" charset="0"/>
-                <a:cs typeface="Times New Roman" panose="02020603050405020304" pitchFamily="18" charset="0"/>
-              </a:rPr>
-              <a:t>\D		Matches </a:t>
-            </a:r>
-            <a:r>
-              <a:rPr lang="en-US" sz="1400" dirty="0" err="1">
-                <a:latin typeface="Times New Roman" panose="02020603050405020304" pitchFamily="18" charset="0"/>
-                <a:cs typeface="Times New Roman" panose="02020603050405020304" pitchFamily="18" charset="0"/>
-              </a:rPr>
-              <a:t>nondigits</a:t>
-            </a:r>
-            <a:r>
-              <a:rPr lang="en-US" sz="1400" dirty="0">
-                <a:latin typeface="Times New Roman" panose="02020603050405020304" pitchFamily="18" charset="0"/>
-                <a:cs typeface="Times New Roman" panose="02020603050405020304" pitchFamily="18" charset="0"/>
-              </a:rPr>
-              <a:t>.</a:t>
-            </a:r>
-          </a:p>
-          <a:p>
-            <a:r>
-              <a:rPr lang="en-US" sz="1400" dirty="0">
-                <a:latin typeface="Times New Roman" panose="02020603050405020304" pitchFamily="18" charset="0"/>
-                <a:cs typeface="Times New Roman" panose="02020603050405020304" pitchFamily="18" charset="0"/>
-              </a:rPr>
-              <a:t>\A		Matches beginning of string.</a:t>
-            </a:r>
-          </a:p>
-          <a:p>
-            <a:r>
-              <a:rPr lang="en-US" sz="1400" dirty="0">
-                <a:latin typeface="Times New Roman" panose="02020603050405020304" pitchFamily="18" charset="0"/>
-                <a:cs typeface="Times New Roman" panose="02020603050405020304" pitchFamily="18" charset="0"/>
-              </a:rPr>
-              <a:t>\Z		Matches end of string. If a newline exists, it matches just before newline.</a:t>
-            </a:r>
-          </a:p>
-          <a:p>
-            <a:r>
-              <a:rPr lang="en-US" sz="1400" dirty="0">
-                <a:latin typeface="Times New Roman" panose="02020603050405020304" pitchFamily="18" charset="0"/>
-                <a:cs typeface="Times New Roman" panose="02020603050405020304" pitchFamily="18" charset="0"/>
-              </a:rPr>
-              <a:t>\z		Matches end of string.</a:t>
-            </a:r>
-          </a:p>
-          <a:p>
-            <a:r>
-              <a:rPr lang="en-US" sz="1400" dirty="0">
-                <a:latin typeface="Times New Roman" panose="02020603050405020304" pitchFamily="18" charset="0"/>
-                <a:cs typeface="Times New Roman" panose="02020603050405020304" pitchFamily="18" charset="0"/>
-              </a:rPr>
-              <a:t>\G		Matches point where last match finished.</a:t>
-            </a:r>
-          </a:p>
-          <a:p>
-            <a:r>
-              <a:rPr lang="en-US" sz="1400" dirty="0">
-                <a:latin typeface="Times New Roman" panose="02020603050405020304" pitchFamily="18" charset="0"/>
-                <a:cs typeface="Times New Roman" panose="02020603050405020304" pitchFamily="18" charset="0"/>
-              </a:rPr>
-              <a:t>\b		Matches word boundaries when outside brackets. Matches backspace (0x08) when inside brackets.</a:t>
-            </a:r>
-          </a:p>
-          <a:p>
-            <a:r>
-              <a:rPr lang="en-US" sz="1400" dirty="0">
-                <a:latin typeface="Times New Roman" panose="02020603050405020304" pitchFamily="18" charset="0"/>
-                <a:cs typeface="Times New Roman" panose="02020603050405020304" pitchFamily="18" charset="0"/>
-              </a:rPr>
-              <a:t>\B		Matches </a:t>
-            </a:r>
-            <a:r>
-              <a:rPr lang="en-US" sz="1400" dirty="0" err="1">
-                <a:latin typeface="Times New Roman" panose="02020603050405020304" pitchFamily="18" charset="0"/>
-                <a:cs typeface="Times New Roman" panose="02020603050405020304" pitchFamily="18" charset="0"/>
-              </a:rPr>
-              <a:t>nonword</a:t>
-            </a:r>
-            <a:r>
-              <a:rPr lang="en-US" sz="1400" dirty="0">
-                <a:latin typeface="Times New Roman" panose="02020603050405020304" pitchFamily="18" charset="0"/>
-                <a:cs typeface="Times New Roman" panose="02020603050405020304" pitchFamily="18" charset="0"/>
-              </a:rPr>
-              <a:t> boundaries.</a:t>
-            </a:r>
-          </a:p>
-          <a:p>
-            <a:r>
-              <a:rPr lang="en-US" sz="1400" dirty="0">
-                <a:latin typeface="Times New Roman" panose="02020603050405020304" pitchFamily="18" charset="0"/>
-                <a:cs typeface="Times New Roman" panose="02020603050405020304" pitchFamily="18" charset="0"/>
-              </a:rPr>
-              <a:t>\n, \t, etc.	Matches newlines, carriage returns, tabs, etc.</a:t>
-            </a:r>
-          </a:p>
-          <a:p>
-            <a:r>
-              <a:rPr lang="en-US" sz="1400" dirty="0">
-                <a:latin typeface="Times New Roman" panose="02020603050405020304" pitchFamily="18" charset="0"/>
-                <a:cs typeface="Times New Roman" panose="02020603050405020304" pitchFamily="18" charset="0"/>
-              </a:rPr>
-              <a:t>\1...\9		</a:t>
-            </a:r>
-            <a:r>
-              <a:rPr lang="en-US" sz="1400" dirty="0" smtClean="0">
-                <a:latin typeface="Times New Roman" panose="02020603050405020304" pitchFamily="18" charset="0"/>
-                <a:cs typeface="Times New Roman" panose="02020603050405020304" pitchFamily="18" charset="0"/>
-              </a:rPr>
-              <a:t>Matches </a:t>
-            </a:r>
-            <a:r>
-              <a:rPr lang="en-US" sz="1400" dirty="0">
-                <a:latin typeface="Times New Roman" panose="02020603050405020304" pitchFamily="18" charset="0"/>
-                <a:cs typeface="Times New Roman" panose="02020603050405020304" pitchFamily="18" charset="0"/>
-              </a:rPr>
-              <a:t>nth grouped subexpression.</a:t>
-            </a:r>
-          </a:p>
-          <a:p>
-            <a:r>
-              <a:rPr lang="en-US" sz="1400" dirty="0">
-                <a:latin typeface="Times New Roman" panose="02020603050405020304" pitchFamily="18" charset="0"/>
-                <a:cs typeface="Times New Roman" panose="02020603050405020304" pitchFamily="18" charset="0"/>
-              </a:rPr>
-              <a:t>\10		</a:t>
-            </a:r>
-            <a:r>
-              <a:rPr lang="en-US" sz="1400" dirty="0" smtClean="0">
-                <a:latin typeface="Times New Roman" panose="02020603050405020304" pitchFamily="18" charset="0"/>
-                <a:cs typeface="Times New Roman" panose="02020603050405020304" pitchFamily="18" charset="0"/>
-              </a:rPr>
-              <a:t>Matches </a:t>
-            </a:r>
-            <a:r>
-              <a:rPr lang="en-US" sz="1400" dirty="0">
-                <a:latin typeface="Times New Roman" panose="02020603050405020304" pitchFamily="18" charset="0"/>
-                <a:cs typeface="Times New Roman" panose="02020603050405020304" pitchFamily="18" charset="0"/>
-              </a:rPr>
-              <a:t>nth grouped subexpression if it matched already. Otherwise refers to the octal representation of a character code.</a:t>
-            </a:r>
+            <a:endParaRPr lang="en-US" dirty="0">
+              <a:latin typeface="Times New Roman" panose="02020603050405020304" pitchFamily="18" charset="0"/>
+              <a:cs typeface="Times New Roman" panose="02020603050405020304" pitchFamily="18" charset="0"/>
+            </a:endParaRPr>
+          </a:p>
+          <a:p>
+            <a:r>
+              <a:rPr lang="en-US" dirty="0">
+                <a:latin typeface="Times New Roman" panose="02020603050405020304" pitchFamily="18" charset="0"/>
+                <a:cs typeface="Times New Roman" panose="02020603050405020304" pitchFamily="18" charset="0"/>
+              </a:rPr>
+              <a:t>re{ n,}	Matches n or more occurrences of preceding expression.</a:t>
+            </a:r>
+          </a:p>
+          <a:p>
+            <a:r>
+              <a:rPr lang="en-US" dirty="0">
+                <a:latin typeface="Times New Roman" panose="02020603050405020304" pitchFamily="18" charset="0"/>
+                <a:cs typeface="Times New Roman" panose="02020603050405020304" pitchFamily="18" charset="0"/>
+              </a:rPr>
+              <a:t>re{ n, m}	Matches at least n and at most m occurrences of preceding expression.</a:t>
+            </a:r>
+          </a:p>
+          <a:p>
+            <a:r>
+              <a:rPr lang="en-US" dirty="0">
+                <a:latin typeface="Times New Roman" panose="02020603050405020304" pitchFamily="18" charset="0"/>
+                <a:cs typeface="Times New Roman" panose="02020603050405020304" pitchFamily="18" charset="0"/>
+              </a:rPr>
+              <a:t>a| b	</a:t>
+            </a:r>
+            <a:r>
+              <a:rPr lang="en-US" dirty="0" smtClean="0">
+                <a:latin typeface="Times New Roman" panose="02020603050405020304" pitchFamily="18" charset="0"/>
+                <a:cs typeface="Times New Roman" panose="02020603050405020304" pitchFamily="18" charset="0"/>
+              </a:rPr>
+              <a:t>	Matches </a:t>
+            </a:r>
+            <a:r>
+              <a:rPr lang="en-US" dirty="0">
+                <a:latin typeface="Times New Roman" panose="02020603050405020304" pitchFamily="18" charset="0"/>
+                <a:cs typeface="Times New Roman" panose="02020603050405020304" pitchFamily="18" charset="0"/>
+              </a:rPr>
+              <a:t>either a or b.</a:t>
+            </a:r>
+          </a:p>
+          <a:p>
+            <a:r>
+              <a:rPr lang="en-US" dirty="0">
+                <a:latin typeface="Times New Roman" panose="02020603050405020304" pitchFamily="18" charset="0"/>
+                <a:cs typeface="Times New Roman" panose="02020603050405020304" pitchFamily="18" charset="0"/>
+              </a:rPr>
+              <a:t>(re)	</a:t>
+            </a:r>
+            <a:r>
+              <a:rPr lang="en-US" dirty="0" smtClean="0">
+                <a:latin typeface="Times New Roman" panose="02020603050405020304" pitchFamily="18" charset="0"/>
+                <a:cs typeface="Times New Roman" panose="02020603050405020304" pitchFamily="18" charset="0"/>
+              </a:rPr>
+              <a:t>	Groups </a:t>
+            </a:r>
+            <a:r>
+              <a:rPr lang="en-US" dirty="0">
+                <a:latin typeface="Times New Roman" panose="02020603050405020304" pitchFamily="18" charset="0"/>
+                <a:cs typeface="Times New Roman" panose="02020603050405020304" pitchFamily="18" charset="0"/>
+              </a:rPr>
+              <a:t>regular expressions and remembers matched text.</a:t>
+            </a:r>
+          </a:p>
+          <a:p>
+            <a:r>
+              <a:rPr lang="en-US" dirty="0">
+                <a:latin typeface="Times New Roman" panose="02020603050405020304" pitchFamily="18" charset="0"/>
+                <a:cs typeface="Times New Roman" panose="02020603050405020304" pitchFamily="18" charset="0"/>
+              </a:rPr>
+              <a:t>(?</a:t>
+            </a:r>
+            <a:r>
+              <a:rPr lang="en-US" dirty="0" err="1">
+                <a:latin typeface="Times New Roman" panose="02020603050405020304" pitchFamily="18" charset="0"/>
+                <a:cs typeface="Times New Roman" panose="02020603050405020304" pitchFamily="18" charset="0"/>
+              </a:rPr>
+              <a:t>imx</a:t>
+            </a:r>
+            <a:r>
+              <a:rPr lang="en-US" dirty="0">
+                <a:latin typeface="Times New Roman" panose="02020603050405020304" pitchFamily="18" charset="0"/>
+                <a:cs typeface="Times New Roman" panose="02020603050405020304" pitchFamily="18" charset="0"/>
+              </a:rPr>
+              <a:t>)  	Temporarily toggles on </a:t>
+            </a:r>
+            <a:r>
+              <a:rPr lang="en-US" dirty="0" err="1">
+                <a:latin typeface="Times New Roman" panose="02020603050405020304" pitchFamily="18" charset="0"/>
+                <a:cs typeface="Times New Roman" panose="02020603050405020304" pitchFamily="18" charset="0"/>
+              </a:rPr>
+              <a:t>i</a:t>
+            </a:r>
+            <a:r>
+              <a:rPr lang="en-US" dirty="0">
+                <a:latin typeface="Times New Roman" panose="02020603050405020304" pitchFamily="18" charset="0"/>
+                <a:cs typeface="Times New Roman" panose="02020603050405020304" pitchFamily="18" charset="0"/>
+              </a:rPr>
+              <a:t>, m, or x options within a regular expression. If in parentheses, only that area is affected.</a:t>
+            </a:r>
+          </a:p>
+          <a:p>
+            <a:r>
+              <a:rPr lang="en-US" dirty="0">
+                <a:latin typeface="Times New Roman" panose="02020603050405020304" pitchFamily="18" charset="0"/>
+                <a:cs typeface="Times New Roman" panose="02020603050405020304" pitchFamily="18" charset="0"/>
+              </a:rPr>
+              <a:t>(?-</a:t>
+            </a:r>
+            <a:r>
+              <a:rPr lang="en-US" dirty="0" err="1">
+                <a:latin typeface="Times New Roman" panose="02020603050405020304" pitchFamily="18" charset="0"/>
+                <a:cs typeface="Times New Roman" panose="02020603050405020304" pitchFamily="18" charset="0"/>
+              </a:rPr>
+              <a:t>imx</a:t>
+            </a:r>
+            <a:r>
+              <a:rPr lang="en-US" dirty="0">
+                <a:latin typeface="Times New Roman" panose="02020603050405020304" pitchFamily="18" charset="0"/>
+                <a:cs typeface="Times New Roman" panose="02020603050405020304" pitchFamily="18" charset="0"/>
+              </a:rPr>
+              <a:t>) 	Temporarily toggles off </a:t>
+            </a:r>
+            <a:r>
+              <a:rPr lang="en-US" dirty="0" err="1">
+                <a:latin typeface="Times New Roman" panose="02020603050405020304" pitchFamily="18" charset="0"/>
+                <a:cs typeface="Times New Roman" panose="02020603050405020304" pitchFamily="18" charset="0"/>
+              </a:rPr>
+              <a:t>i</a:t>
+            </a:r>
+            <a:r>
+              <a:rPr lang="en-US" dirty="0">
+                <a:latin typeface="Times New Roman" panose="02020603050405020304" pitchFamily="18" charset="0"/>
+                <a:cs typeface="Times New Roman" panose="02020603050405020304" pitchFamily="18" charset="0"/>
+              </a:rPr>
+              <a:t>, m, or x options within a regular expression. If in parentheses, only that area is affected.</a:t>
+            </a:r>
+          </a:p>
+          <a:p>
+            <a:r>
+              <a:rPr lang="en-US" dirty="0">
+                <a:latin typeface="Times New Roman" panose="02020603050405020304" pitchFamily="18" charset="0"/>
+                <a:cs typeface="Times New Roman" panose="02020603050405020304" pitchFamily="18" charset="0"/>
+              </a:rPr>
+              <a:t>(?: re) 	Groups regular expressions without remembering matched text.</a:t>
+            </a:r>
+          </a:p>
+          <a:p>
+            <a:r>
+              <a:rPr lang="en-US" dirty="0">
+                <a:latin typeface="Times New Roman" panose="02020603050405020304" pitchFamily="18" charset="0"/>
+                <a:cs typeface="Times New Roman" panose="02020603050405020304" pitchFamily="18" charset="0"/>
+              </a:rPr>
+              <a:t>(?</a:t>
+            </a:r>
+            <a:r>
+              <a:rPr lang="en-US" dirty="0" err="1">
+                <a:latin typeface="Times New Roman" panose="02020603050405020304" pitchFamily="18" charset="0"/>
+                <a:cs typeface="Times New Roman" panose="02020603050405020304" pitchFamily="18" charset="0"/>
+              </a:rPr>
+              <a:t>imx</a:t>
+            </a:r>
+            <a:r>
+              <a:rPr lang="en-US" dirty="0">
+                <a:latin typeface="Times New Roman" panose="02020603050405020304" pitchFamily="18" charset="0"/>
+                <a:cs typeface="Times New Roman" panose="02020603050405020304" pitchFamily="18" charset="0"/>
+              </a:rPr>
+              <a:t>: re)	Temporarily toggles on </a:t>
+            </a:r>
+            <a:r>
+              <a:rPr lang="en-US" dirty="0" err="1">
+                <a:latin typeface="Times New Roman" panose="02020603050405020304" pitchFamily="18" charset="0"/>
+                <a:cs typeface="Times New Roman" panose="02020603050405020304" pitchFamily="18" charset="0"/>
+              </a:rPr>
+              <a:t>i</a:t>
+            </a:r>
+            <a:r>
+              <a:rPr lang="en-US" dirty="0">
+                <a:latin typeface="Times New Roman" panose="02020603050405020304" pitchFamily="18" charset="0"/>
+                <a:cs typeface="Times New Roman" panose="02020603050405020304" pitchFamily="18" charset="0"/>
+              </a:rPr>
+              <a:t>, m, or x options within parentheses.</a:t>
+            </a:r>
+          </a:p>
+          <a:p>
+            <a:r>
+              <a:rPr lang="en-US" dirty="0">
+                <a:latin typeface="Times New Roman" panose="02020603050405020304" pitchFamily="18" charset="0"/>
+                <a:cs typeface="Times New Roman" panose="02020603050405020304" pitchFamily="18" charset="0"/>
+              </a:rPr>
+              <a:t>(?-</a:t>
+            </a:r>
+            <a:r>
+              <a:rPr lang="en-US" dirty="0" err="1">
+                <a:latin typeface="Times New Roman" panose="02020603050405020304" pitchFamily="18" charset="0"/>
+                <a:cs typeface="Times New Roman" panose="02020603050405020304" pitchFamily="18" charset="0"/>
+              </a:rPr>
+              <a:t>imx</a:t>
+            </a:r>
+            <a:r>
+              <a:rPr lang="en-US" dirty="0">
+                <a:latin typeface="Times New Roman" panose="02020603050405020304" pitchFamily="18" charset="0"/>
+                <a:cs typeface="Times New Roman" panose="02020603050405020304" pitchFamily="18" charset="0"/>
+              </a:rPr>
+              <a:t>: re)	Temporarily toggles off </a:t>
+            </a:r>
+            <a:r>
+              <a:rPr lang="en-US" dirty="0" err="1">
+                <a:latin typeface="Times New Roman" panose="02020603050405020304" pitchFamily="18" charset="0"/>
+                <a:cs typeface="Times New Roman" panose="02020603050405020304" pitchFamily="18" charset="0"/>
+              </a:rPr>
+              <a:t>i</a:t>
+            </a:r>
+            <a:r>
+              <a:rPr lang="en-US" dirty="0">
+                <a:latin typeface="Times New Roman" panose="02020603050405020304" pitchFamily="18" charset="0"/>
+                <a:cs typeface="Times New Roman" panose="02020603050405020304" pitchFamily="18" charset="0"/>
+              </a:rPr>
+              <a:t>, m, or x options within parentheses.</a:t>
+            </a:r>
+          </a:p>
+          <a:p>
+            <a:r>
+              <a:rPr lang="en-US" dirty="0">
+                <a:latin typeface="Times New Roman" panose="02020603050405020304" pitchFamily="18" charset="0"/>
+                <a:cs typeface="Times New Roman" panose="02020603050405020304" pitchFamily="18" charset="0"/>
+              </a:rPr>
+              <a:t>(?#...)	Comment.</a:t>
+            </a:r>
+          </a:p>
+          <a:p>
+            <a:endParaRPr lang="en-US" dirty="0"/>
           </a:p>
         </p:txBody>
       </p:sp>
     </p:spTree>
     <p:extLst>
       <p:ext uri="{BB962C8B-B14F-4D97-AF65-F5344CB8AC3E}">
-        <p14:creationId xmlns:p14="http://schemas.microsoft.com/office/powerpoint/2010/main" val="2732354619"/>
+        <p14:creationId xmlns:p14="http://schemas.microsoft.com/office/powerpoint/2010/main" val="3900006992"/>
       </p:ext>
     </p:extLst>
   </p:cSld>
@@ -12153,6 +11649,420 @@
             <p:ph type="title"/>
           </p:nvPr>
         </p:nvSpPr>
+        <p:spPr>
+          <a:xfrm>
+            <a:off x="891283" y="714446"/>
+            <a:ext cx="10515600" cy="677702"/>
+          </a:xfrm>
+        </p:spPr>
+        <p:txBody>
+          <a:bodyPr>
+            <a:normAutofit fontScale="90000"/>
+          </a:bodyPr>
+          <a:lstStyle/>
+          <a:p>
+            <a:r>
+              <a:rPr lang="en-US" dirty="0">
+                <a:latin typeface="+mn-lt"/>
+              </a:rPr>
+              <a:t>Regular Expression Patterns</a:t>
+            </a:r>
+          </a:p>
+        </p:txBody>
+      </p:sp>
+      <p:sp>
+        <p:nvSpPr>
+          <p:cNvPr id="3" name="Content Placeholder 2"/>
+          <p:cNvSpPr>
+            <a:spLocks noGrp="1"/>
+          </p:cNvSpPr>
+          <p:nvPr>
+            <p:ph idx="1"/>
+          </p:nvPr>
+        </p:nvSpPr>
+        <p:spPr>
+          <a:xfrm>
+            <a:off x="891283" y="1762017"/>
+            <a:ext cx="10931704" cy="4669605"/>
+          </a:xfrm>
+        </p:spPr>
+        <p:txBody>
+          <a:bodyPr>
+            <a:noAutofit/>
+          </a:bodyPr>
+          <a:lstStyle/>
+          <a:p>
+            <a:r>
+              <a:rPr lang="en-US" sz="2000" dirty="0">
+                <a:latin typeface="Times New Roman" panose="02020603050405020304" pitchFamily="18" charset="0"/>
+                <a:cs typeface="Times New Roman" panose="02020603050405020304" pitchFamily="18" charset="0"/>
+              </a:rPr>
+              <a:t>(?= re)		Specifies position using a pattern. Doesn't have a range.</a:t>
+            </a:r>
+          </a:p>
+          <a:p>
+            <a:r>
+              <a:rPr lang="en-US" sz="2000" dirty="0">
+                <a:latin typeface="Times New Roman" panose="02020603050405020304" pitchFamily="18" charset="0"/>
+                <a:cs typeface="Times New Roman" panose="02020603050405020304" pitchFamily="18" charset="0"/>
+              </a:rPr>
+              <a:t>(?! re)		Specifies position using pattern negation. Doesn't have a range.</a:t>
+            </a:r>
+          </a:p>
+          <a:p>
+            <a:r>
+              <a:rPr lang="en-US" sz="2000" dirty="0">
+                <a:latin typeface="Times New Roman" panose="02020603050405020304" pitchFamily="18" charset="0"/>
+                <a:cs typeface="Times New Roman" panose="02020603050405020304" pitchFamily="18" charset="0"/>
+              </a:rPr>
+              <a:t>(?&gt; re)		Matches independent pattern without backtracking.</a:t>
+            </a:r>
+          </a:p>
+          <a:p>
+            <a:r>
+              <a:rPr lang="en-US" sz="2000" dirty="0">
+                <a:latin typeface="Times New Roman" panose="02020603050405020304" pitchFamily="18" charset="0"/>
+                <a:cs typeface="Times New Roman" panose="02020603050405020304" pitchFamily="18" charset="0"/>
+              </a:rPr>
+              <a:t>\w		Matches word characters.</a:t>
+            </a:r>
+          </a:p>
+          <a:p>
+            <a:r>
+              <a:rPr lang="en-US" sz="2000" dirty="0">
+                <a:latin typeface="Times New Roman" panose="02020603050405020304" pitchFamily="18" charset="0"/>
+                <a:cs typeface="Times New Roman" panose="02020603050405020304" pitchFamily="18" charset="0"/>
+              </a:rPr>
+              <a:t>\W		Matches </a:t>
+            </a:r>
+            <a:r>
+              <a:rPr lang="en-US" sz="2000" dirty="0" err="1">
+                <a:latin typeface="Times New Roman" panose="02020603050405020304" pitchFamily="18" charset="0"/>
+                <a:cs typeface="Times New Roman" panose="02020603050405020304" pitchFamily="18" charset="0"/>
+              </a:rPr>
+              <a:t>nonword</a:t>
+            </a:r>
+            <a:r>
+              <a:rPr lang="en-US" sz="2000" dirty="0">
+                <a:latin typeface="Times New Roman" panose="02020603050405020304" pitchFamily="18" charset="0"/>
+                <a:cs typeface="Times New Roman" panose="02020603050405020304" pitchFamily="18" charset="0"/>
+              </a:rPr>
+              <a:t> characters.</a:t>
+            </a:r>
+          </a:p>
+          <a:p>
+            <a:r>
+              <a:rPr lang="en-US" sz="2000" dirty="0">
+                <a:latin typeface="Times New Roman" panose="02020603050405020304" pitchFamily="18" charset="0"/>
+                <a:cs typeface="Times New Roman" panose="02020603050405020304" pitchFamily="18" charset="0"/>
+              </a:rPr>
+              <a:t>\s		Matches whitespace. Equivalent to [\t\n\r\f].</a:t>
+            </a:r>
+          </a:p>
+          <a:p>
+            <a:r>
+              <a:rPr lang="en-US" sz="2000" dirty="0">
+                <a:latin typeface="Times New Roman" panose="02020603050405020304" pitchFamily="18" charset="0"/>
+                <a:cs typeface="Times New Roman" panose="02020603050405020304" pitchFamily="18" charset="0"/>
+              </a:rPr>
+              <a:t>\S		Matches </a:t>
+            </a:r>
+            <a:r>
+              <a:rPr lang="en-US" sz="2000" dirty="0" err="1">
+                <a:latin typeface="Times New Roman" panose="02020603050405020304" pitchFamily="18" charset="0"/>
+                <a:cs typeface="Times New Roman" panose="02020603050405020304" pitchFamily="18" charset="0"/>
+              </a:rPr>
+              <a:t>nonwhitespace</a:t>
+            </a:r>
+            <a:r>
+              <a:rPr lang="en-US" sz="2000" dirty="0">
+                <a:latin typeface="Times New Roman" panose="02020603050405020304" pitchFamily="18" charset="0"/>
+                <a:cs typeface="Times New Roman" panose="02020603050405020304" pitchFamily="18" charset="0"/>
+              </a:rPr>
+              <a:t>.</a:t>
+            </a:r>
+          </a:p>
+          <a:p>
+            <a:r>
+              <a:rPr lang="en-US" sz="2000" dirty="0">
+                <a:latin typeface="Times New Roman" panose="02020603050405020304" pitchFamily="18" charset="0"/>
+                <a:cs typeface="Times New Roman" panose="02020603050405020304" pitchFamily="18" charset="0"/>
+              </a:rPr>
+              <a:t>\d		Matches digits. Equivalent to [0-9</a:t>
+            </a:r>
+            <a:r>
+              <a:rPr lang="en-US" sz="2000" dirty="0" smtClean="0">
+                <a:latin typeface="Times New Roman" panose="02020603050405020304" pitchFamily="18" charset="0"/>
+                <a:cs typeface="Times New Roman" panose="02020603050405020304" pitchFamily="18" charset="0"/>
+              </a:rPr>
+              <a:t>].</a:t>
+            </a:r>
+            <a:endParaRPr lang="en-US" sz="2000" dirty="0">
+              <a:latin typeface="Times New Roman" panose="02020603050405020304" pitchFamily="18" charset="0"/>
+              <a:cs typeface="Times New Roman" panose="02020603050405020304" pitchFamily="18" charset="0"/>
+            </a:endParaRPr>
+          </a:p>
+        </p:txBody>
+      </p:sp>
+    </p:spTree>
+    <p:extLst>
+      <p:ext uri="{BB962C8B-B14F-4D97-AF65-F5344CB8AC3E}">
+        <p14:creationId xmlns:p14="http://schemas.microsoft.com/office/powerpoint/2010/main" val="2732354619"/>
+      </p:ext>
+    </p:extLst>
+  </p:cSld>
+  <p:clrMapOvr>
+    <a:masterClrMapping/>
+  </p:clrMapOvr>
+</p:sld>
+</file>
+
+<file path=ppt/slides/slide34.xml><?xml version="1.0" encoding="utf-8"?>
+<p:sld xmlns:a="http://schemas.openxmlformats.org/drawingml/2006/main" xmlns:r="http://schemas.openxmlformats.org/officeDocument/2006/relationships" xmlns:p="http://schemas.openxmlformats.org/presentationml/2006/main">
+  <p:cSld>
+    <p:spTree>
+      <p:nvGrpSpPr>
+        <p:cNvPr id="1" name=""/>
+        <p:cNvGrpSpPr/>
+        <p:nvPr/>
+      </p:nvGrpSpPr>
+      <p:grpSpPr>
+        <a:xfrm>
+          <a:off x="0" y="0"/>
+          <a:ext cx="0" cy="0"/>
+          <a:chOff x="0" y="0"/>
+          <a:chExt cx="0" cy="0"/>
+        </a:xfrm>
+      </p:grpSpPr>
+      <p:sp>
+        <p:nvSpPr>
+          <p:cNvPr id="2" name="Title 1"/>
+          <p:cNvSpPr>
+            <a:spLocks noGrp="1"/>
+          </p:cNvSpPr>
+          <p:nvPr>
+            <p:ph type="title"/>
+          </p:nvPr>
+        </p:nvSpPr>
+        <p:spPr/>
+        <p:txBody>
+          <a:bodyPr/>
+          <a:lstStyle/>
+          <a:p>
+            <a:r>
+              <a:rPr lang="en-US" dirty="0">
+                <a:latin typeface="+mn-lt"/>
+              </a:rPr>
+              <a:t>Regular Expression Patterns</a:t>
+            </a:r>
+            <a:endParaRPr lang="en-US" dirty="0">
+              <a:latin typeface="+mn-lt"/>
+            </a:endParaRPr>
+          </a:p>
+        </p:txBody>
+      </p:sp>
+      <p:sp>
+        <p:nvSpPr>
+          <p:cNvPr id="3" name="Content Placeholder 2"/>
+          <p:cNvSpPr>
+            <a:spLocks noGrp="1"/>
+          </p:cNvSpPr>
+          <p:nvPr>
+            <p:ph idx="1"/>
+          </p:nvPr>
+        </p:nvSpPr>
+        <p:spPr/>
+        <p:txBody>
+          <a:bodyPr>
+            <a:normAutofit fontScale="70000" lnSpcReduction="20000"/>
+          </a:bodyPr>
+          <a:lstStyle/>
+          <a:p>
+            <a:endParaRPr lang="en-US" dirty="0">
+              <a:latin typeface="Times New Roman" panose="02020603050405020304" pitchFamily="18" charset="0"/>
+              <a:cs typeface="Times New Roman" panose="02020603050405020304" pitchFamily="18" charset="0"/>
+            </a:endParaRPr>
+          </a:p>
+          <a:p>
+            <a:r>
+              <a:rPr lang="en-US" dirty="0">
+                <a:latin typeface="Times New Roman" panose="02020603050405020304" pitchFamily="18" charset="0"/>
+                <a:cs typeface="Times New Roman" panose="02020603050405020304" pitchFamily="18" charset="0"/>
+              </a:rPr>
+              <a:t>\D		Matches </a:t>
+            </a:r>
+            <a:r>
+              <a:rPr lang="en-US" dirty="0" err="1">
+                <a:latin typeface="Times New Roman" panose="02020603050405020304" pitchFamily="18" charset="0"/>
+                <a:cs typeface="Times New Roman" panose="02020603050405020304" pitchFamily="18" charset="0"/>
+              </a:rPr>
+              <a:t>nondigits</a:t>
+            </a:r>
+            <a:r>
+              <a:rPr lang="en-US" dirty="0">
+                <a:latin typeface="Times New Roman" panose="02020603050405020304" pitchFamily="18" charset="0"/>
+                <a:cs typeface="Times New Roman" panose="02020603050405020304" pitchFamily="18" charset="0"/>
+              </a:rPr>
+              <a:t>.</a:t>
+            </a:r>
+          </a:p>
+          <a:p>
+            <a:r>
+              <a:rPr lang="en-US" dirty="0">
+                <a:latin typeface="Times New Roman" panose="02020603050405020304" pitchFamily="18" charset="0"/>
+                <a:cs typeface="Times New Roman" panose="02020603050405020304" pitchFamily="18" charset="0"/>
+              </a:rPr>
+              <a:t>\A		Matches beginning of string.</a:t>
+            </a:r>
+          </a:p>
+          <a:p>
+            <a:r>
+              <a:rPr lang="en-US" dirty="0">
+                <a:latin typeface="Times New Roman" panose="02020603050405020304" pitchFamily="18" charset="0"/>
+                <a:cs typeface="Times New Roman" panose="02020603050405020304" pitchFamily="18" charset="0"/>
+              </a:rPr>
+              <a:t>\Z		Matches end of string. If a newline exists, it matches just before newline.</a:t>
+            </a:r>
+          </a:p>
+          <a:p>
+            <a:r>
+              <a:rPr lang="en-US" dirty="0">
+                <a:latin typeface="Times New Roman" panose="02020603050405020304" pitchFamily="18" charset="0"/>
+                <a:cs typeface="Times New Roman" panose="02020603050405020304" pitchFamily="18" charset="0"/>
+              </a:rPr>
+              <a:t>\z		Matches end of string.</a:t>
+            </a:r>
+          </a:p>
+          <a:p>
+            <a:r>
+              <a:rPr lang="en-US" dirty="0">
+                <a:latin typeface="Times New Roman" panose="02020603050405020304" pitchFamily="18" charset="0"/>
+                <a:cs typeface="Times New Roman" panose="02020603050405020304" pitchFamily="18" charset="0"/>
+              </a:rPr>
+              <a:t>\G		Matches point where last match finished.</a:t>
+            </a:r>
+          </a:p>
+          <a:p>
+            <a:r>
+              <a:rPr lang="en-US" dirty="0">
+                <a:latin typeface="Times New Roman" panose="02020603050405020304" pitchFamily="18" charset="0"/>
+                <a:cs typeface="Times New Roman" panose="02020603050405020304" pitchFamily="18" charset="0"/>
+              </a:rPr>
+              <a:t>\b		Matches word boundaries when outside brackets. Matches backspace (0x08) when </a:t>
+            </a:r>
+            <a:r>
+              <a:rPr lang="en-US" dirty="0" smtClean="0">
+                <a:latin typeface="Times New Roman" panose="02020603050405020304" pitchFamily="18" charset="0"/>
+                <a:cs typeface="Times New Roman" panose="02020603050405020304" pitchFamily="18" charset="0"/>
+              </a:rPr>
+              <a:t>                  inside </a:t>
+            </a:r>
+            <a:r>
+              <a:rPr lang="en-US" dirty="0">
+                <a:latin typeface="Times New Roman" panose="02020603050405020304" pitchFamily="18" charset="0"/>
+                <a:cs typeface="Times New Roman" panose="02020603050405020304" pitchFamily="18" charset="0"/>
+              </a:rPr>
+              <a:t>brackets.</a:t>
+            </a:r>
+          </a:p>
+          <a:p>
+            <a:r>
+              <a:rPr lang="en-US" dirty="0">
+                <a:latin typeface="Times New Roman" panose="02020603050405020304" pitchFamily="18" charset="0"/>
+                <a:cs typeface="Times New Roman" panose="02020603050405020304" pitchFamily="18" charset="0"/>
+              </a:rPr>
+              <a:t>\B		Matches </a:t>
+            </a:r>
+            <a:r>
+              <a:rPr lang="en-US" dirty="0" err="1">
+                <a:latin typeface="Times New Roman" panose="02020603050405020304" pitchFamily="18" charset="0"/>
+                <a:cs typeface="Times New Roman" panose="02020603050405020304" pitchFamily="18" charset="0"/>
+              </a:rPr>
+              <a:t>nonword</a:t>
+            </a:r>
+            <a:r>
+              <a:rPr lang="en-US" dirty="0">
+                <a:latin typeface="Times New Roman" panose="02020603050405020304" pitchFamily="18" charset="0"/>
+                <a:cs typeface="Times New Roman" panose="02020603050405020304" pitchFamily="18" charset="0"/>
+              </a:rPr>
+              <a:t> boundaries.</a:t>
+            </a:r>
+          </a:p>
+          <a:p>
+            <a:r>
+              <a:rPr lang="en-US" dirty="0">
+                <a:latin typeface="Times New Roman" panose="02020603050405020304" pitchFamily="18" charset="0"/>
+                <a:cs typeface="Times New Roman" panose="02020603050405020304" pitchFamily="18" charset="0"/>
+              </a:rPr>
+              <a:t>\n, \t, etc.	Matches newlines, carriage returns, tabs, etc.</a:t>
+            </a:r>
+          </a:p>
+          <a:p>
+            <a:r>
+              <a:rPr lang="en-US" dirty="0">
+                <a:latin typeface="Times New Roman" panose="02020603050405020304" pitchFamily="18" charset="0"/>
+                <a:cs typeface="Times New Roman" panose="02020603050405020304" pitchFamily="18" charset="0"/>
+              </a:rPr>
+              <a:t>\1...\9		Matches nth grouped subexpression.</a:t>
+            </a:r>
+          </a:p>
+          <a:p>
+            <a:r>
+              <a:rPr lang="en-US" dirty="0">
+                <a:latin typeface="Times New Roman" panose="02020603050405020304" pitchFamily="18" charset="0"/>
+                <a:cs typeface="Times New Roman" panose="02020603050405020304" pitchFamily="18" charset="0"/>
+              </a:rPr>
+              <a:t>\10		Matches nth grouped subexpression if it matched already. Otherwise refers to the octal representation of a character code.</a:t>
+            </a:r>
+          </a:p>
+          <a:p>
+            <a:endParaRPr lang="en-US" dirty="0">
+              <a:latin typeface="Times New Roman" panose="02020603050405020304" pitchFamily="18" charset="0"/>
+              <a:cs typeface="Times New Roman" panose="02020603050405020304" pitchFamily="18" charset="0"/>
+            </a:endParaRPr>
+          </a:p>
+        </p:txBody>
+      </p:sp>
+    </p:spTree>
+    <p:extLst>
+      <p:ext uri="{BB962C8B-B14F-4D97-AF65-F5344CB8AC3E}">
+        <p14:creationId xmlns:p14="http://schemas.microsoft.com/office/powerpoint/2010/main" val="2440133842"/>
+      </p:ext>
+    </p:extLst>
+  </p:cSld>
+  <p:clrMapOvr>
+    <a:masterClrMapping/>
+  </p:clrMapOvr>
+</p:sld>
+</file>
+
+<file path=ppt/slides/slide35.xml><?xml version="1.0" encoding="utf-8"?>
+<p:sld xmlns:a="http://schemas.openxmlformats.org/drawingml/2006/main" xmlns:r="http://schemas.openxmlformats.org/officeDocument/2006/relationships" xmlns:p="http://schemas.openxmlformats.org/presentationml/2006/main">
+  <p:cSld>
+    <p:spTree>
+      <p:nvGrpSpPr>
+        <p:cNvPr id="1" name=""/>
+        <p:cNvGrpSpPr/>
+        <p:nvPr/>
+      </p:nvGrpSpPr>
+      <p:grpSpPr>
+        <a:xfrm>
+          <a:off x="0" y="0"/>
+          <a:ext cx="0" cy="0"/>
+          <a:chOff x="0" y="0"/>
+          <a:chExt cx="0" cy="0"/>
+        </a:xfrm>
+      </p:grpSpPr>
+      <p:sp>
+        <p:nvSpPr>
+          <p:cNvPr id="2" name="Title 1"/>
+          <p:cNvSpPr>
+            <a:spLocks noGrp="1"/>
+          </p:cNvSpPr>
+          <p:nvPr>
+            <p:ph type="title"/>
+          </p:nvPr>
+        </p:nvSpPr>
         <p:spPr/>
         <p:txBody>
           <a:bodyPr/>
@@ -12201,7 +12111,7 @@
         <p:spPr>
           <a:xfrm>
             <a:off x="215757" y="1825625"/>
-            <a:ext cx="11656032" cy="4351338"/>
+            <a:ext cx="11656032" cy="4873126"/>
           </a:xfrm>
         </p:spPr>
         <p:txBody>
@@ -12256,14 +12166,14 @@
               <a:buNone/>
             </a:pPr>
             <a:r>
-              <a:rPr lang="en-US" sz="1200" dirty="0" err="1">
+              <a:rPr lang="en-US" sz="1800" dirty="0" err="1">
                 <a:latin typeface="Times New Roman" panose="02020603050405020304" pitchFamily="18" charset="0"/>
                 <a:cs typeface="Times New Roman" panose="02020603050405020304" pitchFamily="18" charset="0"/>
               </a:rPr>
               <a:t>re.I</a:t>
             </a:r>
             <a:r>
-              <a:rPr lang="en-US" sz="1200" dirty="0">
+              <a:rPr lang="en-US" sz="1800" dirty="0">
                 <a:latin typeface="Times New Roman" panose="02020603050405020304" pitchFamily="18" charset="0"/>
                 <a:cs typeface="Times New Roman" panose="02020603050405020304" pitchFamily="18" charset="0"/>
               </a:rPr>
@@ -12275,14 +12185,14 @@
               <a:buNone/>
             </a:pPr>
             <a:r>
-              <a:rPr lang="en-US" sz="1200" dirty="0" err="1">
+              <a:rPr lang="en-US" sz="1800" dirty="0" err="1">
                 <a:latin typeface="Times New Roman" panose="02020603050405020304" pitchFamily="18" charset="0"/>
                 <a:cs typeface="Times New Roman" panose="02020603050405020304" pitchFamily="18" charset="0"/>
               </a:rPr>
               <a:t>re.L</a:t>
             </a:r>
             <a:r>
-              <a:rPr lang="en-US" sz="1200" dirty="0">
+              <a:rPr lang="en-US" sz="1800" dirty="0">
                 <a:latin typeface="Times New Roman" panose="02020603050405020304" pitchFamily="18" charset="0"/>
                 <a:cs typeface="Times New Roman" panose="02020603050405020304" pitchFamily="18" charset="0"/>
               </a:rPr>
@@ -12294,14 +12204,14 @@
               <a:buNone/>
             </a:pPr>
             <a:r>
-              <a:rPr lang="en-US" sz="1200" dirty="0" err="1">
+              <a:rPr lang="en-US" sz="1800" dirty="0" err="1">
                 <a:latin typeface="Times New Roman" panose="02020603050405020304" pitchFamily="18" charset="0"/>
                 <a:cs typeface="Times New Roman" panose="02020603050405020304" pitchFamily="18" charset="0"/>
               </a:rPr>
               <a:t>re.M</a:t>
             </a:r>
             <a:r>
-              <a:rPr lang="en-US" sz="1200" dirty="0">
+              <a:rPr lang="en-US" sz="1800" dirty="0">
                 <a:latin typeface="Times New Roman" panose="02020603050405020304" pitchFamily="18" charset="0"/>
                 <a:cs typeface="Times New Roman" panose="02020603050405020304" pitchFamily="18" charset="0"/>
               </a:rPr>
@@ -12313,14 +12223,14 @@
               <a:buNone/>
             </a:pPr>
             <a:r>
-              <a:rPr lang="en-US" sz="1200" dirty="0" err="1">
+              <a:rPr lang="en-US" sz="1800" dirty="0" err="1">
                 <a:latin typeface="Times New Roman" panose="02020603050405020304" pitchFamily="18" charset="0"/>
                 <a:cs typeface="Times New Roman" panose="02020603050405020304" pitchFamily="18" charset="0"/>
               </a:rPr>
               <a:t>re.S</a:t>
             </a:r>
             <a:r>
-              <a:rPr lang="en-US" sz="1200" dirty="0">
+              <a:rPr lang="en-US" sz="1800" dirty="0">
                 <a:latin typeface="Times New Roman" panose="02020603050405020304" pitchFamily="18" charset="0"/>
                 <a:cs typeface="Times New Roman" panose="02020603050405020304" pitchFamily="18" charset="0"/>
               </a:rPr>
@@ -12332,14 +12242,14 @@
               <a:buNone/>
             </a:pPr>
             <a:r>
-              <a:rPr lang="en-US" sz="1200" dirty="0" err="1">
+              <a:rPr lang="en-US" sz="1800" dirty="0" err="1">
                 <a:latin typeface="Times New Roman" panose="02020603050405020304" pitchFamily="18" charset="0"/>
                 <a:cs typeface="Times New Roman" panose="02020603050405020304" pitchFamily="18" charset="0"/>
               </a:rPr>
               <a:t>re.U</a:t>
             </a:r>
             <a:r>
-              <a:rPr lang="en-US" sz="1200" dirty="0">
+              <a:rPr lang="en-US" sz="1800" dirty="0">
                 <a:latin typeface="Times New Roman" panose="02020603050405020304" pitchFamily="18" charset="0"/>
                 <a:cs typeface="Times New Roman" panose="02020603050405020304" pitchFamily="18" charset="0"/>
               </a:rPr>
@@ -12351,28 +12261,28 @@
               <a:buNone/>
             </a:pPr>
             <a:r>
-              <a:rPr lang="en-US" sz="1200" dirty="0" err="1">
+              <a:rPr lang="en-US" sz="1800" dirty="0" err="1">
                 <a:latin typeface="Times New Roman" panose="02020603050405020304" pitchFamily="18" charset="0"/>
                 <a:cs typeface="Times New Roman" panose="02020603050405020304" pitchFamily="18" charset="0"/>
               </a:rPr>
               <a:t>re.X</a:t>
             </a:r>
             <a:r>
-              <a:rPr lang="en-US" sz="1200" dirty="0">
+              <a:rPr lang="en-US" sz="1800" dirty="0">
                 <a:latin typeface="Times New Roman" panose="02020603050405020304" pitchFamily="18" charset="0"/>
                 <a:cs typeface="Times New Roman" panose="02020603050405020304" pitchFamily="18" charset="0"/>
               </a:rPr>
               <a:t>  : Permits "cuter" regular expression syntax. It ignores whitespace (except inside a set [] or when escaped by a backslash) and treats </a:t>
             </a:r>
             <a:r>
-              <a:rPr lang="en-US" sz="1200" dirty="0" err="1">
+              <a:rPr lang="en-US" sz="1800" dirty="0" err="1">
                 <a:latin typeface="Times New Roman" panose="02020603050405020304" pitchFamily="18" charset="0"/>
                 <a:cs typeface="Times New Roman" panose="02020603050405020304" pitchFamily="18" charset="0"/>
               </a:rPr>
               <a:t>unescaped</a:t>
             </a:r>
             <a:r>
-              <a:rPr lang="en-US" sz="1200" dirty="0">
+              <a:rPr lang="en-US" sz="1800" dirty="0">
                 <a:latin typeface="Times New Roman" panose="02020603050405020304" pitchFamily="18" charset="0"/>
                 <a:cs typeface="Times New Roman" panose="02020603050405020304" pitchFamily="18" charset="0"/>
               </a:rPr>
@@ -12401,7 +12311,7 @@
 </p:sld>
 </file>
 
-<file path=ppt/slides/slide34.xml><?xml version="1.0" encoding="utf-8"?>
+<file path=ppt/slides/slide36.xml><?xml version="1.0" encoding="utf-8"?>
 <p:sld xmlns:a="http://schemas.openxmlformats.org/drawingml/2006/main" xmlns:r="http://schemas.openxmlformats.org/officeDocument/2006/relationships" xmlns:p="http://schemas.openxmlformats.org/presentationml/2006/main">
   <p:cSld>
     <p:spTree>
@@ -13157,7 +13067,7 @@
 </p:sld>
 </file>
 
-<file path=ppt/slides/slide35.xml><?xml version="1.0" encoding="utf-8"?>
+<file path=ppt/slides/slide37.xml><?xml version="1.0" encoding="utf-8"?>
 <p:sld xmlns:a="http://schemas.openxmlformats.org/drawingml/2006/main" xmlns:r="http://schemas.openxmlformats.org/officeDocument/2006/relationships" xmlns:p="http://schemas.openxmlformats.org/presentationml/2006/main">
   <p:cSld>
     <p:spTree>
@@ -13186,7 +13096,7 @@
         </p:nvSpPr>
         <p:spPr>
           <a:xfrm>
-            <a:off x="797103" y="175053"/>
+            <a:off x="981182" y="550059"/>
             <a:ext cx="10515600" cy="872911"/>
           </a:xfrm>
         </p:spPr>
@@ -13224,13 +13134,13 @@
         </p:nvSpPr>
         <p:spPr>
           <a:xfrm>
-            <a:off x="458056" y="1047964"/>
+            <a:off x="981182" y="1679824"/>
             <a:ext cx="11018178" cy="5810036"/>
           </a:xfrm>
         </p:spPr>
         <p:txBody>
           <a:bodyPr>
-            <a:normAutofit fontScale="62500" lnSpcReduction="20000"/>
+            <a:normAutofit/>
           </a:bodyPr>
           <a:lstStyle/>
           <a:p>
@@ -13528,417 +13438,6 @@
               </a:rPr>
               <a:t>solutions</a:t>
             </a:r>
-          </a:p>
-          <a:p>
-            <a:pPr lvl="2"/>
-            <a:endParaRPr lang="en-US" sz="1300" dirty="0">
-              <a:latin typeface="Times New Roman" panose="02020603050405020304" pitchFamily="18" charset="0"/>
-              <a:cs typeface="Times New Roman" panose="02020603050405020304" pitchFamily="18" charset="0"/>
-            </a:endParaRPr>
-          </a:p>
-          <a:p>
-            <a:pPr lvl="1"/>
-            <a:r>
-              <a:rPr lang="en-US" dirty="0" smtClean="0">
-                <a:latin typeface="Times New Roman" panose="02020603050405020304" pitchFamily="18" charset="0"/>
-                <a:cs typeface="Times New Roman" panose="02020603050405020304" pitchFamily="18" charset="0"/>
-              </a:rPr>
-              <a:t>Mathematics</a:t>
-            </a:r>
-          </a:p>
-          <a:p>
-            <a:pPr lvl="2"/>
-            <a:r>
-              <a:rPr lang="en-US" dirty="0">
-                <a:latin typeface="Times New Roman" panose="02020603050405020304" pitchFamily="18" charset="0"/>
-                <a:cs typeface="Times New Roman" panose="02020603050405020304" pitchFamily="18" charset="0"/>
-              </a:rPr>
-              <a:t>The </a:t>
-            </a:r>
-            <a:r>
-              <a:rPr lang="en-US" dirty="0">
-                <a:solidFill>
-                  <a:srgbClr val="C00000"/>
-                </a:solidFill>
-                <a:latin typeface="Times New Roman" panose="02020603050405020304" pitchFamily="18" charset="0"/>
-                <a:cs typeface="Times New Roman" panose="02020603050405020304" pitchFamily="18" charset="0"/>
-              </a:rPr>
-              <a:t>math</a:t>
-            </a:r>
-            <a:r>
-              <a:rPr lang="en-US" dirty="0">
-                <a:latin typeface="Times New Roman" panose="02020603050405020304" pitchFamily="18" charset="0"/>
-                <a:cs typeface="Times New Roman" panose="02020603050405020304" pitchFamily="18" charset="0"/>
-              </a:rPr>
-              <a:t> module gives access to the underlying C library functions for floating point </a:t>
-            </a:r>
-            <a:r>
-              <a:rPr lang="en-US" dirty="0" smtClean="0">
-                <a:latin typeface="Times New Roman" panose="02020603050405020304" pitchFamily="18" charset="0"/>
-                <a:cs typeface="Times New Roman" panose="02020603050405020304" pitchFamily="18" charset="0"/>
-              </a:rPr>
-              <a:t>math</a:t>
-            </a:r>
-          </a:p>
-          <a:p>
-            <a:pPr lvl="2"/>
-            <a:r>
-              <a:rPr lang="en-US" dirty="0">
-                <a:latin typeface="Times New Roman" panose="02020603050405020304" pitchFamily="18" charset="0"/>
-                <a:cs typeface="Times New Roman" panose="02020603050405020304" pitchFamily="18" charset="0"/>
-              </a:rPr>
-              <a:t>The </a:t>
-            </a:r>
-            <a:r>
-              <a:rPr lang="en-US" dirty="0">
-                <a:solidFill>
-                  <a:srgbClr val="C00000"/>
-                </a:solidFill>
-                <a:latin typeface="Times New Roman" panose="02020603050405020304" pitchFamily="18" charset="0"/>
-                <a:cs typeface="Times New Roman" panose="02020603050405020304" pitchFamily="18" charset="0"/>
-              </a:rPr>
-              <a:t>random</a:t>
-            </a:r>
-            <a:r>
-              <a:rPr lang="en-US" dirty="0">
-                <a:latin typeface="Times New Roman" panose="02020603050405020304" pitchFamily="18" charset="0"/>
-                <a:cs typeface="Times New Roman" panose="02020603050405020304" pitchFamily="18" charset="0"/>
-              </a:rPr>
-              <a:t> module provides tools for making random </a:t>
-            </a:r>
-            <a:r>
-              <a:rPr lang="en-US" dirty="0" smtClean="0">
-                <a:latin typeface="Times New Roman" panose="02020603050405020304" pitchFamily="18" charset="0"/>
-                <a:cs typeface="Times New Roman" panose="02020603050405020304" pitchFamily="18" charset="0"/>
-              </a:rPr>
-              <a:t>selections</a:t>
-            </a:r>
-          </a:p>
-          <a:p>
-            <a:pPr lvl="2"/>
-            <a:r>
-              <a:rPr lang="en-US" dirty="0">
-                <a:latin typeface="Times New Roman" panose="02020603050405020304" pitchFamily="18" charset="0"/>
-                <a:cs typeface="Times New Roman" panose="02020603050405020304" pitchFamily="18" charset="0"/>
-              </a:rPr>
-              <a:t>The </a:t>
-            </a:r>
-            <a:r>
-              <a:rPr lang="en-US" dirty="0">
-                <a:solidFill>
-                  <a:srgbClr val="C00000"/>
-                </a:solidFill>
-                <a:latin typeface="Times New Roman" panose="02020603050405020304" pitchFamily="18" charset="0"/>
-                <a:cs typeface="Times New Roman" panose="02020603050405020304" pitchFamily="18" charset="0"/>
-              </a:rPr>
-              <a:t>statistics</a:t>
-            </a:r>
-            <a:r>
-              <a:rPr lang="en-US" dirty="0">
-                <a:latin typeface="Times New Roman" panose="02020603050405020304" pitchFamily="18" charset="0"/>
-                <a:cs typeface="Times New Roman" panose="02020603050405020304" pitchFamily="18" charset="0"/>
-              </a:rPr>
-              <a:t> module calculates basic statistical properties (the mean, median, variance, etc.) of numeric data</a:t>
-            </a:r>
-            <a:endParaRPr lang="en-US" dirty="0" smtClean="0">
-              <a:latin typeface="Times New Roman" panose="02020603050405020304" pitchFamily="18" charset="0"/>
-              <a:cs typeface="Times New Roman" panose="02020603050405020304" pitchFamily="18" charset="0"/>
-            </a:endParaRPr>
-          </a:p>
-          <a:p>
-            <a:pPr lvl="2"/>
-            <a:endParaRPr lang="en-US" sz="1400" dirty="0">
-              <a:latin typeface="Times New Roman" panose="02020603050405020304" pitchFamily="18" charset="0"/>
-              <a:cs typeface="Times New Roman" panose="02020603050405020304" pitchFamily="18" charset="0"/>
-            </a:endParaRPr>
-          </a:p>
-          <a:p>
-            <a:pPr lvl="1"/>
-            <a:r>
-              <a:rPr lang="en-US" dirty="0">
-                <a:latin typeface="Times New Roman" panose="02020603050405020304" pitchFamily="18" charset="0"/>
-                <a:cs typeface="Times New Roman" panose="02020603050405020304" pitchFamily="18" charset="0"/>
-              </a:rPr>
-              <a:t>Internet </a:t>
-            </a:r>
-            <a:r>
-              <a:rPr lang="en-US" dirty="0" smtClean="0">
-                <a:latin typeface="Times New Roman" panose="02020603050405020304" pitchFamily="18" charset="0"/>
-                <a:cs typeface="Times New Roman" panose="02020603050405020304" pitchFamily="18" charset="0"/>
-              </a:rPr>
-              <a:t>Access</a:t>
-            </a:r>
-          </a:p>
-          <a:p>
-            <a:pPr lvl="2"/>
-            <a:r>
-              <a:rPr lang="en-US" dirty="0">
-                <a:latin typeface="Times New Roman" panose="02020603050405020304" pitchFamily="18" charset="0"/>
-                <a:cs typeface="Times New Roman" panose="02020603050405020304" pitchFamily="18" charset="0"/>
-              </a:rPr>
-              <a:t>There are a number of modules for accessing the internet and processing internet protocols. Two of the simplest are </a:t>
-            </a:r>
-            <a:r>
-              <a:rPr lang="en-US" dirty="0" err="1">
-                <a:solidFill>
-                  <a:srgbClr val="C00000"/>
-                </a:solidFill>
-                <a:latin typeface="Times New Roman" panose="02020603050405020304" pitchFamily="18" charset="0"/>
-                <a:cs typeface="Times New Roman" panose="02020603050405020304" pitchFamily="18" charset="0"/>
-              </a:rPr>
-              <a:t>urllib.request</a:t>
-            </a:r>
-            <a:r>
-              <a:rPr lang="en-US" dirty="0">
-                <a:latin typeface="Times New Roman" panose="02020603050405020304" pitchFamily="18" charset="0"/>
-                <a:cs typeface="Times New Roman" panose="02020603050405020304" pitchFamily="18" charset="0"/>
-              </a:rPr>
-              <a:t> for retrieving data from URLs and </a:t>
-            </a:r>
-            <a:r>
-              <a:rPr lang="en-US" dirty="0" err="1">
-                <a:solidFill>
-                  <a:srgbClr val="C00000"/>
-                </a:solidFill>
-                <a:latin typeface="Times New Roman" panose="02020603050405020304" pitchFamily="18" charset="0"/>
-                <a:cs typeface="Times New Roman" panose="02020603050405020304" pitchFamily="18" charset="0"/>
-              </a:rPr>
-              <a:t>smtplib</a:t>
-            </a:r>
-            <a:r>
-              <a:rPr lang="en-US" dirty="0">
-                <a:latin typeface="Times New Roman" panose="02020603050405020304" pitchFamily="18" charset="0"/>
-                <a:cs typeface="Times New Roman" panose="02020603050405020304" pitchFamily="18" charset="0"/>
-              </a:rPr>
-              <a:t> for sending </a:t>
-            </a:r>
-            <a:r>
-              <a:rPr lang="en-US" dirty="0" smtClean="0">
-                <a:latin typeface="Times New Roman" panose="02020603050405020304" pitchFamily="18" charset="0"/>
-                <a:cs typeface="Times New Roman" panose="02020603050405020304" pitchFamily="18" charset="0"/>
-              </a:rPr>
-              <a:t>mail</a:t>
-            </a:r>
-          </a:p>
-          <a:p>
-            <a:pPr lvl="2"/>
-            <a:endParaRPr lang="en-US" sz="1600" dirty="0">
-              <a:latin typeface="Times New Roman" panose="02020603050405020304" pitchFamily="18" charset="0"/>
-              <a:cs typeface="Times New Roman" panose="02020603050405020304" pitchFamily="18" charset="0"/>
-            </a:endParaRPr>
-          </a:p>
-          <a:p>
-            <a:pPr lvl="1"/>
-            <a:r>
-              <a:rPr lang="en-US" dirty="0">
-                <a:latin typeface="Times New Roman" panose="02020603050405020304" pitchFamily="18" charset="0"/>
-                <a:cs typeface="Times New Roman" panose="02020603050405020304" pitchFamily="18" charset="0"/>
-              </a:rPr>
-              <a:t>Dates and </a:t>
-            </a:r>
-            <a:r>
-              <a:rPr lang="en-US" dirty="0" smtClean="0">
-                <a:latin typeface="Times New Roman" panose="02020603050405020304" pitchFamily="18" charset="0"/>
-                <a:cs typeface="Times New Roman" panose="02020603050405020304" pitchFamily="18" charset="0"/>
-              </a:rPr>
-              <a:t>Times</a:t>
-            </a:r>
-          </a:p>
-          <a:p>
-            <a:pPr lvl="2"/>
-            <a:r>
-              <a:rPr lang="en-US" dirty="0">
-                <a:latin typeface="Times New Roman" panose="02020603050405020304" pitchFamily="18" charset="0"/>
-                <a:cs typeface="Times New Roman" panose="02020603050405020304" pitchFamily="18" charset="0"/>
-              </a:rPr>
-              <a:t>The </a:t>
-            </a:r>
-            <a:r>
-              <a:rPr lang="en-US" dirty="0" err="1">
-                <a:solidFill>
-                  <a:srgbClr val="C00000"/>
-                </a:solidFill>
-                <a:latin typeface="Times New Roman" panose="02020603050405020304" pitchFamily="18" charset="0"/>
-                <a:cs typeface="Times New Roman" panose="02020603050405020304" pitchFamily="18" charset="0"/>
-              </a:rPr>
-              <a:t>datetime</a:t>
-            </a:r>
-            <a:r>
-              <a:rPr lang="en-US" dirty="0">
-                <a:latin typeface="Times New Roman" panose="02020603050405020304" pitchFamily="18" charset="0"/>
-                <a:cs typeface="Times New Roman" panose="02020603050405020304" pitchFamily="18" charset="0"/>
-              </a:rPr>
-              <a:t> module supplies classes for manipulating dates and times in both simple and complex ways. While date and time arithmetic is supported, the focus of the implementation is on efficient member extraction for output formatting and manipulation. The module also supports objects that are </a:t>
-            </a:r>
-            <a:r>
-              <a:rPr lang="en-US" dirty="0" err="1">
-                <a:latin typeface="Times New Roman" panose="02020603050405020304" pitchFamily="18" charset="0"/>
-                <a:cs typeface="Times New Roman" panose="02020603050405020304" pitchFamily="18" charset="0"/>
-              </a:rPr>
-              <a:t>timezone</a:t>
-            </a:r>
-            <a:r>
-              <a:rPr lang="en-US" dirty="0">
-                <a:latin typeface="Times New Roman" panose="02020603050405020304" pitchFamily="18" charset="0"/>
-                <a:cs typeface="Times New Roman" panose="02020603050405020304" pitchFamily="18" charset="0"/>
-              </a:rPr>
-              <a:t> </a:t>
-            </a:r>
-            <a:r>
-              <a:rPr lang="en-US" dirty="0" smtClean="0">
-                <a:latin typeface="Times New Roman" panose="02020603050405020304" pitchFamily="18" charset="0"/>
-                <a:cs typeface="Times New Roman" panose="02020603050405020304" pitchFamily="18" charset="0"/>
-              </a:rPr>
-              <a:t>aware</a:t>
-            </a:r>
-          </a:p>
-          <a:p>
-            <a:pPr lvl="2"/>
-            <a:endParaRPr lang="en-US" sz="1800" dirty="0">
-              <a:latin typeface="Times New Roman" panose="02020603050405020304" pitchFamily="18" charset="0"/>
-              <a:cs typeface="Times New Roman" panose="02020603050405020304" pitchFamily="18" charset="0"/>
-            </a:endParaRPr>
-          </a:p>
-          <a:p>
-            <a:pPr lvl="1"/>
-            <a:r>
-              <a:rPr lang="en-US" dirty="0">
-                <a:latin typeface="Times New Roman" panose="02020603050405020304" pitchFamily="18" charset="0"/>
-                <a:cs typeface="Times New Roman" panose="02020603050405020304" pitchFamily="18" charset="0"/>
-              </a:rPr>
-              <a:t>Data </a:t>
-            </a:r>
-            <a:r>
-              <a:rPr lang="en-US" dirty="0" smtClean="0">
-                <a:latin typeface="Times New Roman" panose="02020603050405020304" pitchFamily="18" charset="0"/>
-                <a:cs typeface="Times New Roman" panose="02020603050405020304" pitchFamily="18" charset="0"/>
-              </a:rPr>
-              <a:t>Compression</a:t>
-            </a:r>
-          </a:p>
-          <a:p>
-            <a:pPr lvl="2"/>
-            <a:r>
-              <a:rPr lang="en-US" dirty="0">
-                <a:latin typeface="Times New Roman" panose="02020603050405020304" pitchFamily="18" charset="0"/>
-                <a:cs typeface="Times New Roman" panose="02020603050405020304" pitchFamily="18" charset="0"/>
-              </a:rPr>
-              <a:t>Common data archiving and compression formats are directly supported by modules including: </a:t>
-            </a:r>
-            <a:r>
-              <a:rPr lang="en-US" dirty="0" err="1">
-                <a:solidFill>
-                  <a:srgbClr val="C00000"/>
-                </a:solidFill>
-                <a:latin typeface="Times New Roman" panose="02020603050405020304" pitchFamily="18" charset="0"/>
-                <a:cs typeface="Times New Roman" panose="02020603050405020304" pitchFamily="18" charset="0"/>
-              </a:rPr>
-              <a:t>zlib</a:t>
-            </a:r>
-            <a:r>
-              <a:rPr lang="en-US" dirty="0">
-                <a:latin typeface="Times New Roman" panose="02020603050405020304" pitchFamily="18" charset="0"/>
-                <a:cs typeface="Times New Roman" panose="02020603050405020304" pitchFamily="18" charset="0"/>
-              </a:rPr>
-              <a:t>, </a:t>
-            </a:r>
-            <a:r>
-              <a:rPr lang="en-US" dirty="0" err="1">
-                <a:solidFill>
-                  <a:srgbClr val="C00000"/>
-                </a:solidFill>
-                <a:latin typeface="Times New Roman" panose="02020603050405020304" pitchFamily="18" charset="0"/>
-                <a:cs typeface="Times New Roman" panose="02020603050405020304" pitchFamily="18" charset="0"/>
-              </a:rPr>
-              <a:t>gzip</a:t>
-            </a:r>
-            <a:r>
-              <a:rPr lang="en-US" dirty="0">
-                <a:latin typeface="Times New Roman" panose="02020603050405020304" pitchFamily="18" charset="0"/>
-                <a:cs typeface="Times New Roman" panose="02020603050405020304" pitchFamily="18" charset="0"/>
-              </a:rPr>
-              <a:t>, </a:t>
-            </a:r>
-            <a:r>
-              <a:rPr lang="en-US" dirty="0">
-                <a:solidFill>
-                  <a:srgbClr val="C00000"/>
-                </a:solidFill>
-                <a:latin typeface="Times New Roman" panose="02020603050405020304" pitchFamily="18" charset="0"/>
-                <a:cs typeface="Times New Roman" panose="02020603050405020304" pitchFamily="18" charset="0"/>
-              </a:rPr>
-              <a:t>bz2</a:t>
-            </a:r>
-            <a:r>
-              <a:rPr lang="en-US" dirty="0">
-                <a:latin typeface="Times New Roman" panose="02020603050405020304" pitchFamily="18" charset="0"/>
-                <a:cs typeface="Times New Roman" panose="02020603050405020304" pitchFamily="18" charset="0"/>
-              </a:rPr>
-              <a:t>, </a:t>
-            </a:r>
-            <a:r>
-              <a:rPr lang="en-US" dirty="0" err="1">
-                <a:solidFill>
-                  <a:srgbClr val="C00000"/>
-                </a:solidFill>
-                <a:latin typeface="Times New Roman" panose="02020603050405020304" pitchFamily="18" charset="0"/>
-                <a:cs typeface="Times New Roman" panose="02020603050405020304" pitchFamily="18" charset="0"/>
-              </a:rPr>
-              <a:t>lzma</a:t>
-            </a:r>
-            <a:r>
-              <a:rPr lang="en-US" dirty="0">
-                <a:latin typeface="Times New Roman" panose="02020603050405020304" pitchFamily="18" charset="0"/>
-                <a:cs typeface="Times New Roman" panose="02020603050405020304" pitchFamily="18" charset="0"/>
-              </a:rPr>
-              <a:t>, </a:t>
-            </a:r>
-            <a:r>
-              <a:rPr lang="en-US" dirty="0" err="1">
-                <a:solidFill>
-                  <a:srgbClr val="C00000"/>
-                </a:solidFill>
-                <a:latin typeface="Times New Roman" panose="02020603050405020304" pitchFamily="18" charset="0"/>
-                <a:cs typeface="Times New Roman" panose="02020603050405020304" pitchFamily="18" charset="0"/>
-              </a:rPr>
-              <a:t>zipfile</a:t>
-            </a:r>
-            <a:r>
-              <a:rPr lang="en-US" dirty="0">
-                <a:latin typeface="Times New Roman" panose="02020603050405020304" pitchFamily="18" charset="0"/>
-                <a:cs typeface="Times New Roman" panose="02020603050405020304" pitchFamily="18" charset="0"/>
-              </a:rPr>
-              <a:t> and </a:t>
-            </a:r>
-            <a:r>
-              <a:rPr lang="en-US" dirty="0" err="1">
-                <a:solidFill>
-                  <a:srgbClr val="C00000"/>
-                </a:solidFill>
-                <a:latin typeface="Times New Roman" panose="02020603050405020304" pitchFamily="18" charset="0"/>
-                <a:cs typeface="Times New Roman" panose="02020603050405020304" pitchFamily="18" charset="0"/>
-              </a:rPr>
-              <a:t>tarfile</a:t>
-            </a:r>
-            <a:r>
-              <a:rPr lang="en-US" dirty="0" smtClean="0">
-                <a:latin typeface="Times New Roman" panose="02020603050405020304" pitchFamily="18" charset="0"/>
-                <a:cs typeface="Times New Roman" panose="02020603050405020304" pitchFamily="18" charset="0"/>
-              </a:rPr>
-              <a:t>.</a:t>
-            </a:r>
-          </a:p>
-          <a:p>
-            <a:pPr lvl="2"/>
-            <a:endParaRPr lang="en-US" sz="1800" dirty="0">
-              <a:latin typeface="Times New Roman" panose="02020603050405020304" pitchFamily="18" charset="0"/>
-              <a:cs typeface="Times New Roman" panose="02020603050405020304" pitchFamily="18" charset="0"/>
-            </a:endParaRPr>
-          </a:p>
-          <a:p>
-            <a:pPr marL="914400" lvl="2" indent="0">
-              <a:buNone/>
-            </a:pPr>
             <a:endParaRPr lang="en-US" dirty="0" smtClean="0">
               <a:latin typeface="Times New Roman" panose="02020603050405020304" pitchFamily="18" charset="0"/>
               <a:cs typeface="Times New Roman" panose="02020603050405020304" pitchFamily="18" charset="0"/>
@@ -13959,7 +13458,434 @@
 </p:sld>
 </file>
 
-<file path=ppt/slides/slide36.xml><?xml version="1.0" encoding="utf-8"?>
+<file path=ppt/slides/slide38.xml><?xml version="1.0" encoding="utf-8"?>
+<p:sld xmlns:a="http://schemas.openxmlformats.org/drawingml/2006/main" xmlns:r="http://schemas.openxmlformats.org/officeDocument/2006/relationships" xmlns:p="http://schemas.openxmlformats.org/presentationml/2006/main">
+  <p:cSld>
+    <p:spTree>
+      <p:nvGrpSpPr>
+        <p:cNvPr id="1" name=""/>
+        <p:cNvGrpSpPr/>
+        <p:nvPr/>
+      </p:nvGrpSpPr>
+      <p:grpSpPr>
+        <a:xfrm>
+          <a:off x="0" y="0"/>
+          <a:ext cx="0" cy="0"/>
+          <a:chOff x="0" y="0"/>
+          <a:chExt cx="0" cy="0"/>
+        </a:xfrm>
+      </p:grpSpPr>
+      <p:sp>
+        <p:nvSpPr>
+          <p:cNvPr id="2" name="Title 1"/>
+          <p:cNvSpPr>
+            <a:spLocks noGrp="1"/>
+          </p:cNvSpPr>
+          <p:nvPr>
+            <p:ph type="title"/>
+          </p:nvPr>
+        </p:nvSpPr>
+        <p:spPr>
+          <a:xfrm>
+            <a:off x="946079" y="417476"/>
+            <a:ext cx="10515600" cy="1120472"/>
+          </a:xfrm>
+        </p:spPr>
+        <p:txBody>
+          <a:bodyPr/>
+          <a:lstStyle/>
+          <a:p>
+            <a:r>
+              <a:rPr lang="en-US" dirty="0">
+                <a:latin typeface="+mn-lt"/>
+              </a:rPr>
+              <a:t>Standard Libraries</a:t>
+            </a:r>
+            <a:endParaRPr lang="en-US" dirty="0">
+              <a:latin typeface="+mn-lt"/>
+            </a:endParaRPr>
+          </a:p>
+        </p:txBody>
+      </p:sp>
+      <p:sp>
+        <p:nvSpPr>
+          <p:cNvPr id="3" name="Content Placeholder 2"/>
+          <p:cNvSpPr>
+            <a:spLocks noGrp="1"/>
+          </p:cNvSpPr>
+          <p:nvPr>
+            <p:ph idx="1"/>
+          </p:nvPr>
+        </p:nvSpPr>
+        <p:spPr>
+          <a:xfrm>
+            <a:off x="946079" y="1378698"/>
+            <a:ext cx="10515600" cy="4351338"/>
+          </a:xfrm>
+        </p:spPr>
+        <p:txBody>
+          <a:bodyPr>
+            <a:noAutofit/>
+          </a:bodyPr>
+          <a:lstStyle/>
+          <a:p>
+            <a:pPr lvl="1"/>
+            <a:r>
+              <a:rPr lang="en-US" sz="2000" dirty="0">
+                <a:latin typeface="Times New Roman" panose="02020603050405020304" pitchFamily="18" charset="0"/>
+                <a:cs typeface="Times New Roman" panose="02020603050405020304" pitchFamily="18" charset="0"/>
+              </a:rPr>
+              <a:t>Mathematics</a:t>
+            </a:r>
+          </a:p>
+          <a:p>
+            <a:pPr lvl="2"/>
+            <a:r>
+              <a:rPr lang="en-US" dirty="0">
+                <a:latin typeface="Times New Roman" panose="02020603050405020304" pitchFamily="18" charset="0"/>
+                <a:cs typeface="Times New Roman" panose="02020603050405020304" pitchFamily="18" charset="0"/>
+              </a:rPr>
+              <a:t>The </a:t>
+            </a:r>
+            <a:r>
+              <a:rPr lang="en-US" dirty="0">
+                <a:solidFill>
+                  <a:srgbClr val="C00000"/>
+                </a:solidFill>
+                <a:latin typeface="Times New Roman" panose="02020603050405020304" pitchFamily="18" charset="0"/>
+                <a:cs typeface="Times New Roman" panose="02020603050405020304" pitchFamily="18" charset="0"/>
+              </a:rPr>
+              <a:t>math</a:t>
+            </a:r>
+            <a:r>
+              <a:rPr lang="en-US" dirty="0">
+                <a:latin typeface="Times New Roman" panose="02020603050405020304" pitchFamily="18" charset="0"/>
+                <a:cs typeface="Times New Roman" panose="02020603050405020304" pitchFamily="18" charset="0"/>
+              </a:rPr>
+              <a:t> module gives access to the underlying C library functions for floating point math</a:t>
+            </a:r>
+          </a:p>
+          <a:p>
+            <a:pPr lvl="2"/>
+            <a:r>
+              <a:rPr lang="en-US" dirty="0">
+                <a:latin typeface="Times New Roman" panose="02020603050405020304" pitchFamily="18" charset="0"/>
+                <a:cs typeface="Times New Roman" panose="02020603050405020304" pitchFamily="18" charset="0"/>
+              </a:rPr>
+              <a:t>The </a:t>
+            </a:r>
+            <a:r>
+              <a:rPr lang="en-US" dirty="0">
+                <a:solidFill>
+                  <a:srgbClr val="C00000"/>
+                </a:solidFill>
+                <a:latin typeface="Times New Roman" panose="02020603050405020304" pitchFamily="18" charset="0"/>
+                <a:cs typeface="Times New Roman" panose="02020603050405020304" pitchFamily="18" charset="0"/>
+              </a:rPr>
+              <a:t>random</a:t>
+            </a:r>
+            <a:r>
+              <a:rPr lang="en-US" dirty="0">
+                <a:latin typeface="Times New Roman" panose="02020603050405020304" pitchFamily="18" charset="0"/>
+                <a:cs typeface="Times New Roman" panose="02020603050405020304" pitchFamily="18" charset="0"/>
+              </a:rPr>
+              <a:t> module provides tools for making random selections</a:t>
+            </a:r>
+          </a:p>
+          <a:p>
+            <a:pPr lvl="2"/>
+            <a:r>
+              <a:rPr lang="en-US" dirty="0">
+                <a:latin typeface="Times New Roman" panose="02020603050405020304" pitchFamily="18" charset="0"/>
+                <a:cs typeface="Times New Roman" panose="02020603050405020304" pitchFamily="18" charset="0"/>
+              </a:rPr>
+              <a:t>The </a:t>
+            </a:r>
+            <a:r>
+              <a:rPr lang="en-US" dirty="0">
+                <a:solidFill>
+                  <a:srgbClr val="C00000"/>
+                </a:solidFill>
+                <a:latin typeface="Times New Roman" panose="02020603050405020304" pitchFamily="18" charset="0"/>
+                <a:cs typeface="Times New Roman" panose="02020603050405020304" pitchFamily="18" charset="0"/>
+              </a:rPr>
+              <a:t>statistics</a:t>
+            </a:r>
+            <a:r>
+              <a:rPr lang="en-US" dirty="0">
+                <a:latin typeface="Times New Roman" panose="02020603050405020304" pitchFamily="18" charset="0"/>
+                <a:cs typeface="Times New Roman" panose="02020603050405020304" pitchFamily="18" charset="0"/>
+              </a:rPr>
+              <a:t> module calculates basic statistical properties (the mean, median, variance, etc.) of numeric data</a:t>
+            </a:r>
+          </a:p>
+          <a:p>
+            <a:pPr lvl="2"/>
+            <a:endParaRPr lang="en-US" dirty="0">
+              <a:latin typeface="Times New Roman" panose="02020603050405020304" pitchFamily="18" charset="0"/>
+              <a:cs typeface="Times New Roman" panose="02020603050405020304" pitchFamily="18" charset="0"/>
+            </a:endParaRPr>
+          </a:p>
+          <a:p>
+            <a:pPr lvl="1"/>
+            <a:r>
+              <a:rPr lang="en-US" sz="2000" dirty="0">
+                <a:latin typeface="Times New Roman" panose="02020603050405020304" pitchFamily="18" charset="0"/>
+                <a:cs typeface="Times New Roman" panose="02020603050405020304" pitchFamily="18" charset="0"/>
+              </a:rPr>
+              <a:t>Internet Access</a:t>
+            </a:r>
+          </a:p>
+          <a:p>
+            <a:pPr lvl="2"/>
+            <a:r>
+              <a:rPr lang="en-US" dirty="0">
+                <a:latin typeface="Times New Roman" panose="02020603050405020304" pitchFamily="18" charset="0"/>
+                <a:cs typeface="Times New Roman" panose="02020603050405020304" pitchFamily="18" charset="0"/>
+              </a:rPr>
+              <a:t>There are a number of modules for accessing the internet and processing internet protocols. Two of the simplest are </a:t>
+            </a:r>
+            <a:r>
+              <a:rPr lang="en-US" dirty="0" err="1">
+                <a:solidFill>
+                  <a:srgbClr val="C00000"/>
+                </a:solidFill>
+                <a:latin typeface="Times New Roman" panose="02020603050405020304" pitchFamily="18" charset="0"/>
+                <a:cs typeface="Times New Roman" panose="02020603050405020304" pitchFamily="18" charset="0"/>
+              </a:rPr>
+              <a:t>urllib.request</a:t>
+            </a:r>
+            <a:r>
+              <a:rPr lang="en-US" dirty="0">
+                <a:latin typeface="Times New Roman" panose="02020603050405020304" pitchFamily="18" charset="0"/>
+                <a:cs typeface="Times New Roman" panose="02020603050405020304" pitchFamily="18" charset="0"/>
+              </a:rPr>
+              <a:t> for retrieving data from URLs and </a:t>
+            </a:r>
+            <a:r>
+              <a:rPr lang="en-US" dirty="0" err="1">
+                <a:solidFill>
+                  <a:srgbClr val="C00000"/>
+                </a:solidFill>
+                <a:latin typeface="Times New Roman" panose="02020603050405020304" pitchFamily="18" charset="0"/>
+                <a:cs typeface="Times New Roman" panose="02020603050405020304" pitchFamily="18" charset="0"/>
+              </a:rPr>
+              <a:t>smtplib</a:t>
+            </a:r>
+            <a:r>
+              <a:rPr lang="en-US" dirty="0">
+                <a:latin typeface="Times New Roman" panose="02020603050405020304" pitchFamily="18" charset="0"/>
+                <a:cs typeface="Times New Roman" panose="02020603050405020304" pitchFamily="18" charset="0"/>
+              </a:rPr>
+              <a:t> for sending mail</a:t>
+            </a:r>
+          </a:p>
+          <a:p>
+            <a:pPr lvl="2"/>
+            <a:endParaRPr lang="en-US" dirty="0">
+              <a:latin typeface="Times New Roman" panose="02020603050405020304" pitchFamily="18" charset="0"/>
+              <a:cs typeface="Times New Roman" panose="02020603050405020304" pitchFamily="18" charset="0"/>
+            </a:endParaRPr>
+          </a:p>
+          <a:p>
+            <a:pPr lvl="1"/>
+            <a:r>
+              <a:rPr lang="en-US" sz="2000" dirty="0">
+                <a:latin typeface="Times New Roman" panose="02020603050405020304" pitchFamily="18" charset="0"/>
+                <a:cs typeface="Times New Roman" panose="02020603050405020304" pitchFamily="18" charset="0"/>
+              </a:rPr>
+              <a:t>Dates and Times</a:t>
+            </a:r>
+          </a:p>
+          <a:p>
+            <a:pPr lvl="2"/>
+            <a:r>
+              <a:rPr lang="en-US" dirty="0">
+                <a:latin typeface="Times New Roman" panose="02020603050405020304" pitchFamily="18" charset="0"/>
+                <a:cs typeface="Times New Roman" panose="02020603050405020304" pitchFamily="18" charset="0"/>
+              </a:rPr>
+              <a:t>The </a:t>
+            </a:r>
+            <a:r>
+              <a:rPr lang="en-US" dirty="0" err="1">
+                <a:solidFill>
+                  <a:srgbClr val="C00000"/>
+                </a:solidFill>
+                <a:latin typeface="Times New Roman" panose="02020603050405020304" pitchFamily="18" charset="0"/>
+                <a:cs typeface="Times New Roman" panose="02020603050405020304" pitchFamily="18" charset="0"/>
+              </a:rPr>
+              <a:t>datetime</a:t>
+            </a:r>
+            <a:r>
+              <a:rPr lang="en-US" dirty="0">
+                <a:latin typeface="Times New Roman" panose="02020603050405020304" pitchFamily="18" charset="0"/>
+                <a:cs typeface="Times New Roman" panose="02020603050405020304" pitchFamily="18" charset="0"/>
+              </a:rPr>
+              <a:t> module supplies classes for manipulating dates and times in both simple and complex ways. While date and time arithmetic is supported, the focus of the implementation is on efficient member extraction for output formatting and manipulation. The module also supports objects that are </a:t>
+            </a:r>
+            <a:r>
+              <a:rPr lang="en-US" dirty="0" err="1">
+                <a:latin typeface="Times New Roman" panose="02020603050405020304" pitchFamily="18" charset="0"/>
+                <a:cs typeface="Times New Roman" panose="02020603050405020304" pitchFamily="18" charset="0"/>
+              </a:rPr>
+              <a:t>timezone</a:t>
+            </a:r>
+            <a:r>
+              <a:rPr lang="en-US" dirty="0">
+                <a:latin typeface="Times New Roman" panose="02020603050405020304" pitchFamily="18" charset="0"/>
+                <a:cs typeface="Times New Roman" panose="02020603050405020304" pitchFamily="18" charset="0"/>
+              </a:rPr>
+              <a:t> aware</a:t>
+            </a:r>
+          </a:p>
+          <a:p>
+            <a:pPr lvl="2"/>
+            <a:endParaRPr lang="en-US" dirty="0">
+              <a:latin typeface="Times New Roman" panose="02020603050405020304" pitchFamily="18" charset="0"/>
+              <a:cs typeface="Times New Roman" panose="02020603050405020304" pitchFamily="18" charset="0"/>
+            </a:endParaRPr>
+          </a:p>
+          <a:p>
+            <a:pPr lvl="1"/>
+            <a:r>
+              <a:rPr lang="en-US" sz="2000" dirty="0">
+                <a:latin typeface="Times New Roman" panose="02020603050405020304" pitchFamily="18" charset="0"/>
+                <a:cs typeface="Times New Roman" panose="02020603050405020304" pitchFamily="18" charset="0"/>
+              </a:rPr>
+              <a:t>Data Compression</a:t>
+            </a:r>
+          </a:p>
+          <a:p>
+            <a:pPr lvl="2"/>
+            <a:r>
+              <a:rPr lang="en-US" dirty="0">
+                <a:latin typeface="Times New Roman" panose="02020603050405020304" pitchFamily="18" charset="0"/>
+                <a:cs typeface="Times New Roman" panose="02020603050405020304" pitchFamily="18" charset="0"/>
+              </a:rPr>
+              <a:t>Common data archiving and compression formats are directly supported by modules including: </a:t>
+            </a:r>
+            <a:r>
+              <a:rPr lang="en-US" dirty="0" err="1">
+                <a:solidFill>
+                  <a:srgbClr val="C00000"/>
+                </a:solidFill>
+                <a:latin typeface="Times New Roman" panose="02020603050405020304" pitchFamily="18" charset="0"/>
+                <a:cs typeface="Times New Roman" panose="02020603050405020304" pitchFamily="18" charset="0"/>
+              </a:rPr>
+              <a:t>zlib</a:t>
+            </a:r>
+            <a:r>
+              <a:rPr lang="en-US" dirty="0">
+                <a:latin typeface="Times New Roman" panose="02020603050405020304" pitchFamily="18" charset="0"/>
+                <a:cs typeface="Times New Roman" panose="02020603050405020304" pitchFamily="18" charset="0"/>
+              </a:rPr>
+              <a:t>, </a:t>
+            </a:r>
+            <a:r>
+              <a:rPr lang="en-US" dirty="0" err="1">
+                <a:solidFill>
+                  <a:srgbClr val="C00000"/>
+                </a:solidFill>
+                <a:latin typeface="Times New Roman" panose="02020603050405020304" pitchFamily="18" charset="0"/>
+                <a:cs typeface="Times New Roman" panose="02020603050405020304" pitchFamily="18" charset="0"/>
+              </a:rPr>
+              <a:t>gzip</a:t>
+            </a:r>
+            <a:r>
+              <a:rPr lang="en-US" dirty="0">
+                <a:latin typeface="Times New Roman" panose="02020603050405020304" pitchFamily="18" charset="0"/>
+                <a:cs typeface="Times New Roman" panose="02020603050405020304" pitchFamily="18" charset="0"/>
+              </a:rPr>
+              <a:t>, </a:t>
+            </a:r>
+            <a:r>
+              <a:rPr lang="en-US" dirty="0">
+                <a:solidFill>
+                  <a:srgbClr val="C00000"/>
+                </a:solidFill>
+                <a:latin typeface="Times New Roman" panose="02020603050405020304" pitchFamily="18" charset="0"/>
+                <a:cs typeface="Times New Roman" panose="02020603050405020304" pitchFamily="18" charset="0"/>
+              </a:rPr>
+              <a:t>bz2</a:t>
+            </a:r>
+            <a:r>
+              <a:rPr lang="en-US" dirty="0">
+                <a:latin typeface="Times New Roman" panose="02020603050405020304" pitchFamily="18" charset="0"/>
+                <a:cs typeface="Times New Roman" panose="02020603050405020304" pitchFamily="18" charset="0"/>
+              </a:rPr>
+              <a:t>, </a:t>
+            </a:r>
+            <a:r>
+              <a:rPr lang="en-US" dirty="0" err="1">
+                <a:solidFill>
+                  <a:srgbClr val="C00000"/>
+                </a:solidFill>
+                <a:latin typeface="Times New Roman" panose="02020603050405020304" pitchFamily="18" charset="0"/>
+                <a:cs typeface="Times New Roman" panose="02020603050405020304" pitchFamily="18" charset="0"/>
+              </a:rPr>
+              <a:t>lzma</a:t>
+            </a:r>
+            <a:r>
+              <a:rPr lang="en-US" dirty="0">
+                <a:latin typeface="Times New Roman" panose="02020603050405020304" pitchFamily="18" charset="0"/>
+                <a:cs typeface="Times New Roman" panose="02020603050405020304" pitchFamily="18" charset="0"/>
+              </a:rPr>
+              <a:t>, </a:t>
+            </a:r>
+            <a:r>
+              <a:rPr lang="en-US" dirty="0" err="1">
+                <a:solidFill>
+                  <a:srgbClr val="C00000"/>
+                </a:solidFill>
+                <a:latin typeface="Times New Roman" panose="02020603050405020304" pitchFamily="18" charset="0"/>
+                <a:cs typeface="Times New Roman" panose="02020603050405020304" pitchFamily="18" charset="0"/>
+              </a:rPr>
+              <a:t>zipfile</a:t>
+            </a:r>
+            <a:r>
+              <a:rPr lang="en-US" dirty="0">
+                <a:latin typeface="Times New Roman" panose="02020603050405020304" pitchFamily="18" charset="0"/>
+                <a:cs typeface="Times New Roman" panose="02020603050405020304" pitchFamily="18" charset="0"/>
+              </a:rPr>
+              <a:t> and </a:t>
+            </a:r>
+            <a:r>
+              <a:rPr lang="en-US" dirty="0" err="1">
+                <a:solidFill>
+                  <a:srgbClr val="C00000"/>
+                </a:solidFill>
+                <a:latin typeface="Times New Roman" panose="02020603050405020304" pitchFamily="18" charset="0"/>
+                <a:cs typeface="Times New Roman" panose="02020603050405020304" pitchFamily="18" charset="0"/>
+              </a:rPr>
+              <a:t>tarfile</a:t>
+            </a:r>
+            <a:r>
+              <a:rPr lang="en-US" dirty="0">
+                <a:latin typeface="Times New Roman" panose="02020603050405020304" pitchFamily="18" charset="0"/>
+                <a:cs typeface="Times New Roman" panose="02020603050405020304" pitchFamily="18" charset="0"/>
+              </a:rPr>
+              <a:t>.</a:t>
+            </a:r>
+          </a:p>
+          <a:p>
+            <a:endParaRPr lang="en-US" sz="2000" dirty="0"/>
+          </a:p>
+        </p:txBody>
+      </p:sp>
+    </p:spTree>
+    <p:extLst>
+      <p:ext uri="{BB962C8B-B14F-4D97-AF65-F5344CB8AC3E}">
+        <p14:creationId xmlns:p14="http://schemas.microsoft.com/office/powerpoint/2010/main" val="2329436069"/>
+      </p:ext>
+    </p:extLst>
+  </p:cSld>
+  <p:clrMapOvr>
+    <a:masterClrMapping/>
+  </p:clrMapOvr>
+</p:sld>
+</file>
+
+<file path=ppt/slides/slide39.xml><?xml version="1.0" encoding="utf-8"?>
 <p:sld xmlns:a="http://schemas.openxmlformats.org/drawingml/2006/main" xmlns:r="http://schemas.openxmlformats.org/officeDocument/2006/relationships" xmlns:p="http://schemas.openxmlformats.org/presentationml/2006/main">
   <p:cSld>
     <p:spTree>
@@ -14025,19 +13951,19 @@
         </p:spPr>
         <p:txBody>
           <a:bodyPr>
-            <a:normAutofit/>
+            <a:noAutofit/>
           </a:bodyPr>
           <a:lstStyle/>
           <a:p>
             <a:r>
-              <a:rPr lang="en-US" sz="1500" dirty="0">
+              <a:rPr lang="en-US" sz="1900" dirty="0">
                 <a:latin typeface="Times New Roman" panose="02020603050405020304" pitchFamily="18" charset="0"/>
                 <a:cs typeface="Times New Roman" panose="02020603050405020304" pitchFamily="18" charset="0"/>
               </a:rPr>
               <a:t>Quality </a:t>
             </a:r>
             <a:r>
-              <a:rPr lang="en-US" sz="1500" dirty="0" smtClean="0">
+              <a:rPr lang="en-US" sz="1900" dirty="0" smtClean="0">
                 <a:latin typeface="Times New Roman" panose="02020603050405020304" pitchFamily="18" charset="0"/>
                 <a:cs typeface="Times New Roman" panose="02020603050405020304" pitchFamily="18" charset="0"/>
               </a:rPr>
@@ -14047,14 +13973,14 @@
           <a:p>
             <a:pPr lvl="1"/>
             <a:r>
-              <a:rPr lang="en-US" sz="1100" dirty="0">
+              <a:rPr lang="en-US" sz="1900" dirty="0">
                 <a:latin typeface="Times New Roman" panose="02020603050405020304" pitchFamily="18" charset="0"/>
                 <a:cs typeface="Times New Roman" panose="02020603050405020304" pitchFamily="18" charset="0"/>
               </a:rPr>
               <a:t>The </a:t>
             </a:r>
             <a:r>
-              <a:rPr lang="en-US" sz="1100" dirty="0" err="1">
+              <a:rPr lang="en-US" sz="1900" dirty="0" err="1">
                 <a:solidFill>
                   <a:srgbClr val="C00000"/>
                 </a:solidFill>
@@ -14064,56 +13990,56 @@
               <a:t>doctest</a:t>
             </a:r>
             <a:r>
-              <a:rPr lang="en-US" sz="1100" dirty="0">
+              <a:rPr lang="en-US" sz="1900" dirty="0">
                 <a:latin typeface="Times New Roman" panose="02020603050405020304" pitchFamily="18" charset="0"/>
                 <a:cs typeface="Times New Roman" panose="02020603050405020304" pitchFamily="18" charset="0"/>
               </a:rPr>
               <a:t> module provides a tool for scanning a module and validating tests embedded in a program’s </a:t>
             </a:r>
             <a:r>
-              <a:rPr lang="en-US" sz="1100" dirty="0" err="1">
+              <a:rPr lang="en-US" sz="1900" dirty="0" err="1">
                 <a:latin typeface="Times New Roman" panose="02020603050405020304" pitchFamily="18" charset="0"/>
                 <a:cs typeface="Times New Roman" panose="02020603050405020304" pitchFamily="18" charset="0"/>
               </a:rPr>
               <a:t>docstrings</a:t>
             </a:r>
             <a:r>
-              <a:rPr lang="en-US" sz="1100" dirty="0">
+              <a:rPr lang="en-US" sz="1900" dirty="0">
                 <a:latin typeface="Times New Roman" panose="02020603050405020304" pitchFamily="18" charset="0"/>
                 <a:cs typeface="Times New Roman" panose="02020603050405020304" pitchFamily="18" charset="0"/>
               </a:rPr>
               <a:t>. Test construction is as simple as cutting-and-pasting a typical call along with its results into the </a:t>
             </a:r>
             <a:r>
-              <a:rPr lang="en-US" sz="1100" dirty="0" err="1">
+              <a:rPr lang="en-US" sz="1900" dirty="0" err="1">
                 <a:latin typeface="Times New Roman" panose="02020603050405020304" pitchFamily="18" charset="0"/>
                 <a:cs typeface="Times New Roman" panose="02020603050405020304" pitchFamily="18" charset="0"/>
               </a:rPr>
               <a:t>docstring</a:t>
             </a:r>
             <a:r>
-              <a:rPr lang="en-US" sz="1100" dirty="0">
+              <a:rPr lang="en-US" sz="1900" dirty="0">
                 <a:latin typeface="Times New Roman" panose="02020603050405020304" pitchFamily="18" charset="0"/>
                 <a:cs typeface="Times New Roman" panose="02020603050405020304" pitchFamily="18" charset="0"/>
               </a:rPr>
               <a:t>. This improves the documentation by providing the user with an example and it allows the </a:t>
             </a:r>
             <a:r>
-              <a:rPr lang="en-US" sz="1100" dirty="0" err="1">
+              <a:rPr lang="en-US" sz="1900" dirty="0" err="1">
                 <a:latin typeface="Times New Roman" panose="02020603050405020304" pitchFamily="18" charset="0"/>
                 <a:cs typeface="Times New Roman" panose="02020603050405020304" pitchFamily="18" charset="0"/>
               </a:rPr>
               <a:t>doctest</a:t>
             </a:r>
             <a:r>
-              <a:rPr lang="en-US" sz="1100" dirty="0">
+              <a:rPr lang="en-US" sz="1900" dirty="0">
                 <a:latin typeface="Times New Roman" panose="02020603050405020304" pitchFamily="18" charset="0"/>
                 <a:cs typeface="Times New Roman" panose="02020603050405020304" pitchFamily="18" charset="0"/>
               </a:rPr>
               <a:t> module to make sure the code remains true to the </a:t>
             </a:r>
             <a:r>
-              <a:rPr lang="en-US" sz="1100" dirty="0" smtClean="0">
+              <a:rPr lang="en-US" sz="1900" dirty="0" smtClean="0">
                 <a:latin typeface="Times New Roman" panose="02020603050405020304" pitchFamily="18" charset="0"/>
                 <a:cs typeface="Times New Roman" panose="02020603050405020304" pitchFamily="18" charset="0"/>
               </a:rPr>
@@ -14122,14 +14048,14 @@
           </a:p>
           <a:p>
             <a:pPr lvl="1"/>
-            <a:endParaRPr lang="en-US" sz="1000" dirty="0">
+            <a:endParaRPr lang="en-US" sz="1900" dirty="0">
               <a:latin typeface="Times New Roman" panose="02020603050405020304" pitchFamily="18" charset="0"/>
               <a:cs typeface="Times New Roman" panose="02020603050405020304" pitchFamily="18" charset="0"/>
             </a:endParaRPr>
           </a:p>
           <a:p>
             <a:r>
-              <a:rPr lang="en-US" sz="1500" dirty="0" smtClean="0">
+              <a:rPr lang="en-US" sz="1900" dirty="0" smtClean="0">
                 <a:latin typeface="Times New Roman" panose="02020603050405020304" pitchFamily="18" charset="0"/>
                 <a:cs typeface="Times New Roman" panose="02020603050405020304" pitchFamily="18" charset="0"/>
               </a:rPr>
@@ -14139,14 +14065,14 @@
           <a:p>
             <a:pPr lvl="1"/>
             <a:r>
-              <a:rPr lang="en-US" sz="1100" dirty="0">
+              <a:rPr lang="en-US" sz="1900" dirty="0">
                 <a:latin typeface="Times New Roman" panose="02020603050405020304" pitchFamily="18" charset="0"/>
                 <a:cs typeface="Times New Roman" panose="02020603050405020304" pitchFamily="18" charset="0"/>
               </a:rPr>
               <a:t>The </a:t>
             </a:r>
             <a:r>
-              <a:rPr lang="en-US" sz="1100" dirty="0" err="1">
+              <a:rPr lang="en-US" sz="1900" dirty="0" err="1">
                 <a:solidFill>
                   <a:srgbClr val="C00000"/>
                 </a:solidFill>
@@ -14156,14 +14082,14 @@
               <a:t>reprlib</a:t>
             </a:r>
             <a:r>
-              <a:rPr lang="en-US" sz="1100" dirty="0">
+              <a:rPr lang="en-US" sz="1900" dirty="0">
                 <a:latin typeface="Times New Roman" panose="02020603050405020304" pitchFamily="18" charset="0"/>
                 <a:cs typeface="Times New Roman" panose="02020603050405020304" pitchFamily="18" charset="0"/>
               </a:rPr>
               <a:t> module provides a version of </a:t>
             </a:r>
             <a:r>
-              <a:rPr lang="en-US" sz="1100" dirty="0" err="1">
+              <a:rPr lang="en-US" sz="1900" dirty="0" err="1">
                 <a:solidFill>
                   <a:srgbClr val="C00000"/>
                 </a:solidFill>
@@ -14173,7 +14099,7 @@
               <a:t>repr</a:t>
             </a:r>
             <a:r>
-              <a:rPr lang="en-US" sz="1100" dirty="0">
+              <a:rPr lang="en-US" sz="1900" dirty="0">
                 <a:solidFill>
                   <a:srgbClr val="C00000"/>
                 </a:solidFill>
@@ -14183,14 +14109,14 @@
               <a:t>()</a:t>
             </a:r>
             <a:r>
-              <a:rPr lang="en-US" sz="1100" dirty="0">
+              <a:rPr lang="en-US" sz="1900" dirty="0">
                 <a:latin typeface="Times New Roman" panose="02020603050405020304" pitchFamily="18" charset="0"/>
                 <a:cs typeface="Times New Roman" panose="02020603050405020304" pitchFamily="18" charset="0"/>
               </a:rPr>
               <a:t> customized for abbreviated displays of large or deeply nested </a:t>
             </a:r>
             <a:r>
-              <a:rPr lang="en-US" sz="1100" dirty="0" smtClean="0">
+              <a:rPr lang="en-US" sz="1900" dirty="0" smtClean="0">
                 <a:latin typeface="Times New Roman" panose="02020603050405020304" pitchFamily="18" charset="0"/>
                 <a:cs typeface="Times New Roman" panose="02020603050405020304" pitchFamily="18" charset="0"/>
               </a:rPr>
@@ -14200,14 +14126,14 @@
           <a:p>
             <a:pPr lvl="1"/>
             <a:r>
-              <a:rPr lang="en-US" sz="1100" dirty="0">
+              <a:rPr lang="en-US" sz="1900" dirty="0">
                 <a:latin typeface="Times New Roman" panose="02020603050405020304" pitchFamily="18" charset="0"/>
                 <a:cs typeface="Times New Roman" panose="02020603050405020304" pitchFamily="18" charset="0"/>
               </a:rPr>
               <a:t>The </a:t>
             </a:r>
             <a:r>
-              <a:rPr lang="en-US" sz="1100" dirty="0" err="1">
+              <a:rPr lang="en-US" sz="1900" dirty="0" err="1">
                 <a:solidFill>
                   <a:srgbClr val="C00000"/>
                 </a:solidFill>
@@ -14217,14 +14143,14 @@
               <a:t>pprint</a:t>
             </a:r>
             <a:r>
-              <a:rPr lang="en-US" sz="1100" dirty="0">
+              <a:rPr lang="en-US" sz="1900" dirty="0">
                 <a:latin typeface="Times New Roman" panose="02020603050405020304" pitchFamily="18" charset="0"/>
                 <a:cs typeface="Times New Roman" panose="02020603050405020304" pitchFamily="18" charset="0"/>
               </a:rPr>
               <a:t> module offers more sophisticated control over printing both built-in and user defined objects in a way that is readable by the interpreter. When the result is longer than one line, the “pretty printer” adds line breaks and indentation to more clearly reveal data </a:t>
             </a:r>
             <a:r>
-              <a:rPr lang="en-US" sz="1100" dirty="0" smtClean="0">
+              <a:rPr lang="en-US" sz="1900" dirty="0" smtClean="0">
                 <a:latin typeface="Times New Roman" panose="02020603050405020304" pitchFamily="18" charset="0"/>
                 <a:cs typeface="Times New Roman" panose="02020603050405020304" pitchFamily="18" charset="0"/>
               </a:rPr>
@@ -14234,14 +14160,14 @@
           <a:p>
             <a:pPr lvl="1"/>
             <a:r>
-              <a:rPr lang="en-US" sz="1100" dirty="0">
+              <a:rPr lang="en-US" sz="1900" dirty="0">
                 <a:latin typeface="Times New Roman" panose="02020603050405020304" pitchFamily="18" charset="0"/>
                 <a:cs typeface="Times New Roman" panose="02020603050405020304" pitchFamily="18" charset="0"/>
               </a:rPr>
               <a:t>The </a:t>
             </a:r>
             <a:r>
-              <a:rPr lang="en-US" sz="1100" dirty="0" err="1">
+              <a:rPr lang="en-US" sz="1900" dirty="0" err="1">
                 <a:solidFill>
                   <a:srgbClr val="C00000"/>
                 </a:solidFill>
@@ -14251,14 +14177,14 @@
               <a:t>textwrap</a:t>
             </a:r>
             <a:r>
-              <a:rPr lang="en-US" sz="1100" dirty="0">
+              <a:rPr lang="en-US" sz="1900" dirty="0">
                 <a:latin typeface="Times New Roman" panose="02020603050405020304" pitchFamily="18" charset="0"/>
                 <a:cs typeface="Times New Roman" panose="02020603050405020304" pitchFamily="18" charset="0"/>
               </a:rPr>
               <a:t> module formats paragraphs of text to fit a given screen </a:t>
             </a:r>
             <a:r>
-              <a:rPr lang="en-US" sz="1100" dirty="0" smtClean="0">
+              <a:rPr lang="en-US" sz="1900" dirty="0" smtClean="0">
                 <a:latin typeface="Times New Roman" panose="02020603050405020304" pitchFamily="18" charset="0"/>
                 <a:cs typeface="Times New Roman" panose="02020603050405020304" pitchFamily="18" charset="0"/>
               </a:rPr>
@@ -14268,14 +14194,14 @@
           <a:p>
             <a:pPr lvl="1"/>
             <a:r>
-              <a:rPr lang="en-US" sz="1100" dirty="0">
+              <a:rPr lang="en-US" sz="1900" dirty="0">
                 <a:latin typeface="Times New Roman" panose="02020603050405020304" pitchFamily="18" charset="0"/>
                 <a:cs typeface="Times New Roman" panose="02020603050405020304" pitchFamily="18" charset="0"/>
               </a:rPr>
               <a:t>The </a:t>
             </a:r>
             <a:r>
-              <a:rPr lang="en-US" sz="1100" dirty="0">
+              <a:rPr lang="en-US" sz="1900" dirty="0">
                 <a:solidFill>
                   <a:srgbClr val="C00000"/>
                 </a:solidFill>
@@ -14285,14 +14211,14 @@
               <a:t>locale</a:t>
             </a:r>
             <a:r>
-              <a:rPr lang="en-US" sz="1100" dirty="0">
+              <a:rPr lang="en-US" sz="1900" dirty="0">
                 <a:latin typeface="Times New Roman" panose="02020603050405020304" pitchFamily="18" charset="0"/>
                 <a:cs typeface="Times New Roman" panose="02020603050405020304" pitchFamily="18" charset="0"/>
               </a:rPr>
               <a:t> module accesses a database of culture specific data formats. The grouping attribute of locale’s format function provides a direct way of formatting numbers with group </a:t>
             </a:r>
             <a:r>
-              <a:rPr lang="en-US" sz="1100" dirty="0" smtClean="0">
+              <a:rPr lang="en-US" sz="1900" dirty="0" smtClean="0">
                 <a:latin typeface="Times New Roman" panose="02020603050405020304" pitchFamily="18" charset="0"/>
                 <a:cs typeface="Times New Roman" panose="02020603050405020304" pitchFamily="18" charset="0"/>
               </a:rPr>
@@ -14301,28 +14227,28 @@
           </a:p>
           <a:p>
             <a:pPr lvl="1"/>
-            <a:endParaRPr lang="en-US" sz="1100" dirty="0">
+            <a:endParaRPr lang="en-US" sz="1900" dirty="0">
               <a:latin typeface="Times New Roman" panose="02020603050405020304" pitchFamily="18" charset="0"/>
               <a:cs typeface="Times New Roman" panose="02020603050405020304" pitchFamily="18" charset="0"/>
             </a:endParaRPr>
           </a:p>
           <a:p>
             <a:r>
-              <a:rPr lang="en-US" sz="1500" dirty="0" smtClean="0">
+              <a:rPr lang="en-US" sz="1900" dirty="0" smtClean="0">
                 <a:latin typeface="Times New Roman" panose="02020603050405020304" pitchFamily="18" charset="0"/>
                 <a:cs typeface="Times New Roman" panose="02020603050405020304" pitchFamily="18" charset="0"/>
               </a:rPr>
               <a:t>Working </a:t>
             </a:r>
             <a:r>
-              <a:rPr lang="en-US" sz="1500" dirty="0">
+              <a:rPr lang="en-US" sz="1900" dirty="0">
                 <a:latin typeface="Times New Roman" panose="02020603050405020304" pitchFamily="18" charset="0"/>
                 <a:cs typeface="Times New Roman" panose="02020603050405020304" pitchFamily="18" charset="0"/>
               </a:rPr>
               <a:t>with Binary Data Record </a:t>
             </a:r>
             <a:r>
-              <a:rPr lang="en-US" sz="1500" dirty="0" smtClean="0">
+              <a:rPr lang="en-US" sz="1900" dirty="0" smtClean="0">
                 <a:latin typeface="Times New Roman" panose="02020603050405020304" pitchFamily="18" charset="0"/>
                 <a:cs typeface="Times New Roman" panose="02020603050405020304" pitchFamily="18" charset="0"/>
               </a:rPr>
@@ -14332,14 +14258,14 @@
           <a:p>
             <a:pPr lvl="1"/>
             <a:r>
-              <a:rPr lang="en-US" sz="1100" dirty="0">
+              <a:rPr lang="en-US" sz="1900" dirty="0">
                 <a:latin typeface="Times New Roman" panose="02020603050405020304" pitchFamily="18" charset="0"/>
                 <a:cs typeface="Times New Roman" panose="02020603050405020304" pitchFamily="18" charset="0"/>
               </a:rPr>
               <a:t>The </a:t>
             </a:r>
             <a:r>
-              <a:rPr lang="en-US" sz="1100" dirty="0" err="1">
+              <a:rPr lang="en-US" sz="1900" dirty="0" err="1">
                 <a:solidFill>
                   <a:srgbClr val="C00000"/>
                 </a:solidFill>
@@ -14349,14 +14275,14 @@
               <a:t>struct</a:t>
             </a:r>
             <a:r>
-              <a:rPr lang="en-US" sz="1100" dirty="0">
+              <a:rPr lang="en-US" sz="1900" dirty="0">
                 <a:latin typeface="Times New Roman" panose="02020603050405020304" pitchFamily="18" charset="0"/>
                 <a:cs typeface="Times New Roman" panose="02020603050405020304" pitchFamily="18" charset="0"/>
               </a:rPr>
               <a:t> module provides </a:t>
             </a:r>
             <a:r>
-              <a:rPr lang="en-US" sz="1100" dirty="0">
+              <a:rPr lang="en-US" sz="1900" dirty="0">
                 <a:solidFill>
                   <a:srgbClr val="C00000"/>
                 </a:solidFill>
@@ -14366,14 +14292,14 @@
               <a:t>pack() </a:t>
             </a:r>
             <a:r>
-              <a:rPr lang="en-US" sz="1100" dirty="0">
+              <a:rPr lang="en-US" sz="1900" dirty="0">
                 <a:latin typeface="Times New Roman" panose="02020603050405020304" pitchFamily="18" charset="0"/>
                 <a:cs typeface="Times New Roman" panose="02020603050405020304" pitchFamily="18" charset="0"/>
               </a:rPr>
               <a:t>and </a:t>
             </a:r>
             <a:r>
-              <a:rPr lang="en-US" sz="1100" dirty="0">
+              <a:rPr lang="en-US" sz="1900" dirty="0">
                 <a:solidFill>
                   <a:srgbClr val="C00000"/>
                 </a:solidFill>
@@ -14383,14 +14309,14 @@
               <a:t>unpack()</a:t>
             </a:r>
             <a:r>
-              <a:rPr lang="en-US" sz="1100" dirty="0">
+              <a:rPr lang="en-US" sz="1900" dirty="0">
                 <a:latin typeface="Times New Roman" panose="02020603050405020304" pitchFamily="18" charset="0"/>
                 <a:cs typeface="Times New Roman" panose="02020603050405020304" pitchFamily="18" charset="0"/>
               </a:rPr>
               <a:t> functions for working with variable length binary record </a:t>
             </a:r>
             <a:r>
-              <a:rPr lang="en-US" sz="1100" dirty="0" smtClean="0">
+              <a:rPr lang="en-US" sz="1900" dirty="0" smtClean="0">
                 <a:latin typeface="Times New Roman" panose="02020603050405020304" pitchFamily="18" charset="0"/>
                 <a:cs typeface="Times New Roman" panose="02020603050405020304" pitchFamily="18" charset="0"/>
               </a:rPr>
@@ -14399,248 +14325,10 @@
           </a:p>
           <a:p>
             <a:pPr lvl="1"/>
-            <a:endParaRPr lang="en-US" sz="1000" dirty="0">
+            <a:endParaRPr lang="en-US" sz="1900" dirty="0">
               <a:latin typeface="Times New Roman" panose="02020603050405020304" pitchFamily="18" charset="0"/>
               <a:cs typeface="Times New Roman" panose="02020603050405020304" pitchFamily="18" charset="0"/>
             </a:endParaRPr>
-          </a:p>
-          <a:p>
-            <a:r>
-              <a:rPr lang="en-US" sz="1500" dirty="0" smtClean="0">
-                <a:latin typeface="Times New Roman" panose="02020603050405020304" pitchFamily="18" charset="0"/>
-                <a:cs typeface="Times New Roman" panose="02020603050405020304" pitchFamily="18" charset="0"/>
-              </a:rPr>
-              <a:t>Logging</a:t>
-            </a:r>
-          </a:p>
-          <a:p>
-            <a:pPr lvl="1"/>
-            <a:r>
-              <a:rPr lang="en-US" sz="1100" dirty="0">
-                <a:latin typeface="Times New Roman" panose="02020603050405020304" pitchFamily="18" charset="0"/>
-                <a:cs typeface="Times New Roman" panose="02020603050405020304" pitchFamily="18" charset="0"/>
-              </a:rPr>
-              <a:t>The </a:t>
-            </a:r>
-            <a:r>
-              <a:rPr lang="en-US" sz="1100" dirty="0">
-                <a:solidFill>
-                  <a:srgbClr val="C00000"/>
-                </a:solidFill>
-                <a:latin typeface="Times New Roman" panose="02020603050405020304" pitchFamily="18" charset="0"/>
-                <a:cs typeface="Times New Roman" panose="02020603050405020304" pitchFamily="18" charset="0"/>
-              </a:rPr>
-              <a:t>logging</a:t>
-            </a:r>
-            <a:r>
-              <a:rPr lang="en-US" sz="1100" dirty="0">
-                <a:latin typeface="Times New Roman" panose="02020603050405020304" pitchFamily="18" charset="0"/>
-                <a:cs typeface="Times New Roman" panose="02020603050405020304" pitchFamily="18" charset="0"/>
-              </a:rPr>
-              <a:t> module offers a full featured and flexible logging system. At its simplest, log messages are sent to a file or to </a:t>
-            </a:r>
-            <a:r>
-              <a:rPr lang="en-US" sz="1100" dirty="0" err="1" smtClean="0">
-                <a:solidFill>
-                  <a:schemeClr val="accent2">
-                    <a:lumMod val="75000"/>
-                  </a:schemeClr>
-                </a:solidFill>
-                <a:latin typeface="Times New Roman" panose="02020603050405020304" pitchFamily="18" charset="0"/>
-                <a:cs typeface="Times New Roman" panose="02020603050405020304" pitchFamily="18" charset="0"/>
-              </a:rPr>
-              <a:t>sys.stderr</a:t>
-            </a:r>
-            <a:endParaRPr lang="en-US" sz="1100" dirty="0" smtClean="0">
-              <a:solidFill>
-                <a:schemeClr val="accent2">
-                  <a:lumMod val="75000"/>
-                </a:schemeClr>
-              </a:solidFill>
-              <a:latin typeface="Times New Roman" panose="02020603050405020304" pitchFamily="18" charset="0"/>
-              <a:cs typeface="Times New Roman" panose="02020603050405020304" pitchFamily="18" charset="0"/>
-            </a:endParaRPr>
-          </a:p>
-          <a:p>
-            <a:pPr marL="457200" lvl="1" indent="0">
-              <a:buNone/>
-            </a:pPr>
-            <a:endParaRPr lang="en-US" sz="1100" dirty="0">
-              <a:latin typeface="Times New Roman" panose="02020603050405020304" pitchFamily="18" charset="0"/>
-              <a:cs typeface="Times New Roman" panose="02020603050405020304" pitchFamily="18" charset="0"/>
-            </a:endParaRPr>
-          </a:p>
-          <a:p>
-            <a:r>
-              <a:rPr lang="en-US" sz="1500" dirty="0">
-                <a:latin typeface="Times New Roman" panose="02020603050405020304" pitchFamily="18" charset="0"/>
-                <a:cs typeface="Times New Roman" panose="02020603050405020304" pitchFamily="18" charset="0"/>
-              </a:rPr>
-              <a:t>Tools for Working with </a:t>
-            </a:r>
-            <a:r>
-              <a:rPr lang="en-US" sz="1500" dirty="0" smtClean="0">
-                <a:latin typeface="Times New Roman" panose="02020603050405020304" pitchFamily="18" charset="0"/>
-                <a:cs typeface="Times New Roman" panose="02020603050405020304" pitchFamily="18" charset="0"/>
-              </a:rPr>
-              <a:t>Lists</a:t>
-            </a:r>
-          </a:p>
-          <a:p>
-            <a:pPr lvl="1"/>
-            <a:r>
-              <a:rPr lang="en-US" sz="1100" dirty="0">
-                <a:latin typeface="Times New Roman" panose="02020603050405020304" pitchFamily="18" charset="0"/>
-                <a:cs typeface="Times New Roman" panose="02020603050405020304" pitchFamily="18" charset="0"/>
-              </a:rPr>
-              <a:t>Many data structure needs can be met with the built-in list type. However, sometimes there is a need for alternative implementations with different performance </a:t>
-            </a:r>
-            <a:r>
-              <a:rPr lang="en-US" sz="1100" dirty="0" smtClean="0">
-                <a:latin typeface="Times New Roman" panose="02020603050405020304" pitchFamily="18" charset="0"/>
-                <a:cs typeface="Times New Roman" panose="02020603050405020304" pitchFamily="18" charset="0"/>
-              </a:rPr>
-              <a:t>trade-offs</a:t>
-            </a:r>
-          </a:p>
-          <a:p>
-            <a:pPr lvl="1"/>
-            <a:r>
-              <a:rPr lang="en-US" sz="1100" dirty="0">
-                <a:latin typeface="Times New Roman" panose="02020603050405020304" pitchFamily="18" charset="0"/>
-                <a:cs typeface="Times New Roman" panose="02020603050405020304" pitchFamily="18" charset="0"/>
-              </a:rPr>
-              <a:t>The </a:t>
-            </a:r>
-            <a:r>
-              <a:rPr lang="en-US" sz="1100" dirty="0">
-                <a:solidFill>
-                  <a:srgbClr val="C00000"/>
-                </a:solidFill>
-                <a:latin typeface="Times New Roman" panose="02020603050405020304" pitchFamily="18" charset="0"/>
-                <a:cs typeface="Times New Roman" panose="02020603050405020304" pitchFamily="18" charset="0"/>
-              </a:rPr>
-              <a:t>array</a:t>
-            </a:r>
-            <a:r>
-              <a:rPr lang="en-US" sz="1100" dirty="0">
-                <a:latin typeface="Times New Roman" panose="02020603050405020304" pitchFamily="18" charset="0"/>
-                <a:cs typeface="Times New Roman" panose="02020603050405020304" pitchFamily="18" charset="0"/>
-              </a:rPr>
-              <a:t> module provides an </a:t>
-            </a:r>
-            <a:r>
-              <a:rPr lang="en-US" sz="1100" dirty="0">
-                <a:solidFill>
-                  <a:srgbClr val="C00000"/>
-                </a:solidFill>
-                <a:latin typeface="Times New Roman" panose="02020603050405020304" pitchFamily="18" charset="0"/>
-                <a:cs typeface="Times New Roman" panose="02020603050405020304" pitchFamily="18" charset="0"/>
-              </a:rPr>
-              <a:t>array() </a:t>
-            </a:r>
-            <a:r>
-              <a:rPr lang="en-US" sz="1100" dirty="0">
-                <a:latin typeface="Times New Roman" panose="02020603050405020304" pitchFamily="18" charset="0"/>
-                <a:cs typeface="Times New Roman" panose="02020603050405020304" pitchFamily="18" charset="0"/>
-              </a:rPr>
-              <a:t>object that is like a list that stores only homogeneous data and stores it more </a:t>
-            </a:r>
-            <a:r>
-              <a:rPr lang="en-US" sz="1100" dirty="0" smtClean="0">
-                <a:latin typeface="Times New Roman" panose="02020603050405020304" pitchFamily="18" charset="0"/>
-                <a:cs typeface="Times New Roman" panose="02020603050405020304" pitchFamily="18" charset="0"/>
-              </a:rPr>
-              <a:t>compactly</a:t>
-            </a:r>
-          </a:p>
-          <a:p>
-            <a:pPr lvl="1"/>
-            <a:r>
-              <a:rPr lang="en-US" sz="1100" dirty="0">
-                <a:latin typeface="Times New Roman" panose="02020603050405020304" pitchFamily="18" charset="0"/>
-                <a:cs typeface="Times New Roman" panose="02020603050405020304" pitchFamily="18" charset="0"/>
-              </a:rPr>
-              <a:t>The </a:t>
-            </a:r>
-            <a:r>
-              <a:rPr lang="en-US" sz="1100" dirty="0">
-                <a:solidFill>
-                  <a:srgbClr val="C00000"/>
-                </a:solidFill>
-                <a:latin typeface="Times New Roman" panose="02020603050405020304" pitchFamily="18" charset="0"/>
-                <a:cs typeface="Times New Roman" panose="02020603050405020304" pitchFamily="18" charset="0"/>
-              </a:rPr>
-              <a:t>collections</a:t>
-            </a:r>
-            <a:r>
-              <a:rPr lang="en-US" sz="1100" dirty="0">
-                <a:latin typeface="Times New Roman" panose="02020603050405020304" pitchFamily="18" charset="0"/>
-                <a:cs typeface="Times New Roman" panose="02020603050405020304" pitchFamily="18" charset="0"/>
-              </a:rPr>
-              <a:t> module provides a </a:t>
-            </a:r>
-            <a:r>
-              <a:rPr lang="en-US" sz="1100" dirty="0" err="1">
-                <a:solidFill>
-                  <a:srgbClr val="C00000"/>
-                </a:solidFill>
-                <a:latin typeface="Times New Roman" panose="02020603050405020304" pitchFamily="18" charset="0"/>
-                <a:cs typeface="Times New Roman" panose="02020603050405020304" pitchFamily="18" charset="0"/>
-              </a:rPr>
-              <a:t>deque</a:t>
-            </a:r>
-            <a:r>
-              <a:rPr lang="en-US" sz="1100" dirty="0">
-                <a:solidFill>
-                  <a:srgbClr val="C00000"/>
-                </a:solidFill>
-                <a:latin typeface="Times New Roman" panose="02020603050405020304" pitchFamily="18" charset="0"/>
-                <a:cs typeface="Times New Roman" panose="02020603050405020304" pitchFamily="18" charset="0"/>
-              </a:rPr>
-              <a:t>() </a:t>
-            </a:r>
-            <a:r>
-              <a:rPr lang="en-US" sz="1100" dirty="0">
-                <a:latin typeface="Times New Roman" panose="02020603050405020304" pitchFamily="18" charset="0"/>
-                <a:cs typeface="Times New Roman" panose="02020603050405020304" pitchFamily="18" charset="0"/>
-              </a:rPr>
-              <a:t>object that is like a list with faster appends and pops from the left side but slower lookups in the middle. These objects are well suited for implementing queues and breadth first tree </a:t>
-            </a:r>
-            <a:r>
-              <a:rPr lang="en-US" sz="1100" dirty="0" smtClean="0">
-                <a:latin typeface="Times New Roman" panose="02020603050405020304" pitchFamily="18" charset="0"/>
-                <a:cs typeface="Times New Roman" panose="02020603050405020304" pitchFamily="18" charset="0"/>
-              </a:rPr>
-              <a:t>searches</a:t>
-            </a:r>
-          </a:p>
-          <a:p>
-            <a:pPr lvl="1"/>
-            <a:r>
-              <a:rPr lang="en-US" sz="1100" dirty="0">
-                <a:latin typeface="Times New Roman" panose="02020603050405020304" pitchFamily="18" charset="0"/>
-                <a:cs typeface="Times New Roman" panose="02020603050405020304" pitchFamily="18" charset="0"/>
-              </a:rPr>
-              <a:t>The </a:t>
-            </a:r>
-            <a:r>
-              <a:rPr lang="en-US" sz="1100" dirty="0" err="1">
-                <a:solidFill>
-                  <a:srgbClr val="C00000"/>
-                </a:solidFill>
-                <a:latin typeface="Times New Roman" panose="02020603050405020304" pitchFamily="18" charset="0"/>
-                <a:cs typeface="Times New Roman" panose="02020603050405020304" pitchFamily="18" charset="0"/>
-              </a:rPr>
-              <a:t>heapq</a:t>
-            </a:r>
-            <a:r>
-              <a:rPr lang="en-US" sz="1100" dirty="0">
-                <a:latin typeface="Times New Roman" panose="02020603050405020304" pitchFamily="18" charset="0"/>
-                <a:cs typeface="Times New Roman" panose="02020603050405020304" pitchFamily="18" charset="0"/>
-              </a:rPr>
-              <a:t> module provides functions for implementing heaps based on regular lists. The lowest valued entry is always kept at position zero. This is useful for applications which repeatedly access the smallest element but do not want to run a full list sort</a:t>
-            </a:r>
           </a:p>
         </p:txBody>
       </p:sp>
@@ -14701,31 +14389,7 @@
                 <a:cs typeface="Calibri"/>
                 <a:sym typeface="Calibri"/>
               </a:rPr>
-              <a:t>I</a:t>
-            </a:r>
-            <a:r>
-              <a:rPr lang="en-US" dirty="0">
-                <a:solidFill>
-                  <a:schemeClr val="dk1"/>
-                </a:solidFill>
-                <a:latin typeface="Calibri"/>
-                <a:ea typeface="Calibri"/>
-                <a:cs typeface="Calibri"/>
-                <a:sym typeface="Calibri"/>
-              </a:rPr>
-              <a:t>nstalling </a:t>
-            </a:r>
-            <a:r>
-              <a:rPr lang="en-US" dirty="0">
-                <a:solidFill>
-                  <a:schemeClr val="dk1"/>
-                </a:solidFill>
-                <a:latin typeface="Calibri"/>
-                <a:ea typeface="Calibri"/>
-                <a:cs typeface="Calibri"/>
-                <a:sym typeface="Calibri"/>
-              </a:rPr>
-              <a:t>Anaconda</a:t>
+              <a:t>Installing Anaconda</a:t>
             </a:r>
           </a:p>
         </p:txBody>
@@ -14759,18 +14423,7 @@
                 <a:ea typeface="Times New Roman"/>
                 <a:cs typeface="Times New Roman"/>
               </a:rPr>
-              <a:t>System </a:t>
-            </a:r>
-            <a:r>
-              <a:rPr lang="en-US" sz="2400" dirty="0">
-                <a:solidFill>
-                  <a:schemeClr val="dk1"/>
-                </a:solidFill>
-                <a:latin typeface="Times New Roman"/>
-                <a:ea typeface="Times New Roman"/>
-                <a:cs typeface="Times New Roman"/>
-              </a:rPr>
-              <a:t>requirements</a:t>
+              <a:t>System requirements</a:t>
             </a:r>
           </a:p>
           <a:p>
@@ -14785,8 +14438,11 @@
                 <a:cs typeface="Times New Roman"/>
                 <a:sym typeface="Calibri"/>
               </a:rPr>
-              <a:t>32- or 64-bit computer</a:t>
-            </a:r>
+              <a:t>32- or 64-bit computer.</a:t>
+            </a:r>
+          </a:p>
+          <a:p>
+            <a:pPr lvl="1"/>
             <a:r>
               <a:rPr lang="en-US" dirty="0">
                 <a:solidFill>
@@ -14797,7 +14453,7 @@
                 <a:cs typeface="Times New Roman"/>
                 <a:sym typeface="Calibri"/>
               </a:rPr>
-              <a:t>.</a:t>
+              <a:t> For Anaconda—Minimum 3 GB disk space to download and install.</a:t>
             </a:r>
           </a:p>
           <a:p>
@@ -14812,7 +14468,19 @@
                 <a:cs typeface="Times New Roman"/>
                 <a:sym typeface="Calibri"/>
               </a:rPr>
-              <a:t> For </a:t>
+              <a:t>Windows, </a:t>
+            </a:r>
+            <a:r>
+              <a:rPr lang="en-US" dirty="0" err="1">
+                <a:solidFill>
+                  <a:schemeClr val="dk1"/>
+                </a:solidFill>
+                <a:latin typeface="Times New Roman"/>
+                <a:ea typeface="Times New Roman"/>
+                <a:cs typeface="Times New Roman"/>
+                <a:sym typeface="Calibri"/>
+              </a:rPr>
+              <a:t>macOS</a:t>
             </a:r>
             <a:r>
               <a:rPr lang="en-US" dirty="0">
@@ -14824,58 +14492,7 @@
                 <a:cs typeface="Times New Roman"/>
                 <a:sym typeface="Calibri"/>
               </a:rPr>
-              <a:t>Anaconda—Minimum 3 GB disk space to download and install.</a:t>
-            </a:r>
-          </a:p>
-          <a:p>
-            <a:pPr lvl="1"/>
-            <a:r>
-              <a:rPr lang="en-US" dirty="0">
-                <a:solidFill>
-                  <a:schemeClr val="dk1"/>
-                </a:solidFill>
-                <a:latin typeface="Times New Roman"/>
-                <a:ea typeface="Times New Roman"/>
-                <a:cs typeface="Times New Roman"/>
-                <a:sym typeface="Calibri"/>
-              </a:rPr>
-              <a:t>Windows, </a:t>
-            </a:r>
-            <a:r>
-              <a:rPr lang="en-US" dirty="0" err="1">
-                <a:solidFill>
-                  <a:schemeClr val="dk1"/>
-                </a:solidFill>
-                <a:latin typeface="Times New Roman"/>
-                <a:ea typeface="Times New Roman"/>
-                <a:cs typeface="Times New Roman"/>
-                <a:sym typeface="Calibri"/>
-              </a:rPr>
-              <a:t>macOS</a:t>
-            </a:r>
-            <a:r>
-              <a:rPr lang="en-US" dirty="0">
-                <a:solidFill>
-                  <a:schemeClr val="dk1"/>
-                </a:solidFill>
-                <a:latin typeface="Times New Roman"/>
-                <a:ea typeface="Times New Roman"/>
-                <a:cs typeface="Times New Roman"/>
-                <a:sym typeface="Calibri"/>
-              </a:rPr>
-              <a:t> or Linux</a:t>
-            </a:r>
-            <a:r>
-              <a:rPr lang="en-US" dirty="0">
-                <a:solidFill>
-                  <a:schemeClr val="dk1"/>
-                </a:solidFill>
-                <a:latin typeface="Times New Roman"/>
-                <a:ea typeface="Times New Roman"/>
-                <a:cs typeface="Times New Roman"/>
-                <a:sym typeface="Calibri"/>
-              </a:rPr>
-              <a:t>.</a:t>
+              <a:t> or Linux.</a:t>
             </a:r>
           </a:p>
           <a:p>
@@ -14900,27 +14517,8 @@
                 <a:ea typeface="Times New Roman"/>
                 <a:cs typeface="Times New Roman"/>
               </a:rPr>
-              <a:t>NOTE: You do not need administrative or root permissions to install Anaconda if you select a user-writable install location</a:t>
-            </a:r>
-            <a:r>
-              <a:rPr lang="en-US" sz="2400" dirty="0">
-                <a:solidFill>
-                  <a:schemeClr val="dk1"/>
-                </a:solidFill>
-                <a:latin typeface="Times New Roman"/>
-                <a:ea typeface="Times New Roman"/>
-                <a:cs typeface="Times New Roman"/>
-              </a:rPr>
-              <a:t>.</a:t>
-            </a:r>
-            <a:endParaRPr lang="en-US" sz="2400" dirty="0">
-              <a:solidFill>
-                <a:schemeClr val="dk1"/>
-              </a:solidFill>
-              <a:latin typeface="Times New Roman"/>
-              <a:ea typeface="Times New Roman"/>
-              <a:cs typeface="Times New Roman"/>
-            </a:endParaRPr>
+              <a:t>NOTE: You do not need administrative or root permissions to install Anaconda if you select a user-writable install location.</a:t>
+            </a:r>
           </a:p>
           <a:p>
             <a:endParaRPr lang="en-US" sz="2400" dirty="0"/>
@@ -14931,6 +14529,298 @@
     <p:extLst>
       <p:ext uri="{BB962C8B-B14F-4D97-AF65-F5344CB8AC3E}">
         <p14:creationId xmlns:p14="http://schemas.microsoft.com/office/powerpoint/2010/main" val="563994501"/>
+      </p:ext>
+    </p:extLst>
+  </p:cSld>
+  <p:clrMapOvr>
+    <a:masterClrMapping/>
+  </p:clrMapOvr>
+</p:sld>
+</file>
+
+<file path=ppt/slides/slide40.xml><?xml version="1.0" encoding="utf-8"?>
+<p:sld xmlns:a="http://schemas.openxmlformats.org/drawingml/2006/main" xmlns:r="http://schemas.openxmlformats.org/officeDocument/2006/relationships" xmlns:p="http://schemas.openxmlformats.org/presentationml/2006/main">
+  <p:cSld>
+    <p:spTree>
+      <p:nvGrpSpPr>
+        <p:cNvPr id="1" name=""/>
+        <p:cNvGrpSpPr/>
+        <p:nvPr/>
+      </p:nvGrpSpPr>
+      <p:grpSpPr>
+        <a:xfrm>
+          <a:off x="0" y="0"/>
+          <a:ext cx="0" cy="0"/>
+          <a:chOff x="0" y="0"/>
+          <a:chExt cx="0" cy="0"/>
+        </a:xfrm>
+      </p:grpSpPr>
+      <p:sp>
+        <p:nvSpPr>
+          <p:cNvPr id="2" name="Title 1"/>
+          <p:cNvSpPr>
+            <a:spLocks noGrp="1"/>
+          </p:cNvSpPr>
+          <p:nvPr>
+            <p:ph type="title"/>
+          </p:nvPr>
+        </p:nvSpPr>
+        <p:spPr/>
+        <p:txBody>
+          <a:bodyPr/>
+          <a:lstStyle/>
+          <a:p>
+            <a:r>
+              <a:rPr lang="en-US" dirty="0"/>
+              <a:t>Standard Libraries</a:t>
+            </a:r>
+            <a:endParaRPr lang="en-US" dirty="0"/>
+          </a:p>
+        </p:txBody>
+      </p:sp>
+      <p:sp>
+        <p:nvSpPr>
+          <p:cNvPr id="3" name="Content Placeholder 2"/>
+          <p:cNvSpPr>
+            <a:spLocks noGrp="1"/>
+          </p:cNvSpPr>
+          <p:nvPr>
+            <p:ph idx="1"/>
+          </p:nvPr>
+        </p:nvSpPr>
+        <p:spPr/>
+        <p:txBody>
+          <a:bodyPr>
+            <a:noAutofit/>
+          </a:bodyPr>
+          <a:lstStyle/>
+          <a:p>
+            <a:r>
+              <a:rPr lang="en-US" sz="2000" dirty="0">
+                <a:latin typeface="Times New Roman" panose="02020603050405020304" pitchFamily="18" charset="0"/>
+                <a:cs typeface="Times New Roman" panose="02020603050405020304" pitchFamily="18" charset="0"/>
+              </a:rPr>
+              <a:t>Logging</a:t>
+            </a:r>
+          </a:p>
+          <a:p>
+            <a:pPr lvl="1"/>
+            <a:r>
+              <a:rPr lang="en-US" sz="2000" dirty="0">
+                <a:latin typeface="Times New Roman" panose="02020603050405020304" pitchFamily="18" charset="0"/>
+                <a:cs typeface="Times New Roman" panose="02020603050405020304" pitchFamily="18" charset="0"/>
+              </a:rPr>
+              <a:t>The </a:t>
+            </a:r>
+            <a:r>
+              <a:rPr lang="en-US" sz="2000" dirty="0">
+                <a:solidFill>
+                  <a:srgbClr val="C00000"/>
+                </a:solidFill>
+                <a:latin typeface="Times New Roman" panose="02020603050405020304" pitchFamily="18" charset="0"/>
+                <a:cs typeface="Times New Roman" panose="02020603050405020304" pitchFamily="18" charset="0"/>
+              </a:rPr>
+              <a:t>logging</a:t>
+            </a:r>
+            <a:r>
+              <a:rPr lang="en-US" sz="2000" dirty="0">
+                <a:latin typeface="Times New Roman" panose="02020603050405020304" pitchFamily="18" charset="0"/>
+                <a:cs typeface="Times New Roman" panose="02020603050405020304" pitchFamily="18" charset="0"/>
+              </a:rPr>
+              <a:t> module offers a full featured and flexible logging system. At its simplest, log messages are sent to a file or to </a:t>
+            </a:r>
+            <a:r>
+              <a:rPr lang="en-US" sz="2000" dirty="0" err="1">
+                <a:solidFill>
+                  <a:schemeClr val="accent2">
+                    <a:lumMod val="75000"/>
+                  </a:schemeClr>
+                </a:solidFill>
+                <a:latin typeface="Times New Roman" panose="02020603050405020304" pitchFamily="18" charset="0"/>
+                <a:cs typeface="Times New Roman" panose="02020603050405020304" pitchFamily="18" charset="0"/>
+              </a:rPr>
+              <a:t>sys.stderr</a:t>
+            </a:r>
+            <a:endParaRPr lang="en-US" sz="2000" dirty="0">
+              <a:solidFill>
+                <a:schemeClr val="accent2">
+                  <a:lumMod val="75000"/>
+                </a:schemeClr>
+              </a:solidFill>
+              <a:latin typeface="Times New Roman" panose="02020603050405020304" pitchFamily="18" charset="0"/>
+              <a:cs typeface="Times New Roman" panose="02020603050405020304" pitchFamily="18" charset="0"/>
+            </a:endParaRPr>
+          </a:p>
+          <a:p>
+            <a:pPr marL="457200" lvl="1" indent="0">
+              <a:buNone/>
+            </a:pPr>
+            <a:endParaRPr lang="en-US" sz="2000" dirty="0">
+              <a:latin typeface="Times New Roman" panose="02020603050405020304" pitchFamily="18" charset="0"/>
+              <a:cs typeface="Times New Roman" panose="02020603050405020304" pitchFamily="18" charset="0"/>
+            </a:endParaRPr>
+          </a:p>
+          <a:p>
+            <a:r>
+              <a:rPr lang="en-US" sz="2000" dirty="0">
+                <a:latin typeface="Times New Roman" panose="02020603050405020304" pitchFamily="18" charset="0"/>
+                <a:cs typeface="Times New Roman" panose="02020603050405020304" pitchFamily="18" charset="0"/>
+              </a:rPr>
+              <a:t>Tools for Working with Lists</a:t>
+            </a:r>
+          </a:p>
+          <a:p>
+            <a:pPr lvl="1"/>
+            <a:r>
+              <a:rPr lang="en-US" sz="2000" dirty="0">
+                <a:latin typeface="Times New Roman" panose="02020603050405020304" pitchFamily="18" charset="0"/>
+                <a:cs typeface="Times New Roman" panose="02020603050405020304" pitchFamily="18" charset="0"/>
+              </a:rPr>
+              <a:t>Many data structure needs can be met with the built-in list type. However, sometimes there is a need for alternative implementations with different performance trade-offs</a:t>
+            </a:r>
+          </a:p>
+          <a:p>
+            <a:pPr lvl="1"/>
+            <a:r>
+              <a:rPr lang="en-US" sz="2000" dirty="0">
+                <a:latin typeface="Times New Roman" panose="02020603050405020304" pitchFamily="18" charset="0"/>
+                <a:cs typeface="Times New Roman" panose="02020603050405020304" pitchFamily="18" charset="0"/>
+              </a:rPr>
+              <a:t>The </a:t>
+            </a:r>
+            <a:r>
+              <a:rPr lang="en-US" sz="2000" dirty="0">
+                <a:solidFill>
+                  <a:srgbClr val="C00000"/>
+                </a:solidFill>
+                <a:latin typeface="Times New Roman" panose="02020603050405020304" pitchFamily="18" charset="0"/>
+                <a:cs typeface="Times New Roman" panose="02020603050405020304" pitchFamily="18" charset="0"/>
+              </a:rPr>
+              <a:t>array</a:t>
+            </a:r>
+            <a:r>
+              <a:rPr lang="en-US" sz="2000" dirty="0">
+                <a:latin typeface="Times New Roman" panose="02020603050405020304" pitchFamily="18" charset="0"/>
+                <a:cs typeface="Times New Roman" panose="02020603050405020304" pitchFamily="18" charset="0"/>
+              </a:rPr>
+              <a:t> module provides an </a:t>
+            </a:r>
+            <a:r>
+              <a:rPr lang="en-US" sz="2000" dirty="0">
+                <a:solidFill>
+                  <a:srgbClr val="C00000"/>
+                </a:solidFill>
+                <a:latin typeface="Times New Roman" panose="02020603050405020304" pitchFamily="18" charset="0"/>
+                <a:cs typeface="Times New Roman" panose="02020603050405020304" pitchFamily="18" charset="0"/>
+              </a:rPr>
+              <a:t>array() </a:t>
+            </a:r>
+            <a:r>
+              <a:rPr lang="en-US" sz="2000" dirty="0">
+                <a:latin typeface="Times New Roman" panose="02020603050405020304" pitchFamily="18" charset="0"/>
+                <a:cs typeface="Times New Roman" panose="02020603050405020304" pitchFamily="18" charset="0"/>
+              </a:rPr>
+              <a:t>object that is like a list that stores only homogeneous data and stores it more compactly</a:t>
+            </a:r>
+          </a:p>
+          <a:p>
+            <a:pPr lvl="1"/>
+            <a:r>
+              <a:rPr lang="en-US" sz="2000" dirty="0">
+                <a:latin typeface="Times New Roman" panose="02020603050405020304" pitchFamily="18" charset="0"/>
+                <a:cs typeface="Times New Roman" panose="02020603050405020304" pitchFamily="18" charset="0"/>
+              </a:rPr>
+              <a:t>The </a:t>
+            </a:r>
+            <a:r>
+              <a:rPr lang="en-US" sz="2000" dirty="0">
+                <a:solidFill>
+                  <a:srgbClr val="C00000"/>
+                </a:solidFill>
+                <a:latin typeface="Times New Roman" panose="02020603050405020304" pitchFamily="18" charset="0"/>
+                <a:cs typeface="Times New Roman" panose="02020603050405020304" pitchFamily="18" charset="0"/>
+              </a:rPr>
+              <a:t>collections</a:t>
+            </a:r>
+            <a:r>
+              <a:rPr lang="en-US" sz="2000" dirty="0">
+                <a:latin typeface="Times New Roman" panose="02020603050405020304" pitchFamily="18" charset="0"/>
+                <a:cs typeface="Times New Roman" panose="02020603050405020304" pitchFamily="18" charset="0"/>
+              </a:rPr>
+              <a:t> module provides a </a:t>
+            </a:r>
+            <a:r>
+              <a:rPr lang="en-US" sz="2000" dirty="0" err="1">
+                <a:solidFill>
+                  <a:srgbClr val="C00000"/>
+                </a:solidFill>
+                <a:latin typeface="Times New Roman" panose="02020603050405020304" pitchFamily="18" charset="0"/>
+                <a:cs typeface="Times New Roman" panose="02020603050405020304" pitchFamily="18" charset="0"/>
+              </a:rPr>
+              <a:t>deque</a:t>
+            </a:r>
+            <a:r>
+              <a:rPr lang="en-US" sz="2000" dirty="0">
+                <a:solidFill>
+                  <a:srgbClr val="C00000"/>
+                </a:solidFill>
+                <a:latin typeface="Times New Roman" panose="02020603050405020304" pitchFamily="18" charset="0"/>
+                <a:cs typeface="Times New Roman" panose="02020603050405020304" pitchFamily="18" charset="0"/>
+              </a:rPr>
+              <a:t>() </a:t>
+            </a:r>
+            <a:r>
+              <a:rPr lang="en-US" sz="2000" dirty="0">
+                <a:latin typeface="Times New Roman" panose="02020603050405020304" pitchFamily="18" charset="0"/>
+                <a:cs typeface="Times New Roman" panose="02020603050405020304" pitchFamily="18" charset="0"/>
+              </a:rPr>
+              <a:t>object that is like a list with faster appends and pops from the left side but slower lookups in the middle. These objects are well suited for implementing queues and breadth first tree searches</a:t>
+            </a:r>
+          </a:p>
+          <a:p>
+            <a:pPr lvl="1"/>
+            <a:r>
+              <a:rPr lang="en-US" sz="2000" dirty="0">
+                <a:latin typeface="Times New Roman" panose="02020603050405020304" pitchFamily="18" charset="0"/>
+                <a:cs typeface="Times New Roman" panose="02020603050405020304" pitchFamily="18" charset="0"/>
+              </a:rPr>
+              <a:t>The </a:t>
+            </a:r>
+            <a:r>
+              <a:rPr lang="en-US" sz="2000" dirty="0" err="1">
+                <a:solidFill>
+                  <a:srgbClr val="C00000"/>
+                </a:solidFill>
+                <a:latin typeface="Times New Roman" panose="02020603050405020304" pitchFamily="18" charset="0"/>
+                <a:cs typeface="Times New Roman" panose="02020603050405020304" pitchFamily="18" charset="0"/>
+              </a:rPr>
+              <a:t>heapq</a:t>
+            </a:r>
+            <a:r>
+              <a:rPr lang="en-US" sz="2000" dirty="0">
+                <a:latin typeface="Times New Roman" panose="02020603050405020304" pitchFamily="18" charset="0"/>
+                <a:cs typeface="Times New Roman" panose="02020603050405020304" pitchFamily="18" charset="0"/>
+              </a:rPr>
+              <a:t> module provides functions for implementing heaps based on regular lists. The lowest valued entry is always kept at position zero. This is useful for applications which repeatedly access the smallest element but do not want to run a full list </a:t>
+            </a:r>
+            <a:r>
+              <a:rPr lang="en-US" sz="2000" dirty="0" smtClean="0">
+                <a:latin typeface="Times New Roman" panose="02020603050405020304" pitchFamily="18" charset="0"/>
+                <a:cs typeface="Times New Roman" panose="02020603050405020304" pitchFamily="18" charset="0"/>
+              </a:rPr>
+              <a:t>sort</a:t>
+            </a:r>
+            <a:endParaRPr lang="en-US" sz="2000" dirty="0">
+              <a:latin typeface="Times New Roman" panose="02020603050405020304" pitchFamily="18" charset="0"/>
+              <a:cs typeface="Times New Roman" panose="02020603050405020304" pitchFamily="18" charset="0"/>
+            </a:endParaRPr>
+          </a:p>
+        </p:txBody>
+      </p:sp>
+    </p:spTree>
+    <p:extLst>
+      <p:ext uri="{BB962C8B-B14F-4D97-AF65-F5344CB8AC3E}">
+        <p14:creationId xmlns:p14="http://schemas.microsoft.com/office/powerpoint/2010/main" val="1438890480"/>
       </p:ext>
     </p:extLst>
   </p:cSld>
@@ -14984,31 +14874,7 @@
                 <a:cs typeface="Calibri"/>
                 <a:sym typeface="Calibri"/>
               </a:rPr>
-              <a:t>I</a:t>
-            </a:r>
-            <a:r>
-              <a:rPr lang="en-US" dirty="0">
-                <a:solidFill>
-                  <a:schemeClr val="dk1"/>
-                </a:solidFill>
-                <a:latin typeface="Calibri"/>
-                <a:ea typeface="Calibri"/>
-                <a:cs typeface="Calibri"/>
-                <a:sym typeface="Calibri"/>
-              </a:rPr>
-              <a:t>nstalling </a:t>
-            </a:r>
-            <a:r>
-              <a:rPr lang="en-US" dirty="0">
-                <a:solidFill>
-                  <a:schemeClr val="dk1"/>
-                </a:solidFill>
-                <a:latin typeface="Calibri"/>
-                <a:ea typeface="Calibri"/>
-                <a:cs typeface="Calibri"/>
-                <a:sym typeface="Calibri"/>
-              </a:rPr>
-              <a:t>Anaconda</a:t>
+              <a:t>Installing Anaconda</a:t>
             </a:r>
           </a:p>
         </p:txBody>
@@ -15087,20 +14953,7 @@
                 <a:sym typeface="Calibri"/>
                 <a:hlinkClick r:id="rId2"/>
               </a:rPr>
-              <a:t>Anaconda </a:t>
-            </a:r>
-            <a:r>
-              <a:rPr lang="en-US" dirty="0">
-                <a:solidFill>
-                  <a:schemeClr val="dk1"/>
-                </a:solidFill>
-                <a:latin typeface="Times New Roman"/>
-                <a:ea typeface="Times New Roman"/>
-                <a:cs typeface="Times New Roman"/>
-                <a:sym typeface="Calibri"/>
-                <a:hlinkClick r:id="rId2"/>
-              </a:rPr>
-              <a:t>installer for Windows</a:t>
+              <a:t>Anaconda installer for Windows</a:t>
             </a:r>
             <a:r>
               <a:rPr lang="en-US" dirty="0">
@@ -15130,29 +14983,8 @@
                 <a:cs typeface="Times New Roman"/>
                 <a:sym typeface="Calibri"/>
               </a:rPr>
-              <a:t>Double-click the .exe file</a:t>
-            </a:r>
-            <a:r>
-              <a:rPr lang="en-US" sz="2400" dirty="0">
-                <a:solidFill>
-                  <a:schemeClr val="dk1"/>
-                </a:solidFill>
-                <a:latin typeface="Times New Roman"/>
-                <a:ea typeface="Times New Roman"/>
-                <a:cs typeface="Times New Roman"/>
-                <a:sym typeface="Calibri"/>
-              </a:rPr>
-              <a:t>.</a:t>
-            </a:r>
-            <a:endParaRPr lang="en-US" sz="2400" dirty="0">
-              <a:solidFill>
-                <a:schemeClr val="dk1"/>
-              </a:solidFill>
-              <a:latin typeface="Times New Roman"/>
-              <a:ea typeface="Times New Roman"/>
-              <a:cs typeface="Times New Roman"/>
-              <a:sym typeface="Calibri"/>
-            </a:endParaRPr>
+              <a:t>Double-click the .exe file.</a:t>
+            </a:r>
           </a:p>
           <a:p>
             <a:pPr marL="457200" indent="-457200">
@@ -15169,29 +15001,8 @@
                 <a:cs typeface="Times New Roman"/>
                 <a:sym typeface="Calibri"/>
               </a:rPr>
-              <a:t>Follow the instructions on the screen</a:t>
-            </a:r>
-            <a:r>
-              <a:rPr lang="en-US" sz="2400" dirty="0">
-                <a:solidFill>
-                  <a:schemeClr val="dk1"/>
-                </a:solidFill>
-                <a:latin typeface="Times New Roman"/>
-                <a:ea typeface="Times New Roman"/>
-                <a:cs typeface="Times New Roman"/>
-                <a:sym typeface="Calibri"/>
-              </a:rPr>
-              <a:t>.</a:t>
-            </a:r>
-            <a:endParaRPr lang="en-US" sz="2400" dirty="0">
-              <a:solidFill>
-                <a:schemeClr val="dk1"/>
-              </a:solidFill>
-              <a:latin typeface="Times New Roman"/>
-              <a:ea typeface="Times New Roman"/>
-              <a:cs typeface="Times New Roman"/>
-              <a:sym typeface="Calibri"/>
-            </a:endParaRPr>
+              <a:t>Follow the instructions on the screen.</a:t>
+            </a:r>
           </a:p>
           <a:p>
             <a:pPr marL="457200" indent="-457200">
@@ -15208,29 +15019,8 @@
                 <a:cs typeface="Times New Roman"/>
                 <a:sym typeface="Calibri"/>
               </a:rPr>
-              <a:t>If you are unsure about any setting, accept the defaults. You can change them later</a:t>
-            </a:r>
-            <a:r>
-              <a:rPr lang="en-US" sz="2400" dirty="0">
-                <a:solidFill>
-                  <a:schemeClr val="dk1"/>
-                </a:solidFill>
-                <a:latin typeface="Times New Roman"/>
-                <a:ea typeface="Times New Roman"/>
-                <a:cs typeface="Times New Roman"/>
-                <a:sym typeface="Calibri"/>
-              </a:rPr>
-              <a:t>.</a:t>
-            </a:r>
-            <a:endParaRPr lang="en-US" sz="2400" dirty="0">
-              <a:solidFill>
-                <a:schemeClr val="dk1"/>
-              </a:solidFill>
-              <a:latin typeface="Times New Roman"/>
-              <a:ea typeface="Times New Roman"/>
-              <a:cs typeface="Times New Roman"/>
-              <a:sym typeface="Calibri"/>
-            </a:endParaRPr>
+              <a:t>If you are unsure about any setting, accept the defaults. You can change them later.</a:t>
+            </a:r>
           </a:p>
           <a:p>
             <a:pPr marL="457200" indent="-457200">
@@ -15309,31 +15099,7 @@
                 <a:cs typeface="Calibri"/>
                 <a:sym typeface="Calibri"/>
               </a:rPr>
-              <a:t>I</a:t>
-            </a:r>
-            <a:r>
-              <a:rPr lang="en-US" dirty="0">
-                <a:solidFill>
-                  <a:schemeClr val="dk1"/>
-                </a:solidFill>
-                <a:latin typeface="Calibri"/>
-                <a:ea typeface="Calibri"/>
-                <a:cs typeface="Calibri"/>
-                <a:sym typeface="Calibri"/>
-              </a:rPr>
-              <a:t>nstalling </a:t>
-            </a:r>
-            <a:r>
-              <a:rPr lang="en-US" dirty="0">
-                <a:solidFill>
-                  <a:schemeClr val="dk1"/>
-                </a:solidFill>
-                <a:latin typeface="Calibri"/>
-                <a:ea typeface="Calibri"/>
-                <a:cs typeface="Calibri"/>
-                <a:sym typeface="Calibri"/>
-              </a:rPr>
-              <a:t>Anaconda</a:t>
+              <a:t>Installing Anaconda</a:t>
             </a:r>
           </a:p>
         </p:txBody>
@@ -15408,18 +15174,7 @@
                 <a:ea typeface="Times New Roman"/>
                 <a:cs typeface="Times New Roman"/>
               </a:rPr>
-              <a:t>Download the installer</a:t>
-            </a:r>
-            <a:r>
-              <a:rPr lang="en-US" sz="2400" dirty="0">
-                <a:solidFill>
-                  <a:schemeClr val="dk1"/>
-                </a:solidFill>
-                <a:latin typeface="Times New Roman"/>
-                <a:ea typeface="Times New Roman"/>
-                <a:cs typeface="Times New Roman"/>
-              </a:rPr>
-              <a:t>:</a:t>
+              <a:t>Download the installer:</a:t>
             </a:r>
           </a:p>
           <a:p>
@@ -15457,38 +15212,8 @@
                 <a:ea typeface="Times New Roman"/>
                 <a:cs typeface="Times New Roman"/>
               </a:rPr>
-              <a:t>. </a:t>
-            </a:r>
-            <a:r>
-              <a:rPr lang="en-US" dirty="0">
-                <a:solidFill>
-                  <a:schemeClr val="dk1"/>
-                </a:solidFill>
-                <a:latin typeface="Times New Roman"/>
-                <a:ea typeface="Times New Roman"/>
-                <a:cs typeface="Times New Roman"/>
-              </a:rPr>
-              <a:t>(https://www.anaconda.com/download/#</a:t>
-            </a:r>
-            <a:r>
-              <a:rPr lang="en-US" dirty="0">
-                <a:solidFill>
-                  <a:schemeClr val="dk1"/>
-                </a:solidFill>
-                <a:latin typeface="Times New Roman"/>
-                <a:ea typeface="Times New Roman"/>
-                <a:cs typeface="Times New Roman"/>
-              </a:rPr>
-              <a:t>macos)</a:t>
-            </a:r>
-            <a:endParaRPr lang="en-US" dirty="0">
-              <a:solidFill>
-                <a:schemeClr val="dk1"/>
-              </a:solidFill>
-              <a:latin typeface="Times New Roman"/>
-              <a:ea typeface="Times New Roman"/>
-              <a:cs typeface="Times New Roman"/>
-            </a:endParaRPr>
+              <a:t>. (https://www.anaconda.com/download/#macos)</a:t>
+            </a:r>
           </a:p>
           <a:p>
             <a:pPr marL="457200" indent="-457200">
@@ -15506,14 +15231,6 @@
               </a:rPr>
               <a:t>Install:</a:t>
             </a:r>
-            <a:endParaRPr lang="en-US" sz="2400" dirty="0">
-              <a:solidFill>
-                <a:schemeClr val="dk1"/>
-              </a:solidFill>
-              <a:latin typeface="Times New Roman"/>
-              <a:ea typeface="Times New Roman"/>
-              <a:cs typeface="Times New Roman"/>
-            </a:endParaRPr>
           </a:p>
           <a:p>
             <a:pPr lvl="1"/>
@@ -15526,7 +15243,18 @@
                 <a:ea typeface="Times New Roman"/>
                 <a:cs typeface="Times New Roman"/>
               </a:rPr>
-              <a:t>Anaconda—Double-click </a:t>
+              <a:t>Anaconda—Double-click the .</a:t>
+            </a:r>
+            <a:r>
+              <a:rPr lang="en-US" dirty="0" err="1">
+                <a:solidFill>
+                  <a:schemeClr val="dk1"/>
+                </a:solidFill>
+                <a:latin typeface="Times New Roman"/>
+                <a:ea typeface="Times New Roman"/>
+                <a:cs typeface="Times New Roman"/>
+              </a:rPr>
+              <a:t>pkg</a:t>
             </a:r>
             <a:r>
               <a:rPr lang="en-US" dirty="0">
@@ -15537,49 +15265,8 @@
                 <a:ea typeface="Times New Roman"/>
                 <a:cs typeface="Times New Roman"/>
               </a:rPr>
-              <a:t>the .</a:t>
-            </a:r>
-            <a:r>
-              <a:rPr lang="en-US" dirty="0" err="1">
-                <a:solidFill>
-                  <a:schemeClr val="dk1"/>
-                </a:solidFill>
-                <a:latin typeface="Times New Roman"/>
-                <a:ea typeface="Times New Roman"/>
-                <a:cs typeface="Times New Roman"/>
-              </a:rPr>
-              <a:t>pkg</a:t>
-            </a:r>
-            <a:r>
-              <a:rPr lang="en-US" dirty="0">
-                <a:solidFill>
-                  <a:schemeClr val="dk1"/>
-                </a:solidFill>
-                <a:latin typeface="Times New Roman"/>
-                <a:ea typeface="Times New Roman"/>
-                <a:cs typeface="Times New Roman"/>
-              </a:rPr>
-              <a:t> file</a:t>
-            </a:r>
-            <a:r>
-              <a:rPr lang="en-US" dirty="0">
-                <a:solidFill>
-                  <a:schemeClr val="dk1"/>
-                </a:solidFill>
-                <a:latin typeface="Times New Roman"/>
-                <a:ea typeface="Times New Roman"/>
-                <a:cs typeface="Times New Roman"/>
-              </a:rPr>
-              <a:t>.</a:t>
-            </a:r>
-            <a:endParaRPr lang="en-US" dirty="0">
-              <a:solidFill>
-                <a:schemeClr val="dk1"/>
-              </a:solidFill>
-              <a:latin typeface="Times New Roman"/>
-              <a:ea typeface="Times New Roman"/>
-              <a:cs typeface="Times New Roman"/>
-            </a:endParaRPr>
+              <a:t> file.</a:t>
+            </a:r>
           </a:p>
           <a:p>
             <a:pPr marL="457200" indent="-457200">
@@ -15595,27 +15282,8 @@
                 <a:ea typeface="Times New Roman"/>
                 <a:cs typeface="Times New Roman"/>
               </a:rPr>
-              <a:t>Follow the prompts on the installer screens</a:t>
-            </a:r>
-            <a:r>
-              <a:rPr lang="en-US" sz="2400" dirty="0">
-                <a:solidFill>
-                  <a:schemeClr val="dk1"/>
-                </a:solidFill>
-                <a:latin typeface="Times New Roman"/>
-                <a:ea typeface="Times New Roman"/>
-                <a:cs typeface="Times New Roman"/>
-              </a:rPr>
-              <a:t>.</a:t>
-            </a:r>
-            <a:endParaRPr lang="en-US" sz="2400" dirty="0">
-              <a:solidFill>
-                <a:schemeClr val="dk1"/>
-              </a:solidFill>
-              <a:latin typeface="Times New Roman"/>
-              <a:ea typeface="Times New Roman"/>
-              <a:cs typeface="Times New Roman"/>
-            </a:endParaRPr>
+              <a:t>Follow the prompts on the installer screens.</a:t>
+            </a:r>
           </a:p>
           <a:p>
             <a:pPr marL="457200" indent="-457200">
@@ -15631,27 +15299,8 @@
                 <a:ea typeface="Times New Roman"/>
                 <a:cs typeface="Times New Roman"/>
               </a:rPr>
-              <a:t>If you are unsure about any setting, accept the defaults. You can change them later</a:t>
-            </a:r>
-            <a:r>
-              <a:rPr lang="en-US" sz="2400" dirty="0">
-                <a:solidFill>
-                  <a:schemeClr val="dk1"/>
-                </a:solidFill>
-                <a:latin typeface="Times New Roman"/>
-                <a:ea typeface="Times New Roman"/>
-                <a:cs typeface="Times New Roman"/>
-              </a:rPr>
-              <a:t>.</a:t>
-            </a:r>
-            <a:endParaRPr lang="en-US" sz="2400" dirty="0">
-              <a:solidFill>
-                <a:schemeClr val="dk1"/>
-              </a:solidFill>
-              <a:latin typeface="Times New Roman"/>
-              <a:ea typeface="Times New Roman"/>
-              <a:cs typeface="Times New Roman"/>
-            </a:endParaRPr>
+              <a:t>If you are unsure about any setting, accept the defaults. You can change them later.</a:t>
+            </a:r>
           </a:p>
           <a:p>
             <a:pPr marL="457200" indent="-457200">
@@ -15669,14 +15318,6 @@
               </a:rPr>
               <a:t>To make the changes take effect, close and then re-open your Terminal window.</a:t>
             </a:r>
-            <a:endParaRPr lang="en-US" sz="2400" dirty="0">
-              <a:solidFill>
-                <a:schemeClr val="dk1"/>
-              </a:solidFill>
-              <a:latin typeface="Times New Roman"/>
-              <a:ea typeface="Times New Roman"/>
-              <a:cs typeface="Times New Roman"/>
-            </a:endParaRPr>
           </a:p>
         </p:txBody>
       </p:sp>
@@ -15737,31 +15378,7 @@
                 <a:cs typeface="Calibri"/>
                 <a:sym typeface="Calibri"/>
               </a:rPr>
-              <a:t>I</a:t>
-            </a:r>
-            <a:r>
-              <a:rPr lang="en-US" dirty="0">
-                <a:solidFill>
-                  <a:schemeClr val="dk1"/>
-                </a:solidFill>
-                <a:latin typeface="Calibri"/>
-                <a:ea typeface="Calibri"/>
-                <a:cs typeface="Calibri"/>
-                <a:sym typeface="Calibri"/>
-              </a:rPr>
-              <a:t>nstalling </a:t>
-            </a:r>
-            <a:r>
-              <a:rPr lang="en-US" dirty="0">
-                <a:solidFill>
-                  <a:schemeClr val="dk1"/>
-                </a:solidFill>
-                <a:latin typeface="Calibri"/>
-                <a:ea typeface="Calibri"/>
-                <a:cs typeface="Calibri"/>
-                <a:sym typeface="Calibri"/>
-              </a:rPr>
-              <a:t>Anaconda</a:t>
+              <a:t>Installing Anaconda</a:t>
             </a:r>
           </a:p>
         </p:txBody>
@@ -15824,19 +15441,7 @@
                 <a:cs typeface="Times New Roman"/>
                 <a:sym typeface="Calibri"/>
               </a:rPr>
-              <a:t>Download the installer</a:t>
-            </a:r>
-            <a:r>
-              <a:rPr lang="en-US" sz="2400" dirty="0">
-                <a:solidFill>
-                  <a:schemeClr val="dk1"/>
-                </a:solidFill>
-                <a:latin typeface="Times New Roman"/>
-                <a:ea typeface="Times New Roman"/>
-                <a:cs typeface="Times New Roman"/>
-                <a:sym typeface="Calibri"/>
-              </a:rPr>
-              <a:t>:</a:t>
+              <a:t>Download the installer:</a:t>
             </a:r>
           </a:p>
           <a:p>
@@ -15852,20 +15457,7 @@
                 <a:sym typeface="Calibri"/>
                 <a:hlinkClick r:id="rId2"/>
               </a:rPr>
-              <a:t>Anaconda installer for </a:t>
-            </a:r>
-            <a:r>
-              <a:rPr lang="en-US" dirty="0">
-                <a:solidFill>
-                  <a:schemeClr val="dk1"/>
-                </a:solidFill>
-                <a:latin typeface="Times New Roman"/>
-                <a:ea typeface="Times New Roman"/>
-                <a:cs typeface="Times New Roman"/>
-                <a:sym typeface="Calibri"/>
-                <a:hlinkClick r:id="rId2"/>
-              </a:rPr>
-              <a:t>Linux.</a:t>
+              <a:t>Anaconda installer for Linux.</a:t>
             </a:r>
             <a:r>
               <a:rPr lang="en-US" dirty="0">
@@ -15910,29 +15502,8 @@
                 <a:cs typeface="Times New Roman"/>
                 <a:sym typeface="Calibri"/>
               </a:rPr>
-              <a:t>bash </a:t>
-            </a:r>
-            <a:r>
-              <a:rPr lang="en-US" dirty="0">
-                <a:solidFill>
-                  <a:schemeClr val="dk1"/>
-                </a:solidFill>
-                <a:latin typeface="Times New Roman"/>
-                <a:ea typeface="Times New Roman"/>
-                <a:cs typeface="Times New Roman"/>
-                <a:sym typeface="Calibri"/>
-              </a:rPr>
-              <a:t>Anaconda-latest-Linux-x86_64.sh </a:t>
-            </a:r>
-            <a:endParaRPr lang="en-US" dirty="0">
-              <a:solidFill>
-                <a:schemeClr val="dk1"/>
-              </a:solidFill>
-              <a:latin typeface="Times New Roman"/>
-              <a:ea typeface="Times New Roman"/>
-              <a:cs typeface="Times New Roman"/>
-              <a:sym typeface="Calibri"/>
-            </a:endParaRPr>
+              <a:t>bash Anaconda-latest-Linux-x86_64.sh </a:t>
+            </a:r>
           </a:p>
           <a:p>
             <a:pPr marL="457200" indent="-457200">
@@ -15949,29 +15520,8 @@
                 <a:cs typeface="Times New Roman"/>
                 <a:sym typeface="Calibri"/>
               </a:rPr>
-              <a:t>Follow the prompts on the installer screens</a:t>
-            </a:r>
-            <a:r>
-              <a:rPr lang="en-US" sz="2400" dirty="0">
-                <a:solidFill>
-                  <a:schemeClr val="dk1"/>
-                </a:solidFill>
-                <a:latin typeface="Times New Roman"/>
-                <a:ea typeface="Times New Roman"/>
-                <a:cs typeface="Times New Roman"/>
-                <a:sym typeface="Calibri"/>
-              </a:rPr>
-              <a:t>.</a:t>
-            </a:r>
-            <a:endParaRPr lang="en-US" sz="2400" dirty="0">
-              <a:solidFill>
-                <a:schemeClr val="dk1"/>
-              </a:solidFill>
-              <a:latin typeface="Times New Roman"/>
-              <a:ea typeface="Times New Roman"/>
-              <a:cs typeface="Times New Roman"/>
-              <a:sym typeface="Calibri"/>
-            </a:endParaRPr>
+              <a:t>Follow the prompts on the installer screens.</a:t>
+            </a:r>
           </a:p>
           <a:p>
             <a:pPr marL="457200" indent="-457200">
@@ -15988,29 +15538,8 @@
                 <a:cs typeface="Times New Roman"/>
                 <a:sym typeface="Calibri"/>
               </a:rPr>
-              <a:t>If you are unsure about any setting, accept the defaults. You can change them later</a:t>
-            </a:r>
-            <a:r>
-              <a:rPr lang="en-US" sz="2400" dirty="0">
-                <a:solidFill>
-                  <a:schemeClr val="dk1"/>
-                </a:solidFill>
-                <a:latin typeface="Times New Roman"/>
-                <a:ea typeface="Times New Roman"/>
-                <a:cs typeface="Times New Roman"/>
-                <a:sym typeface="Calibri"/>
-              </a:rPr>
-              <a:t>.</a:t>
-            </a:r>
-            <a:endParaRPr lang="en-US" sz="2400" dirty="0">
-              <a:solidFill>
-                <a:schemeClr val="dk1"/>
-              </a:solidFill>
-              <a:latin typeface="Times New Roman"/>
-              <a:ea typeface="Times New Roman"/>
-              <a:cs typeface="Times New Roman"/>
-              <a:sym typeface="Calibri"/>
-            </a:endParaRPr>
+              <a:t>If you are unsure about any setting, accept the defaults. You can change them later.</a:t>
+            </a:r>
           </a:p>
           <a:p>
             <a:pPr marL="457200" indent="-457200">
@@ -16029,15 +15558,6 @@
               </a:rPr>
               <a:t>To make the changes take effect, close and then re-open your Terminal window.</a:t>
             </a:r>
-            <a:endParaRPr lang="en-US" sz="2400" dirty="0">
-              <a:solidFill>
-                <a:schemeClr val="dk1"/>
-              </a:solidFill>
-              <a:latin typeface="Times New Roman"/>
-              <a:ea typeface="Times New Roman"/>
-              <a:cs typeface="Times New Roman"/>
-              <a:sym typeface="Calibri"/>
-            </a:endParaRPr>
           </a:p>
         </p:txBody>
       </p:sp>
@@ -16150,18 +15670,7 @@
                 <a:ea typeface="Times New Roman"/>
                 <a:cs typeface="Times New Roman"/>
               </a:rPr>
-              <a:t>To </a:t>
-            </a:r>
-            <a:r>
-              <a:rPr lang="en-US" sz="2400" dirty="0">
-                <a:solidFill>
-                  <a:schemeClr val="dk1"/>
-                </a:solidFill>
-                <a:latin typeface="Times New Roman"/>
-                <a:ea typeface="Times New Roman"/>
-                <a:cs typeface="Times New Roman"/>
-              </a:rPr>
-              <a:t>test your installation, in your Terminal window or Anaconda Prompt, run the command </a:t>
+              <a:t>To test your installation, in your Terminal window or Anaconda Prompt, run the command </a:t>
             </a:r>
           </a:p>
           <a:p>
@@ -16188,37 +15697,18 @@
               </a:rPr>
               <a:t> list</a:t>
             </a:r>
-            <a:endParaRPr lang="en-US" dirty="0">
-              <a:solidFill>
-                <a:schemeClr val="dk1"/>
-              </a:solidFill>
-              <a:latin typeface="Times New Roman"/>
-              <a:ea typeface="Times New Roman"/>
-              <a:cs typeface="Times New Roman"/>
-            </a:endParaRPr>
-          </a:p>
-          <a:p>
-            <a:r>
-              <a:rPr lang="en-US" sz="2400" dirty="0">
-                <a:solidFill>
-                  <a:schemeClr val="dk1"/>
-                </a:solidFill>
-                <a:latin typeface="Times New Roman"/>
-                <a:ea typeface="Times New Roman"/>
-                <a:cs typeface="Times New Roman"/>
-              </a:rPr>
-              <a:t>For a successful installation, a list of installed packages appears</a:t>
-            </a:r>
-            <a:r>
-              <a:rPr lang="en-US" sz="2400" dirty="0">
-                <a:solidFill>
-                  <a:schemeClr val="dk1"/>
-                </a:solidFill>
-                <a:latin typeface="Times New Roman"/>
-                <a:ea typeface="Times New Roman"/>
-                <a:cs typeface="Times New Roman"/>
-              </a:rPr>
-              <a:t>.</a:t>
+          </a:p>
+          <a:p>
+            <a:r>
+              <a:rPr lang="en-US" sz="2400" dirty="0">
+                <a:solidFill>
+                  <a:schemeClr val="dk1"/>
+                </a:solidFill>
+                <a:latin typeface="Times New Roman"/>
+                <a:ea typeface="Times New Roman"/>
+                <a:cs typeface="Times New Roman"/>
+              </a:rPr>
+              <a:t>For a successful installation, a list of installed packages appears.</a:t>
             </a:r>
           </a:p>
           <a:p>
@@ -16328,15 +15818,6 @@
               </a:rPr>
               <a:t>Python Features</a:t>
             </a:r>
-            <a:endParaRPr lang="en-US" dirty="0">
-              <a:solidFill>
-                <a:schemeClr val="dk1"/>
-              </a:solidFill>
-              <a:latin typeface="Calibri"/>
-              <a:ea typeface="Calibri"/>
-              <a:cs typeface="Calibri"/>
-              <a:sym typeface="Calibri"/>
-            </a:endParaRPr>
           </a:p>
         </p:txBody>
       </p:sp>
@@ -16451,19 +15932,7 @@
                 <a:cs typeface="Times New Roman"/>
                 <a:sym typeface="Calibri"/>
               </a:rPr>
-              <a:t>Python website: </a:t>
-            </a:r>
-            <a:r>
-              <a:rPr lang="en-US" sz="2400" dirty="0">
-                <a:solidFill>
-                  <a:schemeClr val="dk1"/>
-                </a:solidFill>
-                <a:latin typeface="Times New Roman"/>
-                <a:ea typeface="Times New Roman"/>
-                <a:cs typeface="Times New Roman"/>
-                <a:sym typeface="Calibri"/>
-              </a:rPr>
-              <a:t> </a:t>
+              <a:t>Python website:  </a:t>
             </a:r>
             <a:r>
               <a:rPr lang="en-US" sz="2400" dirty="0">
@@ -16476,20 +15945,7 @@
                 <a:sym typeface="Calibri"/>
                 <a:hlinkClick r:id="rId2"/>
               </a:rPr>
-              <a:t>https://www.python.org</a:t>
-            </a:r>
-            <a:r>
-              <a:rPr lang="en-US" sz="2400" dirty="0">
-                <a:solidFill>
-                  <a:schemeClr val="dk1"/>
-                </a:solidFill>
-                <a:latin typeface="Times New Roman"/>
-                <a:ea typeface="Times New Roman"/>
-                <a:cs typeface="Times New Roman"/>
-                <a:sym typeface="Calibri"/>
-                <a:hlinkClick r:id="rId2"/>
-              </a:rPr>
-              <a:t>/</a:t>
+              <a:t>https://www.python.org/</a:t>
             </a:r>
             <a:endParaRPr lang="en-US" sz="2400" dirty="0">
               <a:solidFill>

</xml_diff>

<commit_message>
updated ref link to documentation
</commit_message>
<xml_diff>
--- a/lecture/Python Programing.pptx
+++ b/lecture/Python Programing.pptx
@@ -6,22 +6,22 @@
   </p:sldMasterIdLst>
   <p:sldIdLst>
     <p:sldId id="294" r:id="rId2"/>
-    <p:sldId id="288" r:id="rId3"/>
+    <p:sldId id="318" r:id="rId3"/>
     <p:sldId id="304" r:id="rId4"/>
     <p:sldId id="316" r:id="rId5"/>
     <p:sldId id="295" r:id="rId6"/>
     <p:sldId id="258" r:id="rId7"/>
     <p:sldId id="259" r:id="rId8"/>
     <p:sldId id="260" r:id="rId9"/>
-    <p:sldId id="261" r:id="rId10"/>
+    <p:sldId id="319" r:id="rId10"/>
     <p:sldId id="262" r:id="rId11"/>
     <p:sldId id="263" r:id="rId12"/>
     <p:sldId id="265" r:id="rId13"/>
     <p:sldId id="266" r:id="rId14"/>
-    <p:sldId id="267" r:id="rId15"/>
-    <p:sldId id="264" r:id="rId16"/>
+    <p:sldId id="320" r:id="rId15"/>
+    <p:sldId id="321" r:id="rId16"/>
     <p:sldId id="268" r:id="rId17"/>
-    <p:sldId id="269" r:id="rId18"/>
+    <p:sldId id="324" r:id="rId18"/>
     <p:sldId id="305" r:id="rId19"/>
     <p:sldId id="273" r:id="rId20"/>
     <p:sldId id="306" r:id="rId21"/>
@@ -5081,7 +5081,7 @@
             <a:r>
               <a:rPr lang="en-US" sz="2400" dirty="0" err="1">
                 <a:solidFill>
-                  <a:schemeClr val="dk1"/>
+                  <a:srgbClr val="FF0000"/>
                 </a:solidFill>
                 <a:latin typeface="Times New Roman"/>
                 <a:ea typeface="Times New Roman"/>
@@ -5210,7 +5210,7 @@
         </p:blipFill>
         <p:spPr>
           <a:xfrm>
-            <a:off x="6274469" y="1375246"/>
+            <a:off x="6286044" y="1442597"/>
             <a:ext cx="1968581" cy="1077912"/>
           </a:xfrm>
           <a:prstGeom prst="rect">
@@ -5269,7 +5269,7 @@
     </p:spTree>
     <p:extLst>
       <p:ext uri="{BB962C8B-B14F-4D97-AF65-F5344CB8AC3E}">
-        <p14:creationId xmlns:p14="http://schemas.microsoft.com/office/powerpoint/2010/main" val="1620530443"/>
+        <p14:creationId xmlns:p14="http://schemas.microsoft.com/office/powerpoint/2010/main" val="1578290930"/>
       </p:ext>
     </p:extLst>
   </p:cSld>
@@ -5334,11 +5334,7 @@
           </p:cNvGraphicFramePr>
           <p:nvPr>
             <p:ph idx="1"/>
-            <p:extLst>
-              <p:ext uri="{D42A27DB-BD31-4B8C-83A1-F6EECF244321}">
-                <p14:modId xmlns:p14="http://schemas.microsoft.com/office/powerpoint/2010/main" val="3103426537"/>
-              </p:ext>
-            </p:extLst>
+            <p:extLst/>
           </p:nvPr>
         </p:nvGraphicFramePr>
         <p:xfrm>
@@ -5450,6 +5446,22 @@
                     <a:p>
                       <a:r>
                         <a:rPr lang="en-US" dirty="0" smtClean="0"/>
+                        <a:t>Type of the variable </a:t>
+                      </a:r>
+                      <a:r>
+                        <a:rPr lang="en-US" dirty="0" smtClean="0">
+                          <a:solidFill>
+                            <a:srgbClr val="FF0000"/>
+                          </a:solidFill>
+                        </a:rPr>
+                        <a:t>must</a:t>
+                      </a:r>
+                      <a:r>
+                        <a:rPr lang="en-US" baseline="0" dirty="0" smtClean="0"/>
+                        <a:t> be declared. </a:t>
+                      </a:r>
+                      <a:r>
+                        <a:rPr lang="en-US" dirty="0" smtClean="0"/>
                         <a:t>‘</a:t>
                       </a:r>
                       <a:r>
@@ -5467,10 +5479,6 @@
                       <a:r>
                         <a:rPr lang="en-US" baseline="0" dirty="0" err="1" smtClean="0"/>
                         <a:t>int</a:t>
-                      </a:r>
-                      <a:r>
-                        <a:rPr lang="en-US" baseline="0" dirty="0" smtClean="0"/>
-                        <a:t> in this case</a:t>
                       </a:r>
                       <a:endParaRPr lang="en-US" dirty="0"/>
                     </a:p>
@@ -5493,11 +5501,23 @@
                     <a:p>
                       <a:r>
                         <a:rPr lang="en-US" dirty="0" smtClean="0"/>
-                        <a:t>Element of any type can</a:t>
+                        <a:t>Element of </a:t>
+                      </a:r>
+                      <a:r>
+                        <a:rPr lang="en-US" dirty="0" smtClean="0">
+                          <a:solidFill>
+                            <a:srgbClr val="FF0000"/>
+                          </a:solidFill>
+                        </a:rPr>
+                        <a:t>any</a:t>
+                      </a:r>
+                      <a:r>
+                        <a:rPr lang="en-US" dirty="0" smtClean="0"/>
+                        <a:t> type can</a:t>
                       </a:r>
                       <a:r>
                         <a:rPr lang="en-US" baseline="0" dirty="0" smtClean="0"/>
-                        <a:t> be stored in the l</a:t>
+                        <a:t> be stored in a l</a:t>
                       </a:r>
                       <a:r>
                         <a:rPr lang="en-US" dirty="0" smtClean="0"/>
@@ -5691,8 +5711,17 @@
                     <a:p>
                       <a:r>
                         <a:rPr lang="en-US" baseline="0" dirty="0" smtClean="0"/>
-                        <a:t>Complete list: https://docs.python.org/3/library/array.html</a:t>
+                        <a:t>Complete list: </a:t>
                       </a:r>
+                      <a:r>
+                        <a:rPr lang="en-US" baseline="0" dirty="0" smtClean="0">
+                          <a:hlinkClick r:id="rId2"/>
+                        </a:rPr>
+                        <a:t>https://docs.python.org/3/library/array.html</a:t>
+                      </a:r>
+                      <a:endParaRPr lang="en-US" baseline="0" dirty="0" smtClean="0"/>
+                    </a:p>
+                    <a:p>
                       <a:endParaRPr lang="en-US" dirty="0" smtClean="0"/>
                     </a:p>
                   </a:txBody>
@@ -5729,7 +5758,7 @@
                     <a:p>
                       <a:r>
                         <a:rPr lang="en-US" dirty="0" smtClean="0">
-                          <a:hlinkClick r:id="rId2"/>
+                          <a:hlinkClick r:id="rId3"/>
                         </a:rPr>
                         <a:t>https://docs.python.org/3/tutorial/datastructures.html</a:t>
                       </a:r>
@@ -5809,7 +5838,7 @@
           <p:nvPr/>
         </p:nvPicPr>
         <p:blipFill>
-          <a:blip r:embed="rId3"/>
+          <a:blip r:embed="rId4"/>
           <a:stretch>
             <a:fillRect/>
           </a:stretch>
@@ -5833,7 +5862,7 @@
           <p:nvPr/>
         </p:nvPicPr>
         <p:blipFill>
-          <a:blip r:embed="rId4"/>
+          <a:blip r:embed="rId5"/>
           <a:stretch>
             <a:fillRect/>
           </a:stretch>
@@ -5851,7 +5880,7 @@
     </p:spTree>
     <p:extLst>
       <p:ext uri="{BB962C8B-B14F-4D97-AF65-F5344CB8AC3E}">
-        <p14:creationId xmlns:p14="http://schemas.microsoft.com/office/powerpoint/2010/main" val="212557123"/>
+        <p14:creationId xmlns:p14="http://schemas.microsoft.com/office/powerpoint/2010/main" val="144976279"/>
       </p:ext>
     </p:extLst>
   </p:cSld>
@@ -6294,7 +6323,12 @@
             <p:ph idx="1"/>
           </p:nvPr>
         </p:nvSpPr>
-        <p:spPr/>
+        <p:spPr>
+          <a:xfrm>
+            <a:off x="838200" y="1825624"/>
+            <a:ext cx="10515600" cy="4702497"/>
+          </a:xfrm>
+        </p:spPr>
         <p:txBody>
           <a:bodyPr>
             <a:normAutofit/>
@@ -6479,7 +6513,16 @@
                 <a:cs typeface="Times New Roman"/>
                 <a:sym typeface="Calibri"/>
               </a:rPr>
-              <a:t>Can retrieve both keys and values using the </a:t>
+              <a:t>Can retrieve both keys and values using </a:t>
+            </a:r>
+            <a:r>
+              <a:rPr lang="en-US" sz="2400" dirty="0">
+                <a:latin typeface="Times New Roman"/>
+                <a:ea typeface="Times New Roman"/>
+                <a:cs typeface="Times New Roman"/>
+                <a:sym typeface="Calibri"/>
+              </a:rPr>
+              <a:t>the</a:t>
             </a:r>
             <a:r>
               <a:rPr lang="en-US" sz="2400" dirty="0">
@@ -6491,7 +6534,7 @@
                 <a:cs typeface="Times New Roman"/>
                 <a:sym typeface="Calibri"/>
               </a:rPr>
-              <a:t>items() </a:t>
+              <a:t> items() </a:t>
             </a:r>
             <a:r>
               <a:rPr lang="en-US" sz="2400" dirty="0">
@@ -6606,8 +6649,8 @@
         </p:blipFill>
         <p:spPr>
           <a:xfrm>
-            <a:off x="3402386" y="5002332"/>
-            <a:ext cx="4480101" cy="1309568"/>
+            <a:off x="3402386" y="5002331"/>
+            <a:ext cx="5061417" cy="1479491"/>
           </a:xfrm>
           <a:prstGeom prst="rect">
             <a:avLst/>
@@ -6617,7 +6660,7 @@
     </p:spTree>
     <p:extLst>
       <p:ext uri="{BB962C8B-B14F-4D97-AF65-F5344CB8AC3E}">
-        <p14:creationId xmlns:p14="http://schemas.microsoft.com/office/powerpoint/2010/main" val="2255662"/>
+        <p14:creationId xmlns:p14="http://schemas.microsoft.com/office/powerpoint/2010/main" val="2061483924"/>
       </p:ext>
     </p:extLst>
   </p:cSld>
@@ -7295,44 +7338,96 @@
             </a:r>
           </a:p>
           <a:p>
+            <a:r>
+              <a:rPr lang="en-US" dirty="0" smtClean="0">
+                <a:latin typeface="Times New Roman" panose="02020603050405020304" pitchFamily="18" charset="0"/>
+                <a:cs typeface="Times New Roman" panose="02020603050405020304" pitchFamily="18" charset="0"/>
+              </a:rPr>
+              <a:t>Python </a:t>
+            </a:r>
+            <a:r>
+              <a:rPr lang="en-US" dirty="0">
+                <a:latin typeface="Times New Roman" panose="02020603050405020304" pitchFamily="18" charset="0"/>
+                <a:cs typeface="Times New Roman" panose="02020603050405020304" pitchFamily="18" charset="0"/>
+              </a:rPr>
+              <a:t>1: 1994</a:t>
+            </a:r>
+          </a:p>
+          <a:p>
+            <a:r>
+              <a:rPr lang="en-US" dirty="0">
+                <a:latin typeface="Times New Roman" panose="02020603050405020304" pitchFamily="18" charset="0"/>
+                <a:cs typeface="Times New Roman" panose="02020603050405020304" pitchFamily="18" charset="0"/>
+              </a:rPr>
+              <a:t>Python 2: 2000</a:t>
+            </a:r>
+          </a:p>
+          <a:p>
+            <a:r>
+              <a:rPr lang="en-US" dirty="0">
+                <a:latin typeface="Times New Roman" panose="02020603050405020304" pitchFamily="18" charset="0"/>
+                <a:cs typeface="Times New Roman" panose="02020603050405020304" pitchFamily="18" charset="0"/>
+              </a:rPr>
+              <a:t>Python 3: </a:t>
+            </a:r>
+            <a:r>
+              <a:rPr lang="en-US" dirty="0" smtClean="0">
+                <a:latin typeface="Times New Roman" panose="02020603050405020304" pitchFamily="18" charset="0"/>
+                <a:cs typeface="Times New Roman" panose="02020603050405020304" pitchFamily="18" charset="0"/>
+              </a:rPr>
+              <a:t>2008</a:t>
+            </a:r>
+          </a:p>
+          <a:p>
             <a:endParaRPr lang="en-US" dirty="0" smtClean="0">
               <a:latin typeface="Times New Roman" panose="02020603050405020304" pitchFamily="18" charset="0"/>
               <a:cs typeface="Times New Roman" panose="02020603050405020304" pitchFamily="18" charset="0"/>
             </a:endParaRPr>
           </a:p>
           <a:p>
+            <a:pPr marL="0" indent="0">
+              <a:buNone/>
+            </a:pPr>
             <a:r>
               <a:rPr lang="en-US" dirty="0">
-                <a:latin typeface="Times New Roman" panose="02020603050405020304" pitchFamily="18" charset="0"/>
-                <a:cs typeface="Times New Roman" panose="02020603050405020304" pitchFamily="18" charset="0"/>
-              </a:rPr>
-              <a:t>Python 1: 1994</a:t>
-            </a:r>
-          </a:p>
-          <a:p>
+                <a:solidFill>
+                  <a:schemeClr val="dk1"/>
+                </a:solidFill>
+                <a:latin typeface="Times New Roman"/>
+                <a:ea typeface="Times New Roman"/>
+                <a:cs typeface="Times New Roman"/>
+                <a:sym typeface="Calibri"/>
+              </a:rPr>
+              <a:t>Python website:  </a:t>
+            </a:r>
             <a:r>
               <a:rPr lang="en-US" dirty="0">
-                <a:latin typeface="Times New Roman" panose="02020603050405020304" pitchFamily="18" charset="0"/>
-                <a:cs typeface="Times New Roman" panose="02020603050405020304" pitchFamily="18" charset="0"/>
-              </a:rPr>
-              <a:t>Python 2: 2000</a:t>
-            </a:r>
-          </a:p>
-          <a:p>
-            <a:r>
-              <a:rPr lang="en-US" dirty="0">
-                <a:latin typeface="Times New Roman" panose="02020603050405020304" pitchFamily="18" charset="0"/>
-                <a:cs typeface="Times New Roman" panose="02020603050405020304" pitchFamily="18" charset="0"/>
-              </a:rPr>
-              <a:t>Python 3: </a:t>
-            </a:r>
-            <a:r>
-              <a:rPr lang="en-US" dirty="0" smtClean="0">
-                <a:latin typeface="Times New Roman" panose="02020603050405020304" pitchFamily="18" charset="0"/>
-                <a:cs typeface="Times New Roman" panose="02020603050405020304" pitchFamily="18" charset="0"/>
-              </a:rPr>
-              <a:t>2008</a:t>
-            </a:r>
+                <a:solidFill>
+                  <a:schemeClr val="dk1"/>
+                </a:solidFill>
+                <a:latin typeface="Times New Roman"/>
+                <a:ea typeface="Times New Roman"/>
+                <a:cs typeface="Times New Roman"/>
+                <a:sym typeface="Calibri"/>
+                <a:hlinkClick r:id="rId2"/>
+              </a:rPr>
+              <a:t>https://www.python.org/</a:t>
+            </a:r>
+            <a:endParaRPr lang="en-US" dirty="0">
+              <a:solidFill>
+                <a:schemeClr val="dk1"/>
+              </a:solidFill>
+              <a:latin typeface="Times New Roman"/>
+              <a:ea typeface="Times New Roman"/>
+              <a:cs typeface="Times New Roman"/>
+              <a:sym typeface="Calibri"/>
+            </a:endParaRPr>
+          </a:p>
+          <a:p>
+            <a:endParaRPr lang="en-US" dirty="0" smtClean="0">
+              <a:latin typeface="Times New Roman" panose="02020603050405020304" pitchFamily="18" charset="0"/>
+              <a:cs typeface="Times New Roman" panose="02020603050405020304" pitchFamily="18" charset="0"/>
+            </a:endParaRPr>
           </a:p>
           <a:p>
             <a:pPr marL="3657600" lvl="8" indent="0">
@@ -7354,7 +7449,7 @@
           <p:nvPr/>
         </p:nvPicPr>
         <p:blipFill>
-          <a:blip r:embed="rId2" cstate="print">
+          <a:blip r:embed="rId3" cstate="print">
             <a:extLst>
               <a:ext uri="{28A0092B-C50C-407E-A947-70E740481C1C}">
                 <a14:useLocalDpi xmlns:a14="http://schemas.microsoft.com/office/drawing/2010/main" val="0"/>
@@ -7463,13 +7558,20 @@
     </p:spTree>
     <p:extLst>
       <p:ext uri="{BB962C8B-B14F-4D97-AF65-F5344CB8AC3E}">
-        <p14:creationId xmlns:p14="http://schemas.microsoft.com/office/powerpoint/2010/main" val="2244464996"/>
+        <p14:creationId xmlns:p14="http://schemas.microsoft.com/office/powerpoint/2010/main" val="1822144733"/>
       </p:ext>
     </p:extLst>
   </p:cSld>
   <p:clrMapOvr>
     <a:masterClrMapping/>
   </p:clrMapOvr>
+  <p:timing>
+    <p:tnLst>
+      <p:par>
+        <p:cTn id="1" dur="indefinite" restart="never" nodeType="tmRoot"/>
+      </p:par>
+    </p:tnLst>
+  </p:timing>
 </p:sld>
 </file>
 
@@ -9695,9 +9797,6 @@
               </a:rPr>
               <a:t>Regular Expressions</a:t>
             </a:r>
-            <a:endParaRPr lang="en-US" dirty="0">
-              <a:latin typeface="+mn-lt"/>
-            </a:endParaRPr>
           </a:p>
         </p:txBody>
       </p:sp>
@@ -10102,10 +10201,6 @@
               </a:rPr>
               <a:t>If zero or more characters at the beginning of string match the regular expression pattern, return a corresponding match object.</a:t>
             </a:r>
-            <a:endParaRPr lang="en-US" dirty="0">
-              <a:latin typeface="Times New Roman" panose="02020603050405020304" pitchFamily="18" charset="0"/>
-              <a:cs typeface="Times New Roman" panose="02020603050405020304" pitchFamily="18" charset="0"/>
-            </a:endParaRPr>
           </a:p>
           <a:p>
             <a:pPr lvl="1"/>
@@ -10136,10 +10231,6 @@
               </a:rPr>
               <a:t>Scan through string looking for the first location where the regular expression pattern produces a match, and return a corresponding match object</a:t>
             </a:r>
-            <a:endParaRPr lang="en-US" dirty="0">
-              <a:latin typeface="Times New Roman" panose="02020603050405020304" pitchFamily="18" charset="0"/>
-              <a:cs typeface="Times New Roman" panose="02020603050405020304" pitchFamily="18" charset="0"/>
-            </a:endParaRPr>
           </a:p>
           <a:p>
             <a:pPr lvl="1"/>
@@ -10170,10 +10261,6 @@
               </a:rPr>
               <a:t>Return all non-overlapping matches of pattern in string, as a list of strings. The string is scanned left-to-right, and matches are returned in the order found</a:t>
             </a:r>
-            <a:endParaRPr lang="en-US" dirty="0">
-              <a:latin typeface="Times New Roman" panose="02020603050405020304" pitchFamily="18" charset="0"/>
-              <a:cs typeface="Times New Roman" panose="02020603050405020304" pitchFamily="18" charset="0"/>
-            </a:endParaRPr>
           </a:p>
           <a:p>
             <a:pPr lvl="1"/>
@@ -10204,10 +10291,6 @@
               </a:rPr>
               <a:t>Split string by the occurrences of pattern. If capturing parentheses are used in pattern, then the text of all groups in the pattern are also returned as part of the resulting list </a:t>
             </a:r>
-            <a:endParaRPr lang="en-US" dirty="0">
-              <a:latin typeface="Times New Roman" panose="02020603050405020304" pitchFamily="18" charset="0"/>
-              <a:cs typeface="Times New Roman" panose="02020603050405020304" pitchFamily="18" charset="0"/>
-            </a:endParaRPr>
           </a:p>
           <a:p>
             <a:pPr lvl="1"/>
@@ -10238,10 +10321,6 @@
               </a:rPr>
               <a:t>Return the string obtained by replacing the leftmost non-overlapping occurrences of pattern in string by the replacement repl. If the pattern isn’t found, string is returned unchanged</a:t>
             </a:r>
-            <a:endParaRPr lang="en-US" dirty="0">
-              <a:latin typeface="Times New Roman" panose="02020603050405020304" pitchFamily="18" charset="0"/>
-              <a:cs typeface="Times New Roman" panose="02020603050405020304" pitchFamily="18" charset="0"/>
-            </a:endParaRPr>
           </a:p>
           <a:p>
             <a:pPr lvl="1"/>
@@ -10272,10 +10351,6 @@
               </a:rPr>
               <a:t>Compile a regular expression pattern into a regular expression object, which can be used for matching using its match(), search() and other methods  </a:t>
             </a:r>
-            <a:endParaRPr lang="en-US" dirty="0">
-              <a:latin typeface="Times New Roman" panose="02020603050405020304" pitchFamily="18" charset="0"/>
-              <a:cs typeface="Times New Roman" panose="02020603050405020304" pitchFamily="18" charset="0"/>
-            </a:endParaRPr>
           </a:p>
           <a:p>
             <a:endParaRPr lang="en-US" dirty="0">
@@ -13073,9 +13148,6 @@
               </a:rPr>
               <a:t>Global Interpreter Lock (GIL)</a:t>
             </a:r>
-            <a:endParaRPr lang="en-US" dirty="0">
-              <a:latin typeface="+mn-lt"/>
-            </a:endParaRPr>
           </a:p>
         </p:txBody>
       </p:sp>
@@ -14017,9 +14089,6 @@
               </a:rPr>
               <a:t>Standard Libraries</a:t>
             </a:r>
-            <a:endParaRPr lang="en-US" dirty="0">
-              <a:latin typeface="+mn-lt"/>
-            </a:endParaRPr>
           </a:p>
         </p:txBody>
       </p:sp>
@@ -18561,12 +18630,24 @@
                 <a:cs typeface="Times New Roman"/>
                 <a:sym typeface="Calibri"/>
               </a:rPr>
-              <a:t>Strings are enclosed in single or double quotes. \ is used to escape quotes (‘</a:t>
-            </a:r>
-            <a:r>
-              <a:rPr lang="en-US" sz="2400" dirty="0" err="1">
-                <a:solidFill>
-                  <a:schemeClr val="dk1"/>
+              <a:t>Strings are enclosed in single or double quotes. \ is used to escape quotes (</a:t>
+            </a:r>
+            <a:r>
+              <a:rPr lang="en-US" sz="2400" b="1" dirty="0">
+                <a:solidFill>
+                  <a:srgbClr val="FF0000"/>
+                </a:solidFill>
+                <a:latin typeface="Times New Roman"/>
+                <a:ea typeface="Times New Roman"/>
+                <a:cs typeface="Times New Roman"/>
+                <a:sym typeface="Calibri"/>
+              </a:rPr>
+              <a:t>‘</a:t>
+            </a:r>
+            <a:r>
+              <a:rPr lang="en-US" sz="2400" b="1" dirty="0" err="1">
+                <a:solidFill>
+                  <a:srgbClr val="FF0000"/>
                 </a:solidFill>
                 <a:latin typeface="Times New Roman"/>
                 <a:ea typeface="Times New Roman"/>
@@ -18576,16 +18657,28 @@
               <a:t>hasn</a:t>
             </a:r>
             <a:r>
-              <a:rPr lang="en-US" sz="2400" dirty="0">
-                <a:solidFill>
-                  <a:schemeClr val="dk1"/>
-                </a:solidFill>
-                <a:latin typeface="Times New Roman"/>
-                <a:ea typeface="Times New Roman"/>
-                <a:cs typeface="Times New Roman"/>
-                <a:sym typeface="Calibri"/>
-              </a:rPr>
-              <a:t>\’t’)</a:t>
+              <a:rPr lang="en-US" sz="2400" b="1" dirty="0">
+                <a:solidFill>
+                  <a:srgbClr val="FF0000"/>
+                </a:solidFill>
+                <a:latin typeface="Times New Roman"/>
+                <a:ea typeface="Times New Roman"/>
+                <a:cs typeface="Times New Roman"/>
+                <a:sym typeface="Calibri"/>
+              </a:rPr>
+              <a:t>\’t’</a:t>
+            </a:r>
+            <a:r>
+              <a:rPr lang="en-US" sz="2400" dirty="0">
+                <a:solidFill>
+                  <a:schemeClr val="dk1"/>
+                </a:solidFill>
+                <a:latin typeface="Times New Roman"/>
+                <a:ea typeface="Times New Roman"/>
+                <a:cs typeface="Times New Roman"/>
+                <a:sym typeface="Calibri"/>
+              </a:rPr>
+              <a:t>)</a:t>
             </a:r>
           </a:p>
           <a:p>
@@ -18784,7 +18877,7 @@
     </p:spTree>
     <p:extLst>
       <p:ext uri="{BB962C8B-B14F-4D97-AF65-F5344CB8AC3E}">
-        <p14:creationId xmlns:p14="http://schemas.microsoft.com/office/powerpoint/2010/main" val="1264603610"/>
+        <p14:creationId xmlns:p14="http://schemas.microsoft.com/office/powerpoint/2010/main" val="2269748514"/>
       </p:ext>
     </p:extLst>
   </p:cSld>

</xml_diff>

<commit_message>
Added the reference link to slide 25
</commit_message>
<xml_diff>
--- a/lecture/Python Programing.pptx
+++ b/lecture/Python Programing.pptx
@@ -9145,6 +9145,37 @@
           </a:prstGeom>
         </p:spPr>
       </p:pic>
+      <p:sp>
+        <p:nvSpPr>
+          <p:cNvPr id="3" name="Rectangle 2"/>
+          <p:cNvSpPr/>
+          <p:nvPr/>
+        </p:nvSpPr>
+        <p:spPr>
+          <a:xfrm>
+            <a:off x="8743684" y="6490967"/>
+            <a:ext cx="3448316" cy="307777"/>
+          </a:xfrm>
+          <a:prstGeom prst="rect">
+            <a:avLst/>
+          </a:prstGeom>
+        </p:spPr>
+        <p:txBody>
+          <a:bodyPr wrap="none">
+            <a:spAutoFit/>
+          </a:bodyPr>
+          <a:lstStyle/>
+          <a:p>
+            <a:r>
+              <a:rPr lang="en-US" sz="1400" dirty="0">
+                <a:latin typeface="Times New Roman" panose="02020603050405020304" pitchFamily="18" charset="0"/>
+                <a:cs typeface="Times New Roman" panose="02020603050405020304" pitchFamily="18" charset="0"/>
+              </a:rPr>
+              <a:t>http://calcul.math.cnrs.fr/IMG/pdf/irmar.pdf</a:t>
+            </a:r>
+          </a:p>
+        </p:txBody>
+      </p:sp>
     </p:spTree>
     <p:extLst>
       <p:ext uri="{BB962C8B-B14F-4D97-AF65-F5344CB8AC3E}">

</xml_diff>